<commit_message>
atualizado ppt e exercicio
</commit_message>
<xml_diff>
--- a/TreinamentoJavaSeOca/documentos/apresentação/OCA.pptx
+++ b/TreinamentoJavaSeOca/documentos/apresentação/OCA.pptx
@@ -733,7 +733,7 @@
             <a:spLocks noGrp="1" noChangeArrowheads="1"/>
             <a:extLst>
               <a:ext uri="smNativeData">
-                <pr:smNativeData xmlns="" xmlns:pr="smNativeData" val="SMDATA_12_7hxgVxMAAAAlAAAAZAAAAA0AAAAAkAAAAEgAAACQAAAASAAAAAAAAAAAAAAAAAAAAAEAAABQAAAAAAAAAAAA4D8AAAAAAADgPwAAAAAAAOA/AAAAAAAA4D8AAAAAAADgPwAAAAAAAOA/AAAAAAAA4D8AAAAAAADgPwAAAAAAAOA/AAAAAAAA4D8CAAAAjAAAAAAAAAAAAAAA////DP///wgAAAAAAAAAAAAAAAAAAAAAAAAAAAAAAAAAAAAAZAAAAAEAAABAAAAAAAAAAAAAAAAAAAAAAAAAAAAAAAAAAAAAAAAAAAAAAAAAAAAAAAAAAAAAAAAAAAAAAAAAAAAAAAAAAAAAAAAAAAAAAAAAAAAAAAAAAAAAAAAAAAAAFAAAADwAAAAAAAAAAAAAAAZJjAkUAAAAAQAAABQAAAAUAAAAFAAAAAEAAAAAAAAAZAAAAGQAAAAAAAAAZAAAAGQAAAAVAAAAYAAAAAAAAAAAAAAADwAAACADAAAAAAAAAAAAAAEAAACgMgAAVgcAAKr4//8BAAAAf39/AAEAAABkAAAAAAAAABQAAABAHwAAAAAAACYAAAAAAAAAwOD//wAAAAAmAAAAZAAAABYAAABMAAAAAAAAAAAAAAAEAAAAAAAAAAEAAACWlpYKAAAAACgAAAAoAAAAZAAAAGQAAAAAAAAAzMzMAAAAAABQAAAAUAAAAGQAAABkAAAAAAAAABcAAAAUAAAAAAAAAAAAAAD/fwAA/38AAAAAAAAJAAAABAAAAAAAAAAMAAAAEAAAAAAAAAAAAAAAAAAAAAAAAAAeAAAAaAAAAAAAAAAAAAAAAAAAAAAAAAAAAAAAECcAABAnAAAAAAAAAAAAAAAAAAAAAAAAAAAAAAAAAAAAAAAAAAAAABQAAAAAAAAAwMD/AAAAAABkAAAAMgAAAAAAAABkAAAAAAAAAH9/fwAKAAAAHwAAAFQAAAAAAAAFAAAAAQAAAAAAAAAAAAAAAAAAAAAAAAAAAAAAAAAAAAAAAAAAAAAAAn9/fwAAAAADzMzMAMDA/wB/f38AAAAAAAAAAAAAAAAAAAAAAAAAAAAhAAAAGAAAABQAAAA4BAAAwAMAANAvAAAIBwAAEAAAAA=="/>
+                <pr:smNativeData xmlns:pr="smNativeData" xmlns="" val="SMDATA_12_7hxgVxMAAAAlAAAAZAAAAA0AAAAAkAAAAEgAAACQAAAASAAAAAAAAAAAAAAAAAAAAAEAAABQAAAAAAAAAAAA4D8AAAAAAADgPwAAAAAAAOA/AAAAAAAA4D8AAAAAAADgPwAAAAAAAOA/AAAAAAAA4D8AAAAAAADgPwAAAAAAAOA/AAAAAAAA4D8CAAAAjAAAAAAAAAAAAAAA////DP///wgAAAAAAAAAAAAAAAAAAAAAAAAAAAAAAAAAAAAAZAAAAAEAAABAAAAAAAAAAAAAAAAAAAAAAAAAAAAAAAAAAAAAAAAAAAAAAAAAAAAAAAAAAAAAAAAAAAAAAAAAAAAAAAAAAAAAAAAAAAAAAAAAAAAAAAAAAAAAAAAAAAAAFAAAADwAAAAAAAAAAAAAAAZJjAkUAAAAAQAAABQAAAAUAAAAFAAAAAEAAAAAAAAAZAAAAGQAAAAAAAAAZAAAAGQAAAAVAAAAYAAAAAAAAAAAAAAADwAAACADAAAAAAAAAAAAAAEAAACgMgAAVgcAAKr4//8BAAAAf39/AAEAAABkAAAAAAAAABQAAABAHwAAAAAAACYAAAAAAAAAwOD//wAAAAAmAAAAZAAAABYAAABMAAAAAAAAAAAAAAAEAAAAAAAAAAEAAACWlpYKAAAAACgAAAAoAAAAZAAAAGQAAAAAAAAAzMzMAAAAAABQAAAAUAAAAGQAAABkAAAAAAAAABcAAAAUAAAAAAAAAAAAAAD/fwAA/38AAAAAAAAJAAAABAAAAAAAAAAMAAAAEAAAAAAAAAAAAAAAAAAAAAAAAAAeAAAAaAAAAAAAAAAAAAAAAAAAAAAAAAAAAAAAECcAABAnAAAAAAAAAAAAAAAAAAAAAAAAAAAAAAAAAAAAAAAAAAAAABQAAAAAAAAAwMD/AAAAAABkAAAAMgAAAAAAAABkAAAAAAAAAH9/fwAKAAAAHwAAAFQAAAAAAAAFAAAAAQAAAAAAAAAAAAAAAAAAAAAAAAAAAAAAAAAAAAAAAAAAAAAAAn9/fwAAAAADzMzMAMDA/wB/f38AAAAAAAAAAAAAAAAAAAAAAAAAAAAhAAAAGAAAABQAAAA4BAAAwAMAANAvAAAIBwAAEAAAAA=="/>
               </a:ext>
             </a:extLst>
           </p:cNvSpPr>
@@ -1627,7 +1627,7 @@
             <a:spLocks noGrp="1" noChangeArrowheads="1"/>
             <a:extLst>
               <a:ext uri="smNativeData">
-                <pr:smNativeData xmlns="" xmlns:pr="smNativeData" val="SMDATA_12_7hxgVxMAAAAlAAAAZAAAAA0AAAAAkAAAAEgAAACQAAAASAAAAAAAAAABAAAAAAAAAAEAAABQAAAAAAAAAAAA4D8AAAAAAADgPwAAAAAAAOA/AAAAAAAA4D8AAAAAAADgPwAAAAAAAOA/AAAAAAAA4D8AAAAAAADgPwAAAAAAAOA/AAAAAAAA4D8CAAAAjAAAAAAAAAAAAAAA////AP///wgAAAAAAAAAAAAAAAAAAAAAAAAAAAAAAAAAAAAAeAAAAAEAAABAAAAAAAAAAAAAAABaAAAAAAAAAAAAAAAAAAAAAAAAAAAAAAAAAAAAAAAAAAAAAAAAAAAAAAAAAAAAAAAAAAAAAAAAAAAAAAAAAAAAAAAAAAAAAAAAAAAAFAAAADwAAAAAAAAAAAAAAAAAAAAPAAAAAQAAACMAAAAjAAAAIwAAAB4AAAAAAAAAZAAAAGQAAAAAAAAAZAAAAGQAAAAVAAAAYAAAAAAAAAAAAAAADwAAACADAAAAAAAAAAAAAAEAAACgMgAAVgcAAKr4//8BAAAAf39/AAEAAABkAAAAAAAAABQAAABAHwAAAAAAACYAAAAAAAAAwOD//wAAAAAmAAAAZAAAABYAAABMAAAAAAAAAAAAAAAEAAAAAAAAAAEAAADn5uYKAAAAACgAAAAoAAAAZAAAAGQAAAAAAAAAzMzMAAAAAABQAAAAUAAAAGQAAABkAAAAAAAAABcAAAAUAAAAAAAAAAAAAAD/fwAA/38AAAAAAAAJAAAABAAAAAAAAAAMAAAAEAAAAAAAAAAAAAAAAAAAAAAAAAAeAAAAaAAAAAAAAAAAAAAAAAAAAAAAAAAAAAAAECcAABAnAAAAAAAAAAAAAAAAAAAAAAAAAAAAAAAAAAAAAAAAAAAAABQAAAAAAAAAwMD/AAAAAABkAAAAMgAAAAAAAABkAAAAAAAAAH9/fwAKAAAAHwAAAFQAAAD///8AAAAAAQAAAAAAAAAAAAAAAAAAAAAAAAAAAAAAAAAAAAAAAAAAAAAAAH9/fwAAAAADzMzMAMDA/wB/f38AAAAAAAAAAAAAAAAAAAAAAAAAAAAhAAAAGAAAABQAAAAoBQAAPwIAANhFAABnCgAAEAAAAA=="/>
+                <pr:smNativeData xmlns:pr="smNativeData" xmlns="" val="SMDATA_12_7hxgVxMAAAAlAAAAZAAAAA0AAAAAkAAAAEgAAACQAAAASAAAAAAAAAABAAAAAAAAAAEAAABQAAAAAAAAAAAA4D8AAAAAAADgPwAAAAAAAOA/AAAAAAAA4D8AAAAAAADgPwAAAAAAAOA/AAAAAAAA4D8AAAAAAADgPwAAAAAAAOA/AAAAAAAA4D8CAAAAjAAAAAAAAAAAAAAA////AP///wgAAAAAAAAAAAAAAAAAAAAAAAAAAAAAAAAAAAAAeAAAAAEAAABAAAAAAAAAAAAAAABaAAAAAAAAAAAAAAAAAAAAAAAAAAAAAAAAAAAAAAAAAAAAAAAAAAAAAAAAAAAAAAAAAAAAAAAAAAAAAAAAAAAAAAAAAAAAAAAAAAAAFAAAADwAAAAAAAAAAAAAAAAAAAAPAAAAAQAAACMAAAAjAAAAIwAAAB4AAAAAAAAAZAAAAGQAAAAAAAAAZAAAAGQAAAAVAAAAYAAAAAAAAAAAAAAADwAAACADAAAAAAAAAAAAAAEAAACgMgAAVgcAAKr4//8BAAAAf39/AAEAAABkAAAAAAAAABQAAABAHwAAAAAAACYAAAAAAAAAwOD//wAAAAAmAAAAZAAAABYAAABMAAAAAAAAAAAAAAAEAAAAAAAAAAEAAADn5uYKAAAAACgAAAAoAAAAZAAAAGQAAAAAAAAAzMzMAAAAAABQAAAAUAAAAGQAAABkAAAAAAAAABcAAAAUAAAAAAAAAAAAAAD/fwAA/38AAAAAAAAJAAAABAAAAAAAAAAMAAAAEAAAAAAAAAAAAAAAAAAAAAAAAAAeAAAAaAAAAAAAAAAAAAAAAAAAAAAAAAAAAAAAECcAABAnAAAAAAAAAAAAAAAAAAAAAAAAAAAAAAAAAAAAAAAAAAAAABQAAAAAAAAAwMD/AAAAAABkAAAAMgAAAAAAAABkAAAAAAAAAH9/fwAKAAAAHwAAAFQAAAD///8AAAAAAQAAAAAAAAAAAAAAAAAAAAAAAAAAAAAAAAAAAAAAAAAAAAAAAH9/fwAAAAADzMzMAMDA/wB/f38AAAAAAAAAAAAAAAAAAAAAAAAAAAAhAAAAGAAAABQAAAAoBQAAPwIAANhFAABnCgAAEAAAAA=="/>
               </a:ext>
             </a:extLst>
           </p:cNvSpPr>
@@ -1674,7 +1674,7 @@
             <a:spLocks noGrp="1" noChangeArrowheads="1"/>
             <a:extLst>
               <a:ext uri="smNativeData">
-                <pr:smNativeData xmlns="" xmlns:pr="smNativeData" val="SMDATA_12_7hxgVxMAAAAlAAAAZAAAAA0AAAAAkAAAAEgAAACQAAAASAAAAAAAAAAAAAAAAAAAAAEAAABQAAAAAAAAAAAA4D8AAAAAAADgPwAAAAAAAOA/AAAAAAAA4D8AAAAAAADgPwAAAAAAAOA/AAAAAAAA4D8AAAAAAADgPwAAAAAAAOA/AAAAAAAA4D8CAAAAjAAAAAAAAAAAAAAA////AP///wgAAAAAAAAAAAAAAAAAAAAAAAAAAAAAAAAAAAAAeAAAAAEAAABAAAAAAAAAAAAAAABaAAAAAAAAAAAAAAAAAAAAAAAAAAAAAAAAAAAAAAAAAAAAAAAAAAAAAAAAAAAAAAAAAAAAAAAAAAAAAAAAAAAAAAAAAAAAAAAAAAAAFAAAADwAAAAAAAAAAAAAAAAAAAAPAAAAAQAAACMAAAAjAAAAIwAAAB4AAAAAAAAAZAAAAGQAAAAAAAAAZAAAAGQAAAAVAAAAYAAAAAAAAAAAAAAADwAAACADAAAAAAAAAAAAAAEAAACgMgAAVgcAAKr4//8BAAAAf39/AAEAAABkAAAAAAAAABQAAABAHwAAAAAAACYAAAAAAAAAwOD//wAAAAAmAAAAZAAAABYAAABMAAAAAAAAAAAAAAAEAAAAAAAAAAEAAADn5uYKAAAAACgAAAAoAAAAZAAAAGQAAAAAAAAAzMzMAAAAAABQAAAAUAAAAGQAAABkAAAAAAAAABcAAAAUAAAAAAAAAAAAAAD/fwAA/38AAAAAAAAJAAAABAAAAAAAAAAMAAAAEAAAAAAAAAAAAAAAAAAAAAAAAAAeAAAAaAAAAAAAAAAAAAAAAAAAAAAAAAAAAAAAECcAABAnAAAAAAAAAAAAAAAAAAAAAAAAAAAAAAAAAAAAAAAAAAAAABQAAAAAAAAAwMD/AAAAAABkAAAAMgAAAAAAAABkAAAAAAAAAH9/fwAKAAAAHwAAAFQAAAD///8AAAAAAQAAAAAAAAAAAAAAAAAAAAAAAAAAAAAAAAAAAAAAAAAAAAAAAH9/fwAAAAADzMzMAMDA/wB/f38AAAAAAAAAAAAAAAAAAAAAAAAAAAAhAAAAGAAAABQAAAAoBQAAOwsAANhFAAAAJgAAEAAAAA=="/>
+                <pr:smNativeData xmlns:pr="smNativeData" xmlns="" val="SMDATA_12_7hxgVxMAAAAlAAAAZAAAAA0AAAAAkAAAAEgAAACQAAAASAAAAAAAAAAAAAAAAAAAAAEAAABQAAAAAAAAAAAA4D8AAAAAAADgPwAAAAAAAOA/AAAAAAAA4D8AAAAAAADgPwAAAAAAAOA/AAAAAAAA4D8AAAAAAADgPwAAAAAAAOA/AAAAAAAA4D8CAAAAjAAAAAAAAAAAAAAA////AP///wgAAAAAAAAAAAAAAAAAAAAAAAAAAAAAAAAAAAAAeAAAAAEAAABAAAAAAAAAAAAAAABaAAAAAAAAAAAAAAAAAAAAAAAAAAAAAAAAAAAAAAAAAAAAAAAAAAAAAAAAAAAAAAAAAAAAAAAAAAAAAAAAAAAAAAAAAAAAAAAAAAAAFAAAADwAAAAAAAAAAAAAAAAAAAAPAAAAAQAAACMAAAAjAAAAIwAAAB4AAAAAAAAAZAAAAGQAAAAAAAAAZAAAAGQAAAAVAAAAYAAAAAAAAAAAAAAADwAAACADAAAAAAAAAAAAAAEAAACgMgAAVgcAAKr4//8BAAAAf39/AAEAAABkAAAAAAAAABQAAABAHwAAAAAAACYAAAAAAAAAwOD//wAAAAAmAAAAZAAAABYAAABMAAAAAAAAAAAAAAAEAAAAAAAAAAEAAADn5uYKAAAAACgAAAAoAAAAZAAAAGQAAAAAAAAAzMzMAAAAAABQAAAAUAAAAGQAAABkAAAAAAAAABcAAAAUAAAAAAAAAAAAAAD/fwAA/38AAAAAAAAJAAAABAAAAAAAAAAMAAAAEAAAAAAAAAAAAAAAAAAAAAAAAAAeAAAAaAAAAAAAAAAAAAAAAAAAAAAAAAAAAAAAECcAABAnAAAAAAAAAAAAAAAAAAAAAAAAAAAAAAAAAAAAAAAAAAAAABQAAAAAAAAAwMD/AAAAAABkAAAAMgAAAAAAAABkAAAAAAAAAH9/fwAKAAAAHwAAAFQAAAD///8AAAAAAQAAAAAAAAAAAAAAAAAAAAAAAAAAAAAAAAAAAAAAAAAAAAAAAH9/fwAAAAADzMzMAMDA/wB/f38AAAAAAAAAAAAAAAAAAAAAAAAAAAAhAAAAGAAAABQAAAAoBQAAOwsAANhFAAAAJgAAEAAAAA=="/>
               </a:ext>
             </a:extLst>
           </p:cNvSpPr>
@@ -1721,7 +1721,7 @@
             <a:spLocks noGrp="1" noChangeArrowheads="1"/>
             <a:extLst>
               <a:ext uri="smNativeData">
-                <pr:smNativeData xmlns="" xmlns:pr="smNativeData" val="SMDATA_12_7hxgVxMAAAAlAAAAZAAAAA0AAAAAkAAAAEgAAACQAAAASAAAAAAAAAABAAAAAAAAAAEAAABQAAAAAAAAAAAA4D8AAAAAAADgPwAAAAAAAOA/AAAAAAAA4D8AAAAAAADgPwAAAAAAAOA/AAAAAAAA4D8AAAAAAADgPwAAAAAAAOA/AAAAAAAA4D8CAAAAjAAAAAAAAAAAAAAA////AP///wgAAAAAAAAAAAAAAAAAAAAAAAAAAAAAAAAAAAAAeAAAAAEAAABAAAAAAAAAAAAAAABaAAAAAAAAAAAAAAAAAAAAAAAAAAAAAAAAAAAAAAAAAAAAAAAAAAAAAAAAAAAAAAAAAAAAAAAAAAAAAAAAAAAAAAAAAAAAAAAAAAAAFAAAADwAAAAAAAAAAAAAAAAAAAAPAAAAAQAAACMAAAAjAAAAIwAAAB4AAAAAAAAAZAAAAGQAAAAAAAAAZAAAAGQAAAAVAAAAYAAAAAAAAAAAAAAADwAAACADAAAAAAAAAAAAAAEAAACgMgAAVgcAAKr4//8BAAAAf39/AAEAAABkAAAAAAAAABQAAABAHwAAAAAAACYAAAAAAAAAwOD//wAAAAAmAAAAZAAAABYAAABMAAAAAAAAAAAAAAAEAAAAAAAAAAEAAADn5uYKAAAAACgAAAAoAAAAZAAAAGQAAAAAAAAAzMzMAAAAAABQAAAAUAAAAGQAAABkAAAAAAAAABcAAAAUAAAAAAAAAAAAAAD/fwAA/38AAAAAAAAJAAAABAAAAAAAAAAMAAAAEAAAAAAAAAAAAAAAAAAAAAAAAAAeAAAAaAAAAAAAAAAAAAAAAAAAAAAAAAAAAAAAECcAABAnAAAAAAAAAAAAAAAAAAAAAAAAAAAAAAAAAAAAAAAAAAAAABQAAAAAAAAAwMD/AAAAAABkAAAAMgAAAAAAAABkAAAAAAAAAH9/fwAKAAAAHwAAAFQAAAD///8A////AQAAAAAAAAAAAAAAAAAAAAAAAAAAAAAAAAAAAAAAAAAAAAAAAH9/fwDn5uYDzMzMAMDA/wB/f38AAAAAAAAAAAAAAAAAAAAAAAAAAAAhAAAAGAAAABQAAAD4NAAAGicAANhFAABZKQAAEAAAAA=="/>
+                <pr:smNativeData xmlns:pr="smNativeData" xmlns="" val="SMDATA_12_7hxgVxMAAAAlAAAAZAAAAA0AAAAAkAAAAEgAAACQAAAASAAAAAAAAAABAAAAAAAAAAEAAABQAAAAAAAAAAAA4D8AAAAAAADgPwAAAAAAAOA/AAAAAAAA4D8AAAAAAADgPwAAAAAAAOA/AAAAAAAA4D8AAAAAAADgPwAAAAAAAOA/AAAAAAAA4D8CAAAAjAAAAAAAAAAAAAAA////AP///wgAAAAAAAAAAAAAAAAAAAAAAAAAAAAAAAAAAAAAeAAAAAEAAABAAAAAAAAAAAAAAABaAAAAAAAAAAAAAAAAAAAAAAAAAAAAAAAAAAAAAAAAAAAAAAAAAAAAAAAAAAAAAAAAAAAAAAAAAAAAAAAAAAAAAAAAAAAAAAAAAAAAFAAAADwAAAAAAAAAAAAAAAAAAAAPAAAAAQAAACMAAAAjAAAAIwAAAB4AAAAAAAAAZAAAAGQAAAAAAAAAZAAAAGQAAAAVAAAAYAAAAAAAAAAAAAAADwAAACADAAAAAAAAAAAAAAEAAACgMgAAVgcAAKr4//8BAAAAf39/AAEAAABkAAAAAAAAABQAAABAHwAAAAAAACYAAAAAAAAAwOD//wAAAAAmAAAAZAAAABYAAABMAAAAAAAAAAAAAAAEAAAAAAAAAAEAAADn5uYKAAAAACgAAAAoAAAAZAAAAGQAAAAAAAAAzMzMAAAAAABQAAAAUAAAAGQAAABkAAAAAAAAABcAAAAUAAAAAAAAAAAAAAD/fwAA/38AAAAAAAAJAAAABAAAAAAAAAAMAAAAEAAAAAAAAAAAAAAAAAAAAAAAAAAeAAAAaAAAAAAAAAAAAAAAAAAAAAAAAAAAAAAAECcAABAnAAAAAAAAAAAAAAAAAAAAAAAAAAAAAAAAAAAAAAAAAAAAABQAAAAAAAAAwMD/AAAAAABkAAAAMgAAAAAAAABkAAAAAAAAAH9/fwAKAAAAHwAAAFQAAAD///8A////AQAAAAAAAAAAAAAAAAAAAAAAAAAAAAAAAAAAAAAAAAAAAAAAAH9/fwDn5uYDzMzMAMDA/wB/f38AAAAAAAAAAAAAAAAAAAAAAAAAAAAhAAAAGAAAABQAAAD4NAAAGicAANhFAABZKQAAEAAAAA=="/>
               </a:ext>
             </a:extLst>
           </p:cNvSpPr>
@@ -1778,7 +1778,7 @@
             <a:spLocks noGrp="1" noChangeArrowheads="1"/>
             <a:extLst>
               <a:ext uri="smNativeData">
-                <pr:smNativeData xmlns="" xmlns:pr="smNativeData" val="SMDATA_12_7hxgVxMAAAAlAAAAZAAAAA0AAAAAkAAAAEgAAACQAAAASAAAAAAAAAABAAAAAAAAAAEAAABQAAAAAAAAAAAA4D8AAAAAAADgPwAAAAAAAOA/AAAAAAAA4D8AAAAAAADgPwAAAAAAAOA/AAAAAAAA4D8AAAAAAADgPwAAAAAAAOA/AAAAAAAA4D8CAAAAjAAAAAAAAAAAAAAA////AP///wgAAAAAAAAAAAAAAAAAAAAAAAAAAAAAAAAAAAAAeAAAAAEAAABAAAAAAAAAAAAAAABaAAAAAAAAAAAAAAAAAAAAAAAAAAAAAAAAAAAAAAAAAAAAAAAAAAAAAAAAAAAAAAAAAAAAAAAAAAAAAAAAAAAAAAAAAAAAAAAAAAAAFAAAADwAAAAAAAAAAAAAAAAAAAAPAAAAAQAAACMAAAAjAAAAIwAAAB4AAAAAAAAAZAAAAGQAAAAAAAAAZAAAAGQAAAAVAAAAYAAAAAAAAAAAAAAADwAAACADAAAAAAAAAAAAAAEAAACgMgAAVgcAAKr4//8BAAAAf39/AAEAAABkAAAAAAAAABQAAABAHwAAAAAAACYAAAAAAAAAwOD//wAAAAAmAAAAZAAAABYAAABMAAAAAAAAAAAAAAAEAAAAAAAAAAEAAADn5uYKAAAAACgAAAAoAAAAZAAAAGQAAAAAAAAAzMzMAAAAAABQAAAAUAAAAGQAAABkAAAAAAAAABcAAAAUAAAAAAAAAAAAAAD/fwAA/38AAAAAAAAJAAAABAAAAAAAAAAMAAAAEAAAAAAAAAAAAAAAAAAAAAAAAAAeAAAAaAAAAAAAAAAAAAAAAAAAAAAAAAAAAAAAECcAABAnAAAAAAAAAAAAAAAAAAAAAAAAAAAAAAAAAAAAAAAAAAAAABQAAAAAAAAAwMD/AAAAAABkAAAAMgAAAAAAAABkAAAAAAAAAH9/fwAKAAAAHwAAAFQAAAD///8A////AQAAAAAAAAAAAAAAAAAAAAAAAAAAAAAAAAAAAAAAAAAAAAAAAH9/fwDn5uYDzMzMAMDA/wB/f38AAAAAAAAAAAAAAAAAAAAAAAAAAAAhAAAAGAAAABQAAADYGAAAGicAACgyAABZKQAAEAAAAA=="/>
+                <pr:smNativeData xmlns:pr="smNativeData" xmlns="" val="SMDATA_12_7hxgVxMAAAAlAAAAZAAAAA0AAAAAkAAAAEgAAACQAAAASAAAAAAAAAABAAAAAAAAAAEAAABQAAAAAAAAAAAA4D8AAAAAAADgPwAAAAAAAOA/AAAAAAAA4D8AAAAAAADgPwAAAAAAAOA/AAAAAAAA4D8AAAAAAADgPwAAAAAAAOA/AAAAAAAA4D8CAAAAjAAAAAAAAAAAAAAA////AP///wgAAAAAAAAAAAAAAAAAAAAAAAAAAAAAAAAAAAAAeAAAAAEAAABAAAAAAAAAAAAAAABaAAAAAAAAAAAAAAAAAAAAAAAAAAAAAAAAAAAAAAAAAAAAAAAAAAAAAAAAAAAAAAAAAAAAAAAAAAAAAAAAAAAAAAAAAAAAAAAAAAAAFAAAADwAAAAAAAAAAAAAAAAAAAAPAAAAAQAAACMAAAAjAAAAIwAAAB4AAAAAAAAAZAAAAGQAAAAAAAAAZAAAAGQAAAAVAAAAYAAAAAAAAAAAAAAADwAAACADAAAAAAAAAAAAAAEAAACgMgAAVgcAAKr4//8BAAAAf39/AAEAAABkAAAAAAAAABQAAABAHwAAAAAAACYAAAAAAAAAwOD//wAAAAAmAAAAZAAAABYAAABMAAAAAAAAAAAAAAAEAAAAAAAAAAEAAADn5uYKAAAAACgAAAAoAAAAZAAAAGQAAAAAAAAAzMzMAAAAAABQAAAAUAAAAGQAAABkAAAAAAAAABcAAAAUAAAAAAAAAAAAAAD/fwAA/38AAAAAAAAJAAAABAAAAAAAAAAMAAAAEAAAAAAAAAAAAAAAAAAAAAAAAAAeAAAAaAAAAAAAAAAAAAAAAAAAAAAAAAAAAAAAECcAABAnAAAAAAAAAAAAAAAAAAAAAAAAAAAAAAAAAAAAAAAAAAAAABQAAAAAAAAAwMD/AAAAAABkAAAAMgAAAAAAAABkAAAAAAAAAH9/fwAKAAAAHwAAAFQAAAD///8A////AQAAAAAAAAAAAAAAAAAAAAAAAAAAAAAAAAAAAAAAAAAAAAAAAH9/fwDn5uYDzMzMAMDA/wB/f38AAAAAAAAAAAAAAAAAAAAAAAAAAAAhAAAAGAAAABQAAADYGAAAGicAACgyAABZKQAAEAAAAA=="/>
               </a:ext>
             </a:extLst>
           </p:cNvSpPr>
@@ -1832,7 +1832,7 @@
             <a:spLocks noGrp="1" noChangeArrowheads="1"/>
             <a:extLst>
               <a:ext uri="smNativeData">
-                <pr:smNativeData xmlns="" xmlns:pr="smNativeData" val="SMDATA_12_7hxgVxMAAAAlAAAAZAAAAA0AAAAAkAAAAEgAAACQAAAASAAAAAAAAAABAAAAAAAAAAEAAABQAAAAAAAAAAAA4D8AAAAAAADgPwAAAAAAAOA/AAAAAAAA4D8AAAAAAADgPwAAAAAAAOA/AAAAAAAA4D8AAAAAAADgPwAAAAAAAOA/AAAAAAAA4D8CAAAAjAAAAAAAAAAAAAAA////AP///wgAAAAAAAAAAAAAAAAAAAAAAAAAAAAAAAAAAAAAeAAAAAEAAABAAAAAAAAAAAAAAABaAAAAAAAAAAAAAAAAAAAAAAAAAAAAAAAAAAAAAAAAAAAAAAAAAAAAAAAAAAAAAAAAAAAAAAAAAAAAAAAAAAAAAAAAAAAAAAAAAAAAFAAAADwAAAAAAAAAAAAAAAAAAAAPAAAAAQAAACMAAAAjAAAAIwAAAB4AAAAAAAAAZAAAAGQAAAAAAAAAZAAAAGQAAAAVAAAAYAAAAAAAAAAAAAAADwAAACADAAAAAAAAAAAAAAEAAACgMgAAVgcAAKr4//8BAAAAf39/AAEAAABkAAAAAAAAABQAAABAHwAAAAAAACYAAAAAAAAAwOD//wAAAAAmAAAAZAAAABYAAABMAAAAAAAAAAAAAAAEAAAAAAAAAAEAAADn5uYKAAAAACgAAAAoAAAAZAAAAGQAAAAAAAAAzMzMAAAAAABQAAAAUAAAAGQAAABkAAAAAAAAABcAAAAUAAAAAAAAAAAAAAD/fwAA/38AAAAAAAAJAAAABAAAAAAAAAAMAAAAEAAAAAAAAAAAAAAAAAAAAAAAAAAeAAAAaAAAAAAAAAAAAAAAAAAAAAAAAAAAAAAAECcAABAnAAAAAAAAAAAAAAAAAAAAAAAAAAAAAAAAAAAAAAAAAAAAABQAAAAAAAAAwMD/AAAAAABkAAAAMgAAAAAAAABkAAAAAAAAAH9/fwAKAAAAHwAAAFQAAAD///8A////AQAAAAAAAAAAAAAAAAAAAAAAAAAAAAAAAAAAAAAAAAAAAAAAAH9/fwDn5uYDzMzMAMDA/wB/f38AAAAAAAAAAAAAAAAAAAAAAAAAAAAhAAAAGAAAABQAAAAoBQAAGicAAAgWAABZKQAAEAAAAA=="/>
+                <pr:smNativeData xmlns:pr="smNativeData" xmlns="" val="SMDATA_12_7hxgVxMAAAAlAAAAZAAAAA0AAAAAkAAAAEgAAACQAAAASAAAAAAAAAABAAAAAAAAAAEAAABQAAAAAAAAAAAA4D8AAAAAAADgPwAAAAAAAOA/AAAAAAAA4D8AAAAAAADgPwAAAAAAAOA/AAAAAAAA4D8AAAAAAADgPwAAAAAAAOA/AAAAAAAA4D8CAAAAjAAAAAAAAAAAAAAA////AP///wgAAAAAAAAAAAAAAAAAAAAAAAAAAAAAAAAAAAAAeAAAAAEAAABAAAAAAAAAAAAAAABaAAAAAAAAAAAAAAAAAAAAAAAAAAAAAAAAAAAAAAAAAAAAAAAAAAAAAAAAAAAAAAAAAAAAAAAAAAAAAAAAAAAAAAAAAAAAAAAAAAAAFAAAADwAAAAAAAAAAAAAAAAAAAAPAAAAAQAAACMAAAAjAAAAIwAAAB4AAAAAAAAAZAAAAGQAAAAAAAAAZAAAAGQAAAAVAAAAYAAAAAAAAAAAAAAADwAAACADAAAAAAAAAAAAAAEAAACgMgAAVgcAAKr4//8BAAAAf39/AAEAAABkAAAAAAAAABQAAABAHwAAAAAAACYAAAAAAAAAwOD//wAAAAAmAAAAZAAAABYAAABMAAAAAAAAAAAAAAAEAAAAAAAAAAEAAADn5uYKAAAAACgAAAAoAAAAZAAAAGQAAAAAAAAAzMzMAAAAAABQAAAAUAAAAGQAAABkAAAAAAAAABcAAAAUAAAAAAAAAAAAAAD/fwAA/38AAAAAAAAJAAAABAAAAAAAAAAMAAAAEAAAAAAAAAAAAAAAAAAAAAAAAAAeAAAAaAAAAAAAAAAAAAAAAAAAAAAAAAAAAAAAECcAABAnAAAAAAAAAAAAAAAAAAAAAAAAAAAAAAAAAAAAAAAAAAAAABQAAAAAAAAAwMD/AAAAAABkAAAAMgAAAAAAAABkAAAAAAAAAH9/fwAKAAAAHwAAAFQAAAD///8A////AQAAAAAAAAAAAAAAAAAAAAAAAAAAAAAAAAAAAAAAAAAAAAAAAH9/fwDn5uYDzMzMAMDA/wB/f38AAAAAAAAAAAAAAAAAAAAAAAAAAAAhAAAAGAAAABQAAAAoBQAAGicAAAgWAABZKQAAEAAAAA=="/>
               </a:ext>
             </a:extLst>
           </p:cNvSpPr>
@@ -2631,7 +2631,7 @@
           <p:cNvGrpSpPr>
             <a:extLst>
               <a:ext uri="smNativeData">
-                <pr:smNativeData xmlns="" xmlns:pr="smNativeData" val="SMDATA_6_7hxgVxMAAAAlAAAAAQAAAA8BAAAAkAAAAEgAAACQAAAASAAAAAAAAAAAAAAAAAAAABcAAAAUAAAAAAAAAAAAAAD/fwAA/38AAAAAAAAJAAAABAAAAAAAAAAMAAAAEAAAAAAAAAAAAAAAAAAAAAAAAAAfAAAAVAAAAAAAAAAAAAAAAAAAAAAAAAAAAAAAAAAAAAAAAAAAAAAAAAAAAAAAAAAAAAAAAAAAAAAAAAAAAAAAAAAAAAAAAAAAAAAAAAAAAAAAAAAAAAAAAAAAACEAAAAYAAAAFAAAAAAAAACEIQAAAEsAAEMmAAAQAAAA"/>
+                <pr:smNativeData xmlns:pr="smNativeData" xmlns="" val="SMDATA_6_7hxgVxMAAAAlAAAAAQAAAA8BAAAAkAAAAEgAAACQAAAASAAAAAAAAAAAAAAAAAAAABcAAAAUAAAAAAAAAAAAAAD/fwAA/38AAAAAAAAJAAAABAAAAAAAAAAMAAAAEAAAAAAAAAAAAAAAAAAAAAAAAAAfAAAAVAAAAAAAAAAAAAAAAAAAAAAAAAAAAAAAAAAAAAAAAAAAAAAAAAAAAAAAAAAAAAAAAAAAAAAAAAAAAAAAAAAAAAAAAAAAAAAAAAAAAAAAAAAAAAAAAAAAACEAAAAYAAAAFAAAAAAAAACEIQAAAEsAAEMmAAAQAAAA"/>
               </a:ext>
             </a:extLst>
           </p:cNvGrpSpPr>
@@ -2681,7 +2681,7 @@
             <p:cNvSpPr>
               <a:extLst>
                 <a:ext uri="smNativeData">
-                  <pr:smNativeData xmlns="" xmlns:pr="smNativeData" val="SMDATA_12_7hxgVxMAAAAlAAAAZAAAAA0AAAAAkAAAAEgAAACQAAAASAAAAAAAAAABAAAAAAAAAAEAAABQAAAAAAAAAAAA4D8AAAAAAADgPwAAAAAAAOA/AAAAAAAA4D8AAAAAAADgPwAAAAAAAOA/AAAAAAAA4D8AAAAAAADgPwAAAAAAAOA/AAAAAAAA4D8CAAAAjAAAAAEAAAAAAAAAVII1AP///wgAAAAAAAAAAAAAAAAAAAAAAAAAAAAAAAAAAAAAeAAAAAEAAABAAAAAAAAAAAAAAABaAAAAAAAAAAAAAAAAAAAAAAAAAAAAAAAAAAAAAAAAAAAAAAAAAAAAAAAAAAAAAAAAAAAAAAAAAAAAAAAAAAAAAAAAAAAAAAAAAAAAFAAAADwAAAAAAAAAAAAAAAZJjAkUAAAAAQAAABQAAAAUAAAAFAAAAAEAAAAAAAAAZAAAAGQAAAAAAAAAZAAAAGQAAAAVAAAAYAAAAAAAAAAAAAAADwAAACADAAAAAAAAAAAAAAEAAACgMgAAVgcAAKr4//8BAAAAf39/AAEAAABkAAAAAAAAABQAAABAHwAAAAAAACYAAAAAAAAAwOD//wAAAAAmAAAAZAAAABYAAABMAAAAAAAAAAAAAAAEAAAAAAAAAAEAAACWlpYKAAAAACgAAAAoAAAAZAAAAGQAAAAAAAAAzMzMAAAAAABQAAAAUAAAAGQAAABkAAAAAAAAABcAAAAUAAAAAAAAAAAAAAD/fwAA/38AAAAAAAAJAAAABAAAAAAAAAAMAAAAEAAAAAAAAAAAAAAAAAAAAAAAAAAeAAAAaAAAAAAAAAAAAAAAAAAAAAAAAAAAAAAAECcAABAnAAAAAAAAAAAAAAAAAAAAAAAAAAAAAAAAAAAAAAAAAAAAABQAAAAAAAAAwMD/AAAAAABkAAAAMgAAAAAAAABkAAAAAAAAAH9/fwAKAAAAHwAAAFQAAABUgjUA////AQAAAAAAAAAAAAAAAAAAAAAAAAAAAAAAAAAAAAAAAAAAAAAAAn9/fwDn5uYDzMzMAMDA/wB/f38AAAAAAAAAAAAAAAAAAAAAAAAAAAAhAAAAGAAAABQAAADLEgAAhiEAAABLAABDJgAAAAAAAA=="/>
+                  <pr:smNativeData xmlns:pr="smNativeData" xmlns="" val="SMDATA_12_7hxgVxMAAAAlAAAAZAAAAA0AAAAAkAAAAEgAAACQAAAASAAAAAAAAAABAAAAAAAAAAEAAABQAAAAAAAAAAAA4D8AAAAAAADgPwAAAAAAAOA/AAAAAAAA4D8AAAAAAADgPwAAAAAAAOA/AAAAAAAA4D8AAAAAAADgPwAAAAAAAOA/AAAAAAAA4D8CAAAAjAAAAAEAAAAAAAAAVII1AP///wgAAAAAAAAAAAAAAAAAAAAAAAAAAAAAAAAAAAAAeAAAAAEAAABAAAAAAAAAAAAAAABaAAAAAAAAAAAAAAAAAAAAAAAAAAAAAAAAAAAAAAAAAAAAAAAAAAAAAAAAAAAAAAAAAAAAAAAAAAAAAAAAAAAAAAAAAAAAAAAAAAAAFAAAADwAAAAAAAAAAAAAAAZJjAkUAAAAAQAAABQAAAAUAAAAFAAAAAEAAAAAAAAAZAAAAGQAAAAAAAAAZAAAAGQAAAAVAAAAYAAAAAAAAAAAAAAADwAAACADAAAAAAAAAAAAAAEAAACgMgAAVgcAAKr4//8BAAAAf39/AAEAAABkAAAAAAAAABQAAABAHwAAAAAAACYAAAAAAAAAwOD//wAAAAAmAAAAZAAAABYAAABMAAAAAAAAAAAAAAAEAAAAAAAAAAEAAACWlpYKAAAAACgAAAAoAAAAZAAAAGQAAAAAAAAAzMzMAAAAAABQAAAAUAAAAGQAAABkAAAAAAAAABcAAAAUAAAAAAAAAAAAAAD/fwAA/38AAAAAAAAJAAAABAAAAAAAAAAMAAAAEAAAAAAAAAAAAAAAAAAAAAAAAAAeAAAAaAAAAAAAAAAAAAAAAAAAAAAAAAAAAAAAECcAABAnAAAAAAAAAAAAAAAAAAAAAAAAAAAAAAAAAAAAAAAAAAAAABQAAAAAAAAAwMD/AAAAAABkAAAAMgAAAAAAAABkAAAAAAAAAH9/fwAKAAAAHwAAAFQAAABUgjUA////AQAAAAAAAAAAAAAAAAAAAAAAAAAAAAAAAAAAAAAAAAAAAAAAAn9/fwDn5uYDzMzMAMDA/wB/f38AAAAAAAAAAAAAAAAAAAAAAAAAAAAhAAAAGAAAABQAAADLEgAAhiEAAABLAABDJgAAAAAAAA=="/>
                 </a:ext>
               </a:extLst>
             </p:cNvSpPr>
@@ -2832,7 +2832,7 @@
             <p:cNvSpPr>
               <a:extLst>
                 <a:ext uri="smNativeData">
-                  <pr:smNativeData xmlns="" xmlns:pr="smNativeData" val="SMDATA_12_7hxgVxMAAAAlAAAAZAAAAA0AAAAAkAAAAEgAAACQAAAASAAAAAAAAAABAAAAAAAAAAEAAABQAAAAAAAAAAAA4D8AAAAAAADgPwAAAAAAAOA/AAAAAAAA4D8AAAAAAADgPwAAAAAAAOA/AAAAAAAA4D8AAAAAAADgPwAAAAAAAOA/AAAAAAAA4D8CAAAAjAAAAAEAAAAAAAAA/8AAAP///wgAAAAAAAAAAAAAAAAAAAAAAAAAAAAAAAAAAAAAeAAAAAEAAABAAAAAAAAAAAAAAABaAAAAAAAAAAAAAAAAAAAAAAAAAAAAAAAAAAAAAAAAAAAAAAAAAAAAAAAAAAAAAAAAAAAAAAAAAAAAAAAAAAAAAAAAAAAAAAAAAAAAFAAAADwAAAAAAAAAAAAAAAZJjAkUAAAAAQAAABQAAAAUAAAAFAAAAAEAAAAAAAAAZAAAAGQAAAAAAAAAZAAAAGQAAAAVAAAAYAAAAAAAAAAAAAAADwAAACADAAAAAAAAAAAAAAEAAACgMgAAVgcAAKr4//8BAAAAf39/AAEAAABkAAAAAAAAABQAAABAHwAAAAAAACYAAAAAAAAAwOD//wAAAAAmAAAAZAAAABYAAABMAAAAAAAAAAAAAAAEAAAAAAAAAAEAAACWlpYKAAAAACgAAAAoAAAAZAAAAGQAAAAAAAAAzMzMAAAAAABQAAAAUAAAAGQAAABkAAAAAAAAABcAAAAUAAAAAAAAAAAAAAD/fwAA/38AAAAAAAAJAAAABAAAAAAAAAAMAAAAEAAAAAAAAAAAAAAAAAAAAAAAAAAeAAAAaAAAAAAAAAAAAAAAAAAAAAAAAAAAAAAAECcAABAnAAAAAAAAAAAAAAAAAAAAAAAAAAAAAAAAAAAAAAAAAAAAABQAAAAAAAAAwMD/AAAAAABkAAAAMgAAAAAAAABkAAAAAAAAAH9/fwAKAAAAHwAAAFQAAAD/wAAA////AQAAAAAAAAAAAAAAAAAAAAAAAAAAAAAAAAAAAAAAAAAAAAAAAn9/fwDn5uYDzMzMAMDA/wB/f38AAAAAAAAAAAAAAAAAAAAAAAAAAAAhAAAAGAAAABQAAAAAAAAAhCEAAMsSAABBJgAAAAAAAA=="/>
+                  <pr:smNativeData xmlns:pr="smNativeData" xmlns="" val="SMDATA_12_7hxgVxMAAAAlAAAAZAAAAA0AAAAAkAAAAEgAAACQAAAASAAAAAAAAAABAAAAAAAAAAEAAABQAAAAAAAAAAAA4D8AAAAAAADgPwAAAAAAAOA/AAAAAAAA4D8AAAAAAADgPwAAAAAAAOA/AAAAAAAA4D8AAAAAAADgPwAAAAAAAOA/AAAAAAAA4D8CAAAAjAAAAAEAAAAAAAAA/8AAAP///wgAAAAAAAAAAAAAAAAAAAAAAAAAAAAAAAAAAAAAeAAAAAEAAABAAAAAAAAAAAAAAABaAAAAAAAAAAAAAAAAAAAAAAAAAAAAAAAAAAAAAAAAAAAAAAAAAAAAAAAAAAAAAAAAAAAAAAAAAAAAAAAAAAAAAAAAAAAAAAAAAAAAFAAAADwAAAAAAAAAAAAAAAZJjAkUAAAAAQAAABQAAAAUAAAAFAAAAAEAAAAAAAAAZAAAAGQAAAAAAAAAZAAAAGQAAAAVAAAAYAAAAAAAAAAAAAAADwAAACADAAAAAAAAAAAAAAEAAACgMgAAVgcAAKr4//8BAAAAf39/AAEAAABkAAAAAAAAABQAAABAHwAAAAAAACYAAAAAAAAAwOD//wAAAAAmAAAAZAAAABYAAABMAAAAAAAAAAAAAAAEAAAAAAAAAAEAAACWlpYKAAAAACgAAAAoAAAAZAAAAGQAAAAAAAAAzMzMAAAAAABQAAAAUAAAAGQAAABkAAAAAAAAABcAAAAUAAAAAAAAAAAAAAD/fwAA/38AAAAAAAAJAAAABAAAAAAAAAAMAAAAEAAAAAAAAAAAAAAAAAAAAAAAAAAeAAAAaAAAAAAAAAAAAAAAAAAAAAAAAAAAAAAAECcAABAnAAAAAAAAAAAAAAAAAAAAAAAAAAAAAAAAAAAAAAAAAAAAABQAAAAAAAAAwMD/AAAAAABkAAAAMgAAAAAAAABkAAAAAAAAAH9/fwAKAAAAHwAAAFQAAAD/wAAA////AQAAAAAAAAAAAAAAAAAAAAAAAAAAAAAAAAAAAAAAAAAAAAAAAn9/fwDn5uYDzMzMAMDA/wB/f38AAAAAAAAAAAAAAAAAAAAAAAAAAAAhAAAAGAAAABQAAAAAAAAAhCEAAMsSAABBJgAAAAAAAA=="/>
                 </a:ext>
               </a:extLst>
             </p:cNvSpPr>
@@ -2985,7 +2985,7 @@
             <a:spLocks noGrp="1" noChangeArrowheads="1"/>
             <a:extLst>
               <a:ext uri="smNativeData">
-                <pr:smNativeData xmlns="" xmlns:pr="smNativeData" val="SMDATA_12_7hxgVxMAAAAlAAAAZAAAAA0AAAAAkAAAAEgAAACQAAAASAAAAAAAAAACAAAAAAAAAAEAAABQAAAAAAAAAAAA4D8AAAAAAADgPwAAAAAAAOA/AAAAAAAA4D8AAAAAAADgPwAAAAAAAOA/AAAAAAAA4D8AAAAAAADgPwAAAAAAAOA/AAAAAAAA4D8CAAAAjAAAAAAAAAAAAAAA////DP///wgAAAAAAAAAAAAAAAAAAAAAAAAAAAAAAAAAAAAAZAAAAAEAAABAAAAAAAAAAAAAAAAAAAAAAAAAAAAAAAAAAAAAAAAAAAAAAAAAAAAAAAAAAAAAAAAAAAAAAAAAAAAAAAAAAAAAAAAAAAAAAAAAAAAAAAAAAAAAAAAAAAAAFAAAADwAAAAAAAAAAAAAAAZJjAkUAAAAAQAAABQAAAAUAAAAFAAAAAEAAAAAAAAAZAAAAGQAAAAAAAAAZAAAAGQAAAAVAAAAYAAAAAAAAAAAAAAADwAAACADAAAAAAAAAAAAAAEAAACgMgAAVgcAAKr4//8BAAAAf39/AAEAAABkAAAAAAAAABQAAABAHwAAAAAAACYAAAAAAAAAwOD//wAAAAAmAAAAZAAAABYAAABMAAAAAAAAAAAAAAAEAAAAAAAAAAEAAACWlpYKAAAAACgAAAAoAAAAZAAAAGQAAAAAAAAAzMzMAAAAAABQAAAAUAAAAGQAAABkAAAAAAAAABcAAAAUAAAAAAAAAAAAAAD/fwAA/38AAAAAAAAJAAAABAAAAAAAAAAMAAAAEAAAAAAAAAAAAAAAAAAAAAAAAAAeAAAAaAAAAAAAAAAAAAAAAAAAAAAAAAAAAAAAECcAABAnAAAAAAAAAAAAAAAAAAAAAAAAAAAAAAAAAAAAAAAAAAAAABQAAAAAAAAAwMD/AAAAAABkAAAAMgAAAAAAAABkAAAAAAAAAH9/fwAKAAAAHwAAAFQAAABbm9UF////AQAAAAAAAAAAAAAAAAAAAAAAAAAAAAAAAAAAAAAAAAAAAAAAAn9/fwDn5uYDzMzMAMDA/wB/f38AAAAAAAAAAAAAAAAAAAAAAAAAAAAhAAAAGAAAABQAAADLEgAAFQkAAItHAABTHgAAAAAAAA=="/>
+                <pr:smNativeData xmlns:pr="smNativeData" xmlns="" val="SMDATA_12_7hxgVxMAAAAlAAAAZAAAAA0AAAAAkAAAAEgAAACQAAAASAAAAAAAAAACAAAAAAAAAAEAAABQAAAAAAAAAAAA4D8AAAAAAADgPwAAAAAAAOA/AAAAAAAA4D8AAAAAAADgPwAAAAAAAOA/AAAAAAAA4D8AAAAAAADgPwAAAAAAAOA/AAAAAAAA4D8CAAAAjAAAAAAAAAAAAAAA////DP///wgAAAAAAAAAAAAAAAAAAAAAAAAAAAAAAAAAAAAAZAAAAAEAAABAAAAAAAAAAAAAAAAAAAAAAAAAAAAAAAAAAAAAAAAAAAAAAAAAAAAAAAAAAAAAAAAAAAAAAAAAAAAAAAAAAAAAAAAAAAAAAAAAAAAAAAAAAAAAAAAAAAAAFAAAADwAAAAAAAAAAAAAAAZJjAkUAAAAAQAAABQAAAAUAAAAFAAAAAEAAAAAAAAAZAAAAGQAAAAAAAAAZAAAAGQAAAAVAAAAYAAAAAAAAAAAAAAADwAAACADAAAAAAAAAAAAAAEAAACgMgAAVgcAAKr4//8BAAAAf39/AAEAAABkAAAAAAAAABQAAABAHwAAAAAAACYAAAAAAAAAwOD//wAAAAAmAAAAZAAAABYAAABMAAAAAAAAAAAAAAAEAAAAAAAAAAEAAACWlpYKAAAAACgAAAAoAAAAZAAAAGQAAAAAAAAAzMzMAAAAAABQAAAAUAAAAGQAAABkAAAAAAAAABcAAAAUAAAAAAAAAAAAAAD/fwAA/38AAAAAAAAJAAAABAAAAAAAAAAMAAAAEAAAAAAAAAAAAAAAAAAAAAAAAAAeAAAAaAAAAAAAAAAAAAAAAAAAAAAAAAAAAAAAECcAABAnAAAAAAAAAAAAAAAAAAAAAAAAAAAAAAAAAAAAAAAAAAAAABQAAAAAAAAAwMD/AAAAAABkAAAAMgAAAAAAAABkAAAAAAAAAH9/fwAKAAAAHwAAAFQAAABbm9UF////AQAAAAAAAAAAAAAAAAAAAAAAAAAAAAAAAAAAAAAAAAAAAAAAAn9/fwDn5uYDzMzMAMDA/wB/f38AAAAAAAAAAAAAAAAAAAAAAAAAAAAhAAAAGAAAABQAAADLEgAAFQkAAItHAABTHgAAAAAAAA=="/>
               </a:ext>
             </a:extLst>
           </p:cNvSpPr>
@@ -3048,7 +3048,7 @@
             <a:spLocks noGrp="1" noChangeArrowheads="1"/>
             <a:extLst>
               <a:ext uri="smNativeData">
-                <pr:smNativeData xmlns="" xmlns:pr="smNativeData" val="SMDATA_12_7hxgVxMAAAAlAAAAZAAAAA0AAAAAkAAAAEgAAACQAAAASAAAAAAAAAAAAAAAAAAAAAEAAABQAAAAAAAAAAAA4D8AAAAAAADgPwAAAAAAAOA/AAAAAAAA4D8AAAAAAADgPwAAAAAAAOA/AAAAAAAA4D8AAAAAAADgPwAAAAAAAOA/AAAAAAAA4D8CAAAAjAAAAAAAAAAAAAAA////DP///wgAAAAAAAAAAAAAAAAAAAAAAAAAAAAAAAAAAAAAZAAAAAEAAABAAAAAAAAAAAAAAAAAAAAAAAAAAAAAAAAAAAAAAAAAAAAAAAAAAAAAAAAAAAAAAAAAAAAAAAAAAAAAAAAAAAAAAAAAAAAAAAAAAAAAAAAAAAAAAAAAAAAAFAAAADwAAAAAAAAAAAAAAAZJjAkUAAAAAQAAABQAAAAUAAAAFAAAAAEAAAAAAAAAZAAAAGQAAAAAAAAAZAAAAGQAAAAVAAAAYAAAAAAAAAAAAAAADwAAACADAAAAAAAAAAAAAAEAAACgMgAAVgcAAKr4//8BAAAAf39/AAEAAABkAAAAAAAAABQAAABAHwAAAAAAACYAAAAAAAAAwOD//wAAAAAmAAAAZAAAABYAAABMAAAAAAAAAAAAAAAEAAAAAAAAAAEAAACWlpYKAAAAACgAAAAoAAAAZAAAAGQAAAAAAAAAzMzMAAAAAABQAAAAUAAAAGQAAABkAAAAAAAAABcAAAAUAAAAAAAAAAAAAAD/fwAA/38AAAAAAAAJAAAABAAAAAAAAAAMAAAAEAAAAAAAAAAAAAAAAAAAAAAAAAAeAAAAaAAAAAAAAAAAAAAAAAAAAAAAAAAAAAAAECcAABAnAAAAAAAAAAAAAAAAAAAAAAAAAAAAAAAAAAAAAAAAAAAAABQAAAAAAAAAwMD/AAAAAABkAAAAMgAAAAAAAABkAAAAAAAAAH9/fwAKAAAAHwAAAFQAAABbm9UF////AQAAAAAAAAAAAAAAAAAAAAAAAAAAAAAAAAAAAAAAAAAAAAAAAn9/fwDn5uYDzMzMAMDA/wB/f38AAAAAAAAAAAAAAAAAAAAAAAAAAAAhAAAAGAAAABQAAADAEgAAzyEAAABLAAAWJgAAEAAAAA=="/>
+                <pr:smNativeData xmlns:pr="smNativeData" xmlns="" val="SMDATA_12_7hxgVxMAAAAlAAAAZAAAAA0AAAAAkAAAAEgAAACQAAAASAAAAAAAAAAAAAAAAAAAAAEAAABQAAAAAAAAAAAA4D8AAAAAAADgPwAAAAAAAOA/AAAAAAAA4D8AAAAAAADgPwAAAAAAAOA/AAAAAAAA4D8AAAAAAADgPwAAAAAAAOA/AAAAAAAA4D8CAAAAjAAAAAAAAAAAAAAA////DP///wgAAAAAAAAAAAAAAAAAAAAAAAAAAAAAAAAAAAAAZAAAAAEAAABAAAAAAAAAAAAAAAAAAAAAAAAAAAAAAAAAAAAAAAAAAAAAAAAAAAAAAAAAAAAAAAAAAAAAAAAAAAAAAAAAAAAAAAAAAAAAAAAAAAAAAAAAAAAAAAAAAAAAFAAAADwAAAAAAAAAAAAAAAZJjAkUAAAAAQAAABQAAAAUAAAAFAAAAAEAAAAAAAAAZAAAAGQAAAAAAAAAZAAAAGQAAAAVAAAAYAAAAAAAAAAAAAAADwAAACADAAAAAAAAAAAAAAEAAACgMgAAVgcAAKr4//8BAAAAf39/AAEAAABkAAAAAAAAABQAAABAHwAAAAAAACYAAAAAAAAAwOD//wAAAAAmAAAAZAAAABYAAABMAAAAAAAAAAAAAAAEAAAAAAAAAAEAAACWlpYKAAAAACgAAAAoAAAAZAAAAGQAAAAAAAAAzMzMAAAAAABQAAAAUAAAAGQAAABkAAAAAAAAABcAAAAUAAAAAAAAAAAAAAD/fwAA/38AAAAAAAAJAAAABAAAAAAAAAAMAAAAEAAAAAAAAAAAAAAAAAAAAAAAAAAeAAAAaAAAAAAAAAAAAAAAAAAAAAAAAAAAAAAAECcAABAnAAAAAAAAAAAAAAAAAAAAAAAAAAAAAAAAAAAAAAAAAAAAABQAAAAAAAAAwMD/AAAAAABkAAAAMgAAAAAAAABkAAAAAAAAAH9/fwAKAAAAHwAAAFQAAABbm9UF////AQAAAAAAAAAAAAAAAAAAAAAAAAAAAAAAAAAAAAAAAAAAAAAAAn9/fwDn5uYDzMzMAMDA/wB/f38AAAAAAAAAAAAAAAAAAAAAAAAAAAAhAAAAGAAAABQAAADAEgAAzyEAAABLAAAWJgAAEAAAAA=="/>
               </a:ext>
             </a:extLst>
           </p:cNvSpPr>
@@ -11779,24 +11779,170 @@
       </p:sp>
       <p:sp>
         <p:nvSpPr>
-          <p:cNvPr id="4" name="Espaço Reservado para Rodapé 3"/>
-          <p:cNvSpPr>
-            <a:spLocks noGrp="1"/>
-          </p:cNvSpPr>
-          <p:nvPr>
-            <p:ph type="ftr" sz="quarter" idx="11"/>
-          </p:nvPr>
-        </p:nvSpPr>
-        <p:spPr/>
-        <p:txBody>
-          <a:bodyPr/>
-          <a:lstStyle/>
-          <a:p>
-            <a:r>
-              <a:rPr lang="pt-BR" dirty="0" smtClean="0"/>
+          <p:cNvPr id="5" name="Espaço Reservado para Rodapé 3"/>
+          <p:cNvSpPr txBox="1">
+            <a:spLocks noGrp="1"/>
+          </p:cNvSpPr>
+          <p:nvPr>
+            <p:ph type="ftr" sz="quarter" idx="4294967295"/>
+          </p:nvPr>
+        </p:nvSpPr>
+        <p:spPr>
+          <a:xfrm>
+            <a:off x="3028950" y="6356350"/>
+            <a:ext cx="3086100" cy="365125"/>
+          </a:xfrm>
+          <a:prstGeom prst="rect">
+            <a:avLst/>
+          </a:prstGeom>
+        </p:spPr>
+        <p:txBody>
+          <a:bodyPr/>
+          <a:lstStyle>
+            <a:defPPr>
+              <a:defRPr lang="pt-BR"/>
+            </a:defPPr>
+            <a:lvl1pPr marL="0" algn="l" defTabSz="914400" rtl="0" eaLnBrk="1" latinLnBrk="0" hangingPunct="1">
+              <a:defRPr sz="1800" kern="1200">
+                <a:solidFill>
+                  <a:schemeClr val="tx1"/>
+                </a:solidFill>
+                <a:latin typeface="+mn-lt"/>
+                <a:ea typeface="+mn-ea"/>
+                <a:cs typeface="+mn-cs"/>
+              </a:defRPr>
+            </a:lvl1pPr>
+            <a:lvl2pPr marL="457200" algn="l" defTabSz="914400" rtl="0" eaLnBrk="1" latinLnBrk="0" hangingPunct="1">
+              <a:defRPr sz="1800" kern="1200">
+                <a:solidFill>
+                  <a:schemeClr val="tx1"/>
+                </a:solidFill>
+                <a:latin typeface="+mn-lt"/>
+                <a:ea typeface="+mn-ea"/>
+                <a:cs typeface="+mn-cs"/>
+              </a:defRPr>
+            </a:lvl2pPr>
+            <a:lvl3pPr marL="914400" algn="l" defTabSz="914400" rtl="0" eaLnBrk="1" latinLnBrk="0" hangingPunct="1">
+              <a:defRPr sz="1800" kern="1200">
+                <a:solidFill>
+                  <a:schemeClr val="tx1"/>
+                </a:solidFill>
+                <a:latin typeface="+mn-lt"/>
+                <a:ea typeface="+mn-ea"/>
+                <a:cs typeface="+mn-cs"/>
+              </a:defRPr>
+            </a:lvl3pPr>
+            <a:lvl4pPr marL="1371600" algn="l" defTabSz="914400" rtl="0" eaLnBrk="1" latinLnBrk="0" hangingPunct="1">
+              <a:defRPr sz="1800" kern="1200">
+                <a:solidFill>
+                  <a:schemeClr val="tx1"/>
+                </a:solidFill>
+                <a:latin typeface="+mn-lt"/>
+                <a:ea typeface="+mn-ea"/>
+                <a:cs typeface="+mn-cs"/>
+              </a:defRPr>
+            </a:lvl4pPr>
+            <a:lvl5pPr marL="1828800" algn="l" defTabSz="914400" rtl="0" eaLnBrk="1" latinLnBrk="0" hangingPunct="1">
+              <a:defRPr sz="1800" kern="1200">
+                <a:solidFill>
+                  <a:schemeClr val="tx1"/>
+                </a:solidFill>
+                <a:latin typeface="+mn-lt"/>
+                <a:ea typeface="+mn-ea"/>
+                <a:cs typeface="+mn-cs"/>
+              </a:defRPr>
+            </a:lvl5pPr>
+            <a:lvl6pPr marL="2286000" algn="l" defTabSz="914400" rtl="0" eaLnBrk="1" latinLnBrk="0" hangingPunct="1">
+              <a:defRPr sz="1800" kern="1200">
+                <a:solidFill>
+                  <a:schemeClr val="tx1"/>
+                </a:solidFill>
+                <a:latin typeface="+mn-lt"/>
+                <a:ea typeface="+mn-ea"/>
+                <a:cs typeface="+mn-cs"/>
+              </a:defRPr>
+            </a:lvl6pPr>
+            <a:lvl7pPr marL="2743200" algn="l" defTabSz="914400" rtl="0" eaLnBrk="1" latinLnBrk="0" hangingPunct="1">
+              <a:defRPr sz="1800" kern="1200">
+                <a:solidFill>
+                  <a:schemeClr val="tx1"/>
+                </a:solidFill>
+                <a:latin typeface="+mn-lt"/>
+                <a:ea typeface="+mn-ea"/>
+                <a:cs typeface="+mn-cs"/>
+              </a:defRPr>
+            </a:lvl7pPr>
+            <a:lvl8pPr marL="3200400" algn="l" defTabSz="914400" rtl="0" eaLnBrk="1" latinLnBrk="0" hangingPunct="1">
+              <a:defRPr sz="1800" kern="1200">
+                <a:solidFill>
+                  <a:schemeClr val="tx1"/>
+                </a:solidFill>
+                <a:latin typeface="+mn-lt"/>
+                <a:ea typeface="+mn-ea"/>
+                <a:cs typeface="+mn-cs"/>
+              </a:defRPr>
+            </a:lvl8pPr>
+            <a:lvl9pPr marL="3657600" algn="l" defTabSz="914400" rtl="0" eaLnBrk="1" latinLnBrk="0" hangingPunct="1">
+              <a:defRPr sz="1800" kern="1200">
+                <a:solidFill>
+                  <a:schemeClr val="tx1"/>
+                </a:solidFill>
+                <a:latin typeface="+mn-lt"/>
+                <a:ea typeface="+mn-ea"/>
+                <a:cs typeface="+mn-cs"/>
+              </a:defRPr>
+            </a:lvl9pPr>
+          </a:lstStyle>
+          <a:p>
+            <a:pPr algn="ctr">
+              <a:defRPr sz="1200">
+                <a:solidFill>
+                  <a:srgbClr val="8C8C8C"/>
+                </a:solidFill>
+                <a:latin typeface="Tw Cen MT" charset="0"/>
+                <a:ea typeface="Calibri" charset="0"/>
+                <a:cs typeface="Calibri" charset="0"/>
+              </a:defRPr>
+            </a:pPr>
+            <a:r>
+              <a:rPr lang="pt-BR" sz="1200" dirty="0" smtClean="0">
+                <a:solidFill>
+                  <a:srgbClr val="8C8C8C"/>
+                </a:solidFill>
+                <a:latin typeface="Tw Cen MT" charset="0"/>
+                <a:ea typeface="Calibri" charset="0"/>
+                <a:cs typeface="Calibri" charset="0"/>
+              </a:rPr>
               <a:t>Operadores</a:t>
             </a:r>
-            <a:endParaRPr lang="pt-BR" dirty="0"/>
+            <a:endParaRPr lang="pt-BR" sz="1200" dirty="0" smtClean="0">
+              <a:solidFill>
+                <a:srgbClr val="8C8C8C"/>
+              </a:solidFill>
+              <a:latin typeface="Tw Cen MT" charset="0"/>
+              <a:ea typeface="Calibri" charset="0"/>
+              <a:cs typeface="Calibri" charset="0"/>
+            </a:endParaRPr>
+          </a:p>
+          <a:p>
+            <a:pPr algn="ctr">
+              <a:defRPr sz="1200">
+                <a:solidFill>
+                  <a:srgbClr val="8C8C8C"/>
+                </a:solidFill>
+                <a:latin typeface="Tw Cen MT" charset="0"/>
+                <a:ea typeface="Calibri" charset="0"/>
+                <a:cs typeface="Calibri" charset="0"/>
+              </a:defRPr>
+            </a:pPr>
+            <a:endParaRPr lang="pt-BR" sz="1200" dirty="0">
+              <a:solidFill>
+                <a:srgbClr val="8C8C8C"/>
+              </a:solidFill>
+              <a:latin typeface="Tw Cen MT" charset="0"/>
+              <a:ea typeface="Calibri" charset="0"/>
+              <a:cs typeface="Calibri" charset="0"/>
+            </a:endParaRPr>
           </a:p>
         </p:txBody>
       </p:sp>

</xml_diff>

<commit_message>
atualizado ppt e exercicios
</commit_message>
<xml_diff>
--- a/TreinamentoJavaSeOca/documentos/apresentação/OCA.pptx
+++ b/TreinamentoJavaSeOca/documentos/apresentação/OCA.pptx
@@ -5,10 +5,10 @@
     <p:sldMasterId id="2147483661" r:id="rId1"/>
   </p:sldMasterIdLst>
   <p:notesMasterIdLst>
-    <p:notesMasterId r:id="rId62"/>
+    <p:notesMasterId r:id="rId65"/>
   </p:notesMasterIdLst>
   <p:handoutMasterIdLst>
-    <p:handoutMasterId r:id="rId63"/>
+    <p:handoutMasterId r:id="rId66"/>
   </p:handoutMasterIdLst>
   <p:sldIdLst>
     <p:sldId id="1140" r:id="rId2"/>
@@ -65,12 +65,15 @@
     <p:sldId id="1249" r:id="rId53"/>
     <p:sldId id="1250" r:id="rId54"/>
     <p:sldId id="1181" r:id="rId55"/>
-    <p:sldId id="1182" r:id="rId56"/>
-    <p:sldId id="1183" r:id="rId57"/>
-    <p:sldId id="1184" r:id="rId58"/>
-    <p:sldId id="1185" r:id="rId59"/>
-    <p:sldId id="1186" r:id="rId60"/>
-    <p:sldId id="1187" r:id="rId61"/>
+    <p:sldId id="1251" r:id="rId56"/>
+    <p:sldId id="1182" r:id="rId57"/>
+    <p:sldId id="1252" r:id="rId58"/>
+    <p:sldId id="1183" r:id="rId59"/>
+    <p:sldId id="1253" r:id="rId60"/>
+    <p:sldId id="1184" r:id="rId61"/>
+    <p:sldId id="1185" r:id="rId62"/>
+    <p:sldId id="1186" r:id="rId63"/>
+    <p:sldId id="1187" r:id="rId64"/>
   </p:sldIdLst>
   <p:sldSz cx="9144000" cy="6858000" type="screen4x3"/>
   <p:notesSz cx="6797675" cy="9928225"/>
@@ -270,7 +273,7 @@
           <a:p>
             <a:fld id="{72522EA8-AF65-4008-82EE-AEE6414B708A}" type="datetimeFigureOut">
               <a:rPr lang="pt-BR" smtClean="0"/>
-              <a:t>12/08/2016</a:t>
+              <a:t>15/08/2016</a:t>
             </a:fld>
             <a:endParaRPr lang="pt-BR"/>
           </a:p>
@@ -435,7 +438,7 @@
           <a:p>
             <a:fld id="{7B4FF0CD-9C9F-49AC-9576-0191D2CC62A3}" type="datetimeFigureOut">
               <a:rPr lang="pt-BR" smtClean="0"/>
-              <a:t>12/08/2016</a:t>
+              <a:t>15/08/2016</a:t>
             </a:fld>
             <a:endParaRPr lang="pt-BR"/>
           </a:p>
@@ -735,7 +738,7 @@
             <a:spLocks noGrp="1" noChangeArrowheads="1"/>
             <a:extLst>
               <a:ext uri="smNativeData">
-                <pr:smNativeData xmlns:pr="smNativeData" xmlns="" val="SMDATA_12_7hxgVxMAAAAlAAAAZAAAAA0AAAAAkAAAAEgAAACQAAAASAAAAAAAAAAAAAAAAAAAAAEAAABQAAAAAAAAAAAA4D8AAAAAAADgPwAAAAAAAOA/AAAAAAAA4D8AAAAAAADgPwAAAAAAAOA/AAAAAAAA4D8AAAAAAADgPwAAAAAAAOA/AAAAAAAA4D8CAAAAjAAAAAAAAAAAAAAA////DP///wgAAAAAAAAAAAAAAAAAAAAAAAAAAAAAAAAAAAAAZAAAAAEAAABAAAAAAAAAAAAAAAAAAAAAAAAAAAAAAAAAAAAAAAAAAAAAAAAAAAAAAAAAAAAAAAAAAAAAAAAAAAAAAAAAAAAAAAAAAAAAAAAAAAAAAAAAAAAAAAAAAAAAFAAAADwAAAAAAAAAAAAAAAZJjAkUAAAAAQAAABQAAAAUAAAAFAAAAAEAAAAAAAAAZAAAAGQAAAAAAAAAZAAAAGQAAAAVAAAAYAAAAAAAAAAAAAAADwAAACADAAAAAAAAAAAAAAEAAACgMgAAVgcAAKr4//8BAAAAf39/AAEAAABkAAAAAAAAABQAAABAHwAAAAAAACYAAAAAAAAAwOD//wAAAAAmAAAAZAAAABYAAABMAAAAAAAAAAAAAAAEAAAAAAAAAAEAAACWlpYKAAAAACgAAAAoAAAAZAAAAGQAAAAAAAAAzMzMAAAAAABQAAAAUAAAAGQAAABkAAAAAAAAABcAAAAUAAAAAAAAAAAAAAD/fwAA/38AAAAAAAAJAAAABAAAAAAAAAAMAAAAEAAAAAAAAAAAAAAAAAAAAAAAAAAeAAAAaAAAAAAAAAAAAAAAAAAAAAAAAAAAAAAAECcAABAnAAAAAAAAAAAAAAAAAAAAAAAAAAAAAAAAAAAAAAAAAAAAABQAAAAAAAAAwMD/AAAAAABkAAAAMgAAAAAAAABkAAAAAAAAAH9/fwAKAAAAHwAAAFQAAAAAAAAFAAAAAQAAAAAAAAAAAAAAAAAAAAAAAAAAAAAAAAAAAAAAAAAAAAAAAn9/fwAAAAADzMzMAMDA/wB/f38AAAAAAAAAAAAAAAAAAAAAAAAAAAAhAAAAGAAAABQAAAA4BAAAwAMAANAvAAAIBwAAEAAAAA=="/>
+                <pr:smNativeData xmlns="" xmlns:pr="smNativeData" val="SMDATA_12_7hxgVxMAAAAlAAAAZAAAAA0AAAAAkAAAAEgAAACQAAAASAAAAAAAAAAAAAAAAAAAAAEAAABQAAAAAAAAAAAA4D8AAAAAAADgPwAAAAAAAOA/AAAAAAAA4D8AAAAAAADgPwAAAAAAAOA/AAAAAAAA4D8AAAAAAADgPwAAAAAAAOA/AAAAAAAA4D8CAAAAjAAAAAAAAAAAAAAA////DP///wgAAAAAAAAAAAAAAAAAAAAAAAAAAAAAAAAAAAAAZAAAAAEAAABAAAAAAAAAAAAAAAAAAAAAAAAAAAAAAAAAAAAAAAAAAAAAAAAAAAAAAAAAAAAAAAAAAAAAAAAAAAAAAAAAAAAAAAAAAAAAAAAAAAAAAAAAAAAAAAAAAAAAFAAAADwAAAAAAAAAAAAAAAZJjAkUAAAAAQAAABQAAAAUAAAAFAAAAAEAAAAAAAAAZAAAAGQAAAAAAAAAZAAAAGQAAAAVAAAAYAAAAAAAAAAAAAAADwAAACADAAAAAAAAAAAAAAEAAACgMgAAVgcAAKr4//8BAAAAf39/AAEAAABkAAAAAAAAABQAAABAHwAAAAAAACYAAAAAAAAAwOD//wAAAAAmAAAAZAAAABYAAABMAAAAAAAAAAAAAAAEAAAAAAAAAAEAAACWlpYKAAAAACgAAAAoAAAAZAAAAGQAAAAAAAAAzMzMAAAAAABQAAAAUAAAAGQAAABkAAAAAAAAABcAAAAUAAAAAAAAAAAAAAD/fwAA/38AAAAAAAAJAAAABAAAAAAAAAAMAAAAEAAAAAAAAAAAAAAAAAAAAAAAAAAeAAAAaAAAAAAAAAAAAAAAAAAAAAAAAAAAAAAAECcAABAnAAAAAAAAAAAAAAAAAAAAAAAAAAAAAAAAAAAAAAAAAAAAABQAAAAAAAAAwMD/AAAAAABkAAAAMgAAAAAAAABkAAAAAAAAAH9/fwAKAAAAHwAAAFQAAAAAAAAFAAAAAQAAAAAAAAAAAAAAAAAAAAAAAAAAAAAAAAAAAAAAAAAAAAAAAn9/fwAAAAADzMzMAMDA/wB/f38AAAAAAAAAAAAAAAAAAAAAAAAAAAAhAAAAGAAAABQAAAA4BAAAwAMAANAvAAAIBwAAEAAAAA=="/>
               </a:ext>
             </a:extLst>
           </p:cNvSpPr>
@@ -1446,7 +1449,7 @@
           <a:p>
             <a:fld id="{47A45E42-5C18-486B-B418-DCDD32841B52}" type="datetimeFigureOut">
               <a:rPr lang="pt-BR" smtClean="0"/>
-              <a:t>12/08/2016</a:t>
+              <a:t>15/08/2016</a:t>
             </a:fld>
             <a:endParaRPr lang="pt-BR"/>
           </a:p>
@@ -1629,7 +1632,7 @@
             <a:spLocks noGrp="1" noChangeArrowheads="1"/>
             <a:extLst>
               <a:ext uri="smNativeData">
-                <pr:smNativeData xmlns:pr="smNativeData" xmlns="" val="SMDATA_12_7hxgVxMAAAAlAAAAZAAAAA0AAAAAkAAAAEgAAACQAAAASAAAAAAAAAABAAAAAAAAAAEAAABQAAAAAAAAAAAA4D8AAAAAAADgPwAAAAAAAOA/AAAAAAAA4D8AAAAAAADgPwAAAAAAAOA/AAAAAAAA4D8AAAAAAADgPwAAAAAAAOA/AAAAAAAA4D8CAAAAjAAAAAAAAAAAAAAA////AP///wgAAAAAAAAAAAAAAAAAAAAAAAAAAAAAAAAAAAAAeAAAAAEAAABAAAAAAAAAAAAAAABaAAAAAAAAAAAAAAAAAAAAAAAAAAAAAAAAAAAAAAAAAAAAAAAAAAAAAAAAAAAAAAAAAAAAAAAAAAAAAAAAAAAAAAAAAAAAAAAAAAAAFAAAADwAAAAAAAAAAAAAAAAAAAAPAAAAAQAAACMAAAAjAAAAIwAAAB4AAAAAAAAAZAAAAGQAAAAAAAAAZAAAAGQAAAAVAAAAYAAAAAAAAAAAAAAADwAAACADAAAAAAAAAAAAAAEAAACgMgAAVgcAAKr4//8BAAAAf39/AAEAAABkAAAAAAAAABQAAABAHwAAAAAAACYAAAAAAAAAwOD//wAAAAAmAAAAZAAAABYAAABMAAAAAAAAAAAAAAAEAAAAAAAAAAEAAADn5uYKAAAAACgAAAAoAAAAZAAAAGQAAAAAAAAAzMzMAAAAAABQAAAAUAAAAGQAAABkAAAAAAAAABcAAAAUAAAAAAAAAAAAAAD/fwAA/38AAAAAAAAJAAAABAAAAAAAAAAMAAAAEAAAAAAAAAAAAAAAAAAAAAAAAAAeAAAAaAAAAAAAAAAAAAAAAAAAAAAAAAAAAAAAECcAABAnAAAAAAAAAAAAAAAAAAAAAAAAAAAAAAAAAAAAAAAAAAAAABQAAAAAAAAAwMD/AAAAAABkAAAAMgAAAAAAAABkAAAAAAAAAH9/fwAKAAAAHwAAAFQAAAD///8AAAAAAQAAAAAAAAAAAAAAAAAAAAAAAAAAAAAAAAAAAAAAAAAAAAAAAH9/fwAAAAADzMzMAMDA/wB/f38AAAAAAAAAAAAAAAAAAAAAAAAAAAAhAAAAGAAAABQAAAAoBQAAPwIAANhFAABnCgAAEAAAAA=="/>
+                <pr:smNativeData xmlns="" xmlns:pr="smNativeData" val="SMDATA_12_7hxgVxMAAAAlAAAAZAAAAA0AAAAAkAAAAEgAAACQAAAASAAAAAAAAAABAAAAAAAAAAEAAABQAAAAAAAAAAAA4D8AAAAAAADgPwAAAAAAAOA/AAAAAAAA4D8AAAAAAADgPwAAAAAAAOA/AAAAAAAA4D8AAAAAAADgPwAAAAAAAOA/AAAAAAAA4D8CAAAAjAAAAAAAAAAAAAAA////AP///wgAAAAAAAAAAAAAAAAAAAAAAAAAAAAAAAAAAAAAeAAAAAEAAABAAAAAAAAAAAAAAABaAAAAAAAAAAAAAAAAAAAAAAAAAAAAAAAAAAAAAAAAAAAAAAAAAAAAAAAAAAAAAAAAAAAAAAAAAAAAAAAAAAAAAAAAAAAAAAAAAAAAFAAAADwAAAAAAAAAAAAAAAAAAAAPAAAAAQAAACMAAAAjAAAAIwAAAB4AAAAAAAAAZAAAAGQAAAAAAAAAZAAAAGQAAAAVAAAAYAAAAAAAAAAAAAAADwAAACADAAAAAAAAAAAAAAEAAACgMgAAVgcAAKr4//8BAAAAf39/AAEAAABkAAAAAAAAABQAAABAHwAAAAAAACYAAAAAAAAAwOD//wAAAAAmAAAAZAAAABYAAABMAAAAAAAAAAAAAAAEAAAAAAAAAAEAAADn5uYKAAAAACgAAAAoAAAAZAAAAGQAAAAAAAAAzMzMAAAAAABQAAAAUAAAAGQAAABkAAAAAAAAABcAAAAUAAAAAAAAAAAAAAD/fwAA/38AAAAAAAAJAAAABAAAAAAAAAAMAAAAEAAAAAAAAAAAAAAAAAAAAAAAAAAeAAAAaAAAAAAAAAAAAAAAAAAAAAAAAAAAAAAAECcAABAnAAAAAAAAAAAAAAAAAAAAAAAAAAAAAAAAAAAAAAAAAAAAABQAAAAAAAAAwMD/AAAAAABkAAAAMgAAAAAAAABkAAAAAAAAAH9/fwAKAAAAHwAAAFQAAAD///8AAAAAAQAAAAAAAAAAAAAAAAAAAAAAAAAAAAAAAAAAAAAAAAAAAAAAAH9/fwAAAAADzMzMAMDA/wB/f38AAAAAAAAAAAAAAAAAAAAAAAAAAAAhAAAAGAAAABQAAAAoBQAAPwIAANhFAABnCgAAEAAAAA=="/>
               </a:ext>
             </a:extLst>
           </p:cNvSpPr>
@@ -1676,7 +1679,7 @@
             <a:spLocks noGrp="1" noChangeArrowheads="1"/>
             <a:extLst>
               <a:ext uri="smNativeData">
-                <pr:smNativeData xmlns:pr="smNativeData" xmlns="" val="SMDATA_12_7hxgVxMAAAAlAAAAZAAAAA0AAAAAkAAAAEgAAACQAAAASAAAAAAAAAAAAAAAAAAAAAEAAABQAAAAAAAAAAAA4D8AAAAAAADgPwAAAAAAAOA/AAAAAAAA4D8AAAAAAADgPwAAAAAAAOA/AAAAAAAA4D8AAAAAAADgPwAAAAAAAOA/AAAAAAAA4D8CAAAAjAAAAAAAAAAAAAAA////AP///wgAAAAAAAAAAAAAAAAAAAAAAAAAAAAAAAAAAAAAeAAAAAEAAABAAAAAAAAAAAAAAABaAAAAAAAAAAAAAAAAAAAAAAAAAAAAAAAAAAAAAAAAAAAAAAAAAAAAAAAAAAAAAAAAAAAAAAAAAAAAAAAAAAAAAAAAAAAAAAAAAAAAFAAAADwAAAAAAAAAAAAAAAAAAAAPAAAAAQAAACMAAAAjAAAAIwAAAB4AAAAAAAAAZAAAAGQAAAAAAAAAZAAAAGQAAAAVAAAAYAAAAAAAAAAAAAAADwAAACADAAAAAAAAAAAAAAEAAACgMgAAVgcAAKr4//8BAAAAf39/AAEAAABkAAAAAAAAABQAAABAHwAAAAAAACYAAAAAAAAAwOD//wAAAAAmAAAAZAAAABYAAABMAAAAAAAAAAAAAAAEAAAAAAAAAAEAAADn5uYKAAAAACgAAAAoAAAAZAAAAGQAAAAAAAAAzMzMAAAAAABQAAAAUAAAAGQAAABkAAAAAAAAABcAAAAUAAAAAAAAAAAAAAD/fwAA/38AAAAAAAAJAAAABAAAAAAAAAAMAAAAEAAAAAAAAAAAAAAAAAAAAAAAAAAeAAAAaAAAAAAAAAAAAAAAAAAAAAAAAAAAAAAAECcAABAnAAAAAAAAAAAAAAAAAAAAAAAAAAAAAAAAAAAAAAAAAAAAABQAAAAAAAAAwMD/AAAAAABkAAAAMgAAAAAAAABkAAAAAAAAAH9/fwAKAAAAHwAAAFQAAAD///8AAAAAAQAAAAAAAAAAAAAAAAAAAAAAAAAAAAAAAAAAAAAAAAAAAAAAAH9/fwAAAAADzMzMAMDA/wB/f38AAAAAAAAAAAAAAAAAAAAAAAAAAAAhAAAAGAAAABQAAAAoBQAAOwsAANhFAAAAJgAAEAAAAA=="/>
+                <pr:smNativeData xmlns="" xmlns:pr="smNativeData" val="SMDATA_12_7hxgVxMAAAAlAAAAZAAAAA0AAAAAkAAAAEgAAACQAAAASAAAAAAAAAAAAAAAAAAAAAEAAABQAAAAAAAAAAAA4D8AAAAAAADgPwAAAAAAAOA/AAAAAAAA4D8AAAAAAADgPwAAAAAAAOA/AAAAAAAA4D8AAAAAAADgPwAAAAAAAOA/AAAAAAAA4D8CAAAAjAAAAAAAAAAAAAAA////AP///wgAAAAAAAAAAAAAAAAAAAAAAAAAAAAAAAAAAAAAeAAAAAEAAABAAAAAAAAAAAAAAABaAAAAAAAAAAAAAAAAAAAAAAAAAAAAAAAAAAAAAAAAAAAAAAAAAAAAAAAAAAAAAAAAAAAAAAAAAAAAAAAAAAAAAAAAAAAAAAAAAAAAFAAAADwAAAAAAAAAAAAAAAAAAAAPAAAAAQAAACMAAAAjAAAAIwAAAB4AAAAAAAAAZAAAAGQAAAAAAAAAZAAAAGQAAAAVAAAAYAAAAAAAAAAAAAAADwAAACADAAAAAAAAAAAAAAEAAACgMgAAVgcAAKr4//8BAAAAf39/AAEAAABkAAAAAAAAABQAAABAHwAAAAAAACYAAAAAAAAAwOD//wAAAAAmAAAAZAAAABYAAABMAAAAAAAAAAAAAAAEAAAAAAAAAAEAAADn5uYKAAAAACgAAAAoAAAAZAAAAGQAAAAAAAAAzMzMAAAAAABQAAAAUAAAAGQAAABkAAAAAAAAABcAAAAUAAAAAAAAAAAAAAD/fwAA/38AAAAAAAAJAAAABAAAAAAAAAAMAAAAEAAAAAAAAAAAAAAAAAAAAAAAAAAeAAAAaAAAAAAAAAAAAAAAAAAAAAAAAAAAAAAAECcAABAnAAAAAAAAAAAAAAAAAAAAAAAAAAAAAAAAAAAAAAAAAAAAABQAAAAAAAAAwMD/AAAAAABkAAAAMgAAAAAAAABkAAAAAAAAAH9/fwAKAAAAHwAAAFQAAAD///8AAAAAAQAAAAAAAAAAAAAAAAAAAAAAAAAAAAAAAAAAAAAAAAAAAAAAAH9/fwAAAAADzMzMAMDA/wB/f38AAAAAAAAAAAAAAAAAAAAAAAAAAAAhAAAAGAAAABQAAAAoBQAAOwsAANhFAAAAJgAAEAAAAA=="/>
               </a:ext>
             </a:extLst>
           </p:cNvSpPr>
@@ -1723,7 +1726,7 @@
             <a:spLocks noGrp="1" noChangeArrowheads="1"/>
             <a:extLst>
               <a:ext uri="smNativeData">
-                <pr:smNativeData xmlns:pr="smNativeData" xmlns="" val="SMDATA_12_7hxgVxMAAAAlAAAAZAAAAA0AAAAAkAAAAEgAAACQAAAASAAAAAAAAAABAAAAAAAAAAEAAABQAAAAAAAAAAAA4D8AAAAAAADgPwAAAAAAAOA/AAAAAAAA4D8AAAAAAADgPwAAAAAAAOA/AAAAAAAA4D8AAAAAAADgPwAAAAAAAOA/AAAAAAAA4D8CAAAAjAAAAAAAAAAAAAAA////AP///wgAAAAAAAAAAAAAAAAAAAAAAAAAAAAAAAAAAAAAeAAAAAEAAABAAAAAAAAAAAAAAABaAAAAAAAAAAAAAAAAAAAAAAAAAAAAAAAAAAAAAAAAAAAAAAAAAAAAAAAAAAAAAAAAAAAAAAAAAAAAAAAAAAAAAAAAAAAAAAAAAAAAFAAAADwAAAAAAAAAAAAAAAAAAAAPAAAAAQAAACMAAAAjAAAAIwAAAB4AAAAAAAAAZAAAAGQAAAAAAAAAZAAAAGQAAAAVAAAAYAAAAAAAAAAAAAAADwAAACADAAAAAAAAAAAAAAEAAACgMgAAVgcAAKr4//8BAAAAf39/AAEAAABkAAAAAAAAABQAAABAHwAAAAAAACYAAAAAAAAAwOD//wAAAAAmAAAAZAAAABYAAABMAAAAAAAAAAAAAAAEAAAAAAAAAAEAAADn5uYKAAAAACgAAAAoAAAAZAAAAGQAAAAAAAAAzMzMAAAAAABQAAAAUAAAAGQAAABkAAAAAAAAABcAAAAUAAAAAAAAAAAAAAD/fwAA/38AAAAAAAAJAAAABAAAAAAAAAAMAAAAEAAAAAAAAAAAAAAAAAAAAAAAAAAeAAAAaAAAAAAAAAAAAAAAAAAAAAAAAAAAAAAAECcAABAnAAAAAAAAAAAAAAAAAAAAAAAAAAAAAAAAAAAAAAAAAAAAABQAAAAAAAAAwMD/AAAAAABkAAAAMgAAAAAAAABkAAAAAAAAAH9/fwAKAAAAHwAAAFQAAAD///8A////AQAAAAAAAAAAAAAAAAAAAAAAAAAAAAAAAAAAAAAAAAAAAAAAAH9/fwDn5uYDzMzMAMDA/wB/f38AAAAAAAAAAAAAAAAAAAAAAAAAAAAhAAAAGAAAABQAAAD4NAAAGicAANhFAABZKQAAEAAAAA=="/>
+                <pr:smNativeData xmlns="" xmlns:pr="smNativeData" val="SMDATA_12_7hxgVxMAAAAlAAAAZAAAAA0AAAAAkAAAAEgAAACQAAAASAAAAAAAAAABAAAAAAAAAAEAAABQAAAAAAAAAAAA4D8AAAAAAADgPwAAAAAAAOA/AAAAAAAA4D8AAAAAAADgPwAAAAAAAOA/AAAAAAAA4D8AAAAAAADgPwAAAAAAAOA/AAAAAAAA4D8CAAAAjAAAAAAAAAAAAAAA////AP///wgAAAAAAAAAAAAAAAAAAAAAAAAAAAAAAAAAAAAAeAAAAAEAAABAAAAAAAAAAAAAAABaAAAAAAAAAAAAAAAAAAAAAAAAAAAAAAAAAAAAAAAAAAAAAAAAAAAAAAAAAAAAAAAAAAAAAAAAAAAAAAAAAAAAAAAAAAAAAAAAAAAAFAAAADwAAAAAAAAAAAAAAAAAAAAPAAAAAQAAACMAAAAjAAAAIwAAAB4AAAAAAAAAZAAAAGQAAAAAAAAAZAAAAGQAAAAVAAAAYAAAAAAAAAAAAAAADwAAACADAAAAAAAAAAAAAAEAAACgMgAAVgcAAKr4//8BAAAAf39/AAEAAABkAAAAAAAAABQAAABAHwAAAAAAACYAAAAAAAAAwOD//wAAAAAmAAAAZAAAABYAAABMAAAAAAAAAAAAAAAEAAAAAAAAAAEAAADn5uYKAAAAACgAAAAoAAAAZAAAAGQAAAAAAAAAzMzMAAAAAABQAAAAUAAAAGQAAABkAAAAAAAAABcAAAAUAAAAAAAAAAAAAAD/fwAA/38AAAAAAAAJAAAABAAAAAAAAAAMAAAAEAAAAAAAAAAAAAAAAAAAAAAAAAAeAAAAaAAAAAAAAAAAAAAAAAAAAAAAAAAAAAAAECcAABAnAAAAAAAAAAAAAAAAAAAAAAAAAAAAAAAAAAAAAAAAAAAAABQAAAAAAAAAwMD/AAAAAABkAAAAMgAAAAAAAABkAAAAAAAAAH9/fwAKAAAAHwAAAFQAAAD///8A////AQAAAAAAAAAAAAAAAAAAAAAAAAAAAAAAAAAAAAAAAAAAAAAAAH9/fwDn5uYDzMzMAMDA/wB/f38AAAAAAAAAAAAAAAAAAAAAAAAAAAAhAAAAGAAAABQAAAD4NAAAGicAANhFAABZKQAAEAAAAA=="/>
               </a:ext>
             </a:extLst>
           </p:cNvSpPr>
@@ -1780,7 +1783,7 @@
             <a:spLocks noGrp="1" noChangeArrowheads="1"/>
             <a:extLst>
               <a:ext uri="smNativeData">
-                <pr:smNativeData xmlns:pr="smNativeData" xmlns="" val="SMDATA_12_7hxgVxMAAAAlAAAAZAAAAA0AAAAAkAAAAEgAAACQAAAASAAAAAAAAAABAAAAAAAAAAEAAABQAAAAAAAAAAAA4D8AAAAAAADgPwAAAAAAAOA/AAAAAAAA4D8AAAAAAADgPwAAAAAAAOA/AAAAAAAA4D8AAAAAAADgPwAAAAAAAOA/AAAAAAAA4D8CAAAAjAAAAAAAAAAAAAAA////AP///wgAAAAAAAAAAAAAAAAAAAAAAAAAAAAAAAAAAAAAeAAAAAEAAABAAAAAAAAAAAAAAABaAAAAAAAAAAAAAAAAAAAAAAAAAAAAAAAAAAAAAAAAAAAAAAAAAAAAAAAAAAAAAAAAAAAAAAAAAAAAAAAAAAAAAAAAAAAAAAAAAAAAFAAAADwAAAAAAAAAAAAAAAAAAAAPAAAAAQAAACMAAAAjAAAAIwAAAB4AAAAAAAAAZAAAAGQAAAAAAAAAZAAAAGQAAAAVAAAAYAAAAAAAAAAAAAAADwAAACADAAAAAAAAAAAAAAEAAACgMgAAVgcAAKr4//8BAAAAf39/AAEAAABkAAAAAAAAABQAAABAHwAAAAAAACYAAAAAAAAAwOD//wAAAAAmAAAAZAAAABYAAABMAAAAAAAAAAAAAAAEAAAAAAAAAAEAAADn5uYKAAAAACgAAAAoAAAAZAAAAGQAAAAAAAAAzMzMAAAAAABQAAAAUAAAAGQAAABkAAAAAAAAABcAAAAUAAAAAAAAAAAAAAD/fwAA/38AAAAAAAAJAAAABAAAAAAAAAAMAAAAEAAAAAAAAAAAAAAAAAAAAAAAAAAeAAAAaAAAAAAAAAAAAAAAAAAAAAAAAAAAAAAAECcAABAnAAAAAAAAAAAAAAAAAAAAAAAAAAAAAAAAAAAAAAAAAAAAABQAAAAAAAAAwMD/AAAAAABkAAAAMgAAAAAAAABkAAAAAAAAAH9/fwAKAAAAHwAAAFQAAAD///8A////AQAAAAAAAAAAAAAAAAAAAAAAAAAAAAAAAAAAAAAAAAAAAAAAAH9/fwDn5uYDzMzMAMDA/wB/f38AAAAAAAAAAAAAAAAAAAAAAAAAAAAhAAAAGAAAABQAAADYGAAAGicAACgyAABZKQAAEAAAAA=="/>
+                <pr:smNativeData xmlns="" xmlns:pr="smNativeData" val="SMDATA_12_7hxgVxMAAAAlAAAAZAAAAA0AAAAAkAAAAEgAAACQAAAASAAAAAAAAAABAAAAAAAAAAEAAABQAAAAAAAAAAAA4D8AAAAAAADgPwAAAAAAAOA/AAAAAAAA4D8AAAAAAADgPwAAAAAAAOA/AAAAAAAA4D8AAAAAAADgPwAAAAAAAOA/AAAAAAAA4D8CAAAAjAAAAAAAAAAAAAAA////AP///wgAAAAAAAAAAAAAAAAAAAAAAAAAAAAAAAAAAAAAeAAAAAEAAABAAAAAAAAAAAAAAABaAAAAAAAAAAAAAAAAAAAAAAAAAAAAAAAAAAAAAAAAAAAAAAAAAAAAAAAAAAAAAAAAAAAAAAAAAAAAAAAAAAAAAAAAAAAAAAAAAAAAFAAAADwAAAAAAAAAAAAAAAAAAAAPAAAAAQAAACMAAAAjAAAAIwAAAB4AAAAAAAAAZAAAAGQAAAAAAAAAZAAAAGQAAAAVAAAAYAAAAAAAAAAAAAAADwAAACADAAAAAAAAAAAAAAEAAACgMgAAVgcAAKr4//8BAAAAf39/AAEAAABkAAAAAAAAABQAAABAHwAAAAAAACYAAAAAAAAAwOD//wAAAAAmAAAAZAAAABYAAABMAAAAAAAAAAAAAAAEAAAAAAAAAAEAAADn5uYKAAAAACgAAAAoAAAAZAAAAGQAAAAAAAAAzMzMAAAAAABQAAAAUAAAAGQAAABkAAAAAAAAABcAAAAUAAAAAAAAAAAAAAD/fwAA/38AAAAAAAAJAAAABAAAAAAAAAAMAAAAEAAAAAAAAAAAAAAAAAAAAAAAAAAeAAAAaAAAAAAAAAAAAAAAAAAAAAAAAAAAAAAAECcAABAnAAAAAAAAAAAAAAAAAAAAAAAAAAAAAAAAAAAAAAAAAAAAABQAAAAAAAAAwMD/AAAAAABkAAAAMgAAAAAAAABkAAAAAAAAAH9/fwAKAAAAHwAAAFQAAAD///8A////AQAAAAAAAAAAAAAAAAAAAAAAAAAAAAAAAAAAAAAAAAAAAAAAAH9/fwDn5uYDzMzMAMDA/wB/f38AAAAAAAAAAAAAAAAAAAAAAAAAAAAhAAAAGAAAABQAAADYGAAAGicAACgyAABZKQAAEAAAAA=="/>
               </a:ext>
             </a:extLst>
           </p:cNvSpPr>
@@ -1834,7 +1837,7 @@
             <a:spLocks noGrp="1" noChangeArrowheads="1"/>
             <a:extLst>
               <a:ext uri="smNativeData">
-                <pr:smNativeData xmlns:pr="smNativeData" xmlns="" val="SMDATA_12_7hxgVxMAAAAlAAAAZAAAAA0AAAAAkAAAAEgAAACQAAAASAAAAAAAAAABAAAAAAAAAAEAAABQAAAAAAAAAAAA4D8AAAAAAADgPwAAAAAAAOA/AAAAAAAA4D8AAAAAAADgPwAAAAAAAOA/AAAAAAAA4D8AAAAAAADgPwAAAAAAAOA/AAAAAAAA4D8CAAAAjAAAAAAAAAAAAAAA////AP///wgAAAAAAAAAAAAAAAAAAAAAAAAAAAAAAAAAAAAAeAAAAAEAAABAAAAAAAAAAAAAAABaAAAAAAAAAAAAAAAAAAAAAAAAAAAAAAAAAAAAAAAAAAAAAAAAAAAAAAAAAAAAAAAAAAAAAAAAAAAAAAAAAAAAAAAAAAAAAAAAAAAAFAAAADwAAAAAAAAAAAAAAAAAAAAPAAAAAQAAACMAAAAjAAAAIwAAAB4AAAAAAAAAZAAAAGQAAAAAAAAAZAAAAGQAAAAVAAAAYAAAAAAAAAAAAAAADwAAACADAAAAAAAAAAAAAAEAAACgMgAAVgcAAKr4//8BAAAAf39/AAEAAABkAAAAAAAAABQAAABAHwAAAAAAACYAAAAAAAAAwOD//wAAAAAmAAAAZAAAABYAAABMAAAAAAAAAAAAAAAEAAAAAAAAAAEAAADn5uYKAAAAACgAAAAoAAAAZAAAAGQAAAAAAAAAzMzMAAAAAABQAAAAUAAAAGQAAABkAAAAAAAAABcAAAAUAAAAAAAAAAAAAAD/fwAA/38AAAAAAAAJAAAABAAAAAAAAAAMAAAAEAAAAAAAAAAAAAAAAAAAAAAAAAAeAAAAaAAAAAAAAAAAAAAAAAAAAAAAAAAAAAAAECcAABAnAAAAAAAAAAAAAAAAAAAAAAAAAAAAAAAAAAAAAAAAAAAAABQAAAAAAAAAwMD/AAAAAABkAAAAMgAAAAAAAABkAAAAAAAAAH9/fwAKAAAAHwAAAFQAAAD///8A////AQAAAAAAAAAAAAAAAAAAAAAAAAAAAAAAAAAAAAAAAAAAAAAAAH9/fwDn5uYDzMzMAMDA/wB/f38AAAAAAAAAAAAAAAAAAAAAAAAAAAAhAAAAGAAAABQAAAAoBQAAGicAAAgWAABZKQAAEAAAAA=="/>
+                <pr:smNativeData xmlns="" xmlns:pr="smNativeData" val="SMDATA_12_7hxgVxMAAAAlAAAAZAAAAA0AAAAAkAAAAEgAAACQAAAASAAAAAAAAAABAAAAAAAAAAEAAABQAAAAAAAAAAAA4D8AAAAAAADgPwAAAAAAAOA/AAAAAAAA4D8AAAAAAADgPwAAAAAAAOA/AAAAAAAA4D8AAAAAAADgPwAAAAAAAOA/AAAAAAAA4D8CAAAAjAAAAAAAAAAAAAAA////AP///wgAAAAAAAAAAAAAAAAAAAAAAAAAAAAAAAAAAAAAeAAAAAEAAABAAAAAAAAAAAAAAABaAAAAAAAAAAAAAAAAAAAAAAAAAAAAAAAAAAAAAAAAAAAAAAAAAAAAAAAAAAAAAAAAAAAAAAAAAAAAAAAAAAAAAAAAAAAAAAAAAAAAFAAAADwAAAAAAAAAAAAAAAAAAAAPAAAAAQAAACMAAAAjAAAAIwAAAB4AAAAAAAAAZAAAAGQAAAAAAAAAZAAAAGQAAAAVAAAAYAAAAAAAAAAAAAAADwAAACADAAAAAAAAAAAAAAEAAACgMgAAVgcAAKr4//8BAAAAf39/AAEAAABkAAAAAAAAABQAAABAHwAAAAAAACYAAAAAAAAAwOD//wAAAAAmAAAAZAAAABYAAABMAAAAAAAAAAAAAAAEAAAAAAAAAAEAAADn5uYKAAAAACgAAAAoAAAAZAAAAGQAAAAAAAAAzMzMAAAAAABQAAAAUAAAAGQAAABkAAAAAAAAABcAAAAUAAAAAAAAAAAAAAD/fwAA/38AAAAAAAAJAAAABAAAAAAAAAAMAAAAEAAAAAAAAAAAAAAAAAAAAAAAAAAeAAAAaAAAAAAAAAAAAAAAAAAAAAAAAAAAAAAAECcAABAnAAAAAAAAAAAAAAAAAAAAAAAAAAAAAAAAAAAAAAAAAAAAABQAAAAAAAAAwMD/AAAAAABkAAAAMgAAAAAAAABkAAAAAAAAAH9/fwAKAAAAHwAAAFQAAAD///8A////AQAAAAAAAAAAAAAAAAAAAAAAAAAAAAAAAAAAAAAAAAAAAAAAAH9/fwDn5uYDzMzMAMDA/wB/f38AAAAAAAAAAAAAAAAAAAAAAAAAAAAhAAAAGAAAABQAAAAoBQAAGicAAAgWAABZKQAAEAAAAA=="/>
               </a:ext>
             </a:extLst>
           </p:cNvSpPr>
@@ -2633,7 +2636,7 @@
           <p:cNvGrpSpPr>
             <a:extLst>
               <a:ext uri="smNativeData">
-                <pr:smNativeData xmlns:pr="smNativeData" xmlns="" val="SMDATA_6_7hxgVxMAAAAlAAAAAQAAAA8BAAAAkAAAAEgAAACQAAAASAAAAAAAAAAAAAAAAAAAABcAAAAUAAAAAAAAAAAAAAD/fwAA/38AAAAAAAAJAAAABAAAAAAAAAAMAAAAEAAAAAAAAAAAAAAAAAAAAAAAAAAfAAAAVAAAAAAAAAAAAAAAAAAAAAAAAAAAAAAAAAAAAAAAAAAAAAAAAAAAAAAAAAAAAAAAAAAAAAAAAAAAAAAAAAAAAAAAAAAAAAAAAAAAAAAAAAAAAAAAAAAAACEAAAAYAAAAFAAAAAAAAACEIQAAAEsAAEMmAAAQAAAA"/>
+                <pr:smNativeData xmlns="" xmlns:pr="smNativeData" val="SMDATA_6_7hxgVxMAAAAlAAAAAQAAAA8BAAAAkAAAAEgAAACQAAAASAAAAAAAAAAAAAAAAAAAABcAAAAUAAAAAAAAAAAAAAD/fwAA/38AAAAAAAAJAAAABAAAAAAAAAAMAAAAEAAAAAAAAAAAAAAAAAAAAAAAAAAfAAAAVAAAAAAAAAAAAAAAAAAAAAAAAAAAAAAAAAAAAAAAAAAAAAAAAAAAAAAAAAAAAAAAAAAAAAAAAAAAAAAAAAAAAAAAAAAAAAAAAAAAAAAAAAAAAAAAAAAAACEAAAAYAAAAFAAAAAAAAACEIQAAAEsAAEMmAAAQAAAA"/>
               </a:ext>
             </a:extLst>
           </p:cNvGrpSpPr>
@@ -2683,7 +2686,7 @@
             <p:cNvSpPr>
               <a:extLst>
                 <a:ext uri="smNativeData">
-                  <pr:smNativeData xmlns:pr="smNativeData" xmlns="" val="SMDATA_12_7hxgVxMAAAAlAAAAZAAAAA0AAAAAkAAAAEgAAACQAAAASAAAAAAAAAABAAAAAAAAAAEAAABQAAAAAAAAAAAA4D8AAAAAAADgPwAAAAAAAOA/AAAAAAAA4D8AAAAAAADgPwAAAAAAAOA/AAAAAAAA4D8AAAAAAADgPwAAAAAAAOA/AAAAAAAA4D8CAAAAjAAAAAEAAAAAAAAAVII1AP///wgAAAAAAAAAAAAAAAAAAAAAAAAAAAAAAAAAAAAAeAAAAAEAAABAAAAAAAAAAAAAAABaAAAAAAAAAAAAAAAAAAAAAAAAAAAAAAAAAAAAAAAAAAAAAAAAAAAAAAAAAAAAAAAAAAAAAAAAAAAAAAAAAAAAAAAAAAAAAAAAAAAAFAAAADwAAAAAAAAAAAAAAAZJjAkUAAAAAQAAABQAAAAUAAAAFAAAAAEAAAAAAAAAZAAAAGQAAAAAAAAAZAAAAGQAAAAVAAAAYAAAAAAAAAAAAAAADwAAACADAAAAAAAAAAAAAAEAAACgMgAAVgcAAKr4//8BAAAAf39/AAEAAABkAAAAAAAAABQAAABAHwAAAAAAACYAAAAAAAAAwOD//wAAAAAmAAAAZAAAABYAAABMAAAAAAAAAAAAAAAEAAAAAAAAAAEAAACWlpYKAAAAACgAAAAoAAAAZAAAAGQAAAAAAAAAzMzMAAAAAABQAAAAUAAAAGQAAABkAAAAAAAAABcAAAAUAAAAAAAAAAAAAAD/fwAA/38AAAAAAAAJAAAABAAAAAAAAAAMAAAAEAAAAAAAAAAAAAAAAAAAAAAAAAAeAAAAaAAAAAAAAAAAAAAAAAAAAAAAAAAAAAAAECcAABAnAAAAAAAAAAAAAAAAAAAAAAAAAAAAAAAAAAAAAAAAAAAAABQAAAAAAAAAwMD/AAAAAABkAAAAMgAAAAAAAABkAAAAAAAAAH9/fwAKAAAAHwAAAFQAAABUgjUA////AQAAAAAAAAAAAAAAAAAAAAAAAAAAAAAAAAAAAAAAAAAAAAAAAn9/fwDn5uYDzMzMAMDA/wB/f38AAAAAAAAAAAAAAAAAAAAAAAAAAAAhAAAAGAAAABQAAADLEgAAhiEAAABLAABDJgAAAAAAAA=="/>
+                  <pr:smNativeData xmlns="" xmlns:pr="smNativeData" val="SMDATA_12_7hxgVxMAAAAlAAAAZAAAAA0AAAAAkAAAAEgAAACQAAAASAAAAAAAAAABAAAAAAAAAAEAAABQAAAAAAAAAAAA4D8AAAAAAADgPwAAAAAAAOA/AAAAAAAA4D8AAAAAAADgPwAAAAAAAOA/AAAAAAAA4D8AAAAAAADgPwAAAAAAAOA/AAAAAAAA4D8CAAAAjAAAAAEAAAAAAAAAVII1AP///wgAAAAAAAAAAAAAAAAAAAAAAAAAAAAAAAAAAAAAeAAAAAEAAABAAAAAAAAAAAAAAABaAAAAAAAAAAAAAAAAAAAAAAAAAAAAAAAAAAAAAAAAAAAAAAAAAAAAAAAAAAAAAAAAAAAAAAAAAAAAAAAAAAAAAAAAAAAAAAAAAAAAFAAAADwAAAAAAAAAAAAAAAZJjAkUAAAAAQAAABQAAAAUAAAAFAAAAAEAAAAAAAAAZAAAAGQAAAAAAAAAZAAAAGQAAAAVAAAAYAAAAAAAAAAAAAAADwAAACADAAAAAAAAAAAAAAEAAACgMgAAVgcAAKr4//8BAAAAf39/AAEAAABkAAAAAAAAABQAAABAHwAAAAAAACYAAAAAAAAAwOD//wAAAAAmAAAAZAAAABYAAABMAAAAAAAAAAAAAAAEAAAAAAAAAAEAAACWlpYKAAAAACgAAAAoAAAAZAAAAGQAAAAAAAAAzMzMAAAAAABQAAAAUAAAAGQAAABkAAAAAAAAABcAAAAUAAAAAAAAAAAAAAD/fwAA/38AAAAAAAAJAAAABAAAAAAAAAAMAAAAEAAAAAAAAAAAAAAAAAAAAAAAAAAeAAAAaAAAAAAAAAAAAAAAAAAAAAAAAAAAAAAAECcAABAnAAAAAAAAAAAAAAAAAAAAAAAAAAAAAAAAAAAAAAAAAAAAABQAAAAAAAAAwMD/AAAAAABkAAAAMgAAAAAAAABkAAAAAAAAAH9/fwAKAAAAHwAAAFQAAABUgjUA////AQAAAAAAAAAAAAAAAAAAAAAAAAAAAAAAAAAAAAAAAAAAAAAAAn9/fwDn5uYDzMzMAMDA/wB/f38AAAAAAAAAAAAAAAAAAAAAAAAAAAAhAAAAGAAAABQAAADLEgAAhiEAAABLAABDJgAAAAAAAA=="/>
                 </a:ext>
               </a:extLst>
             </p:cNvSpPr>
@@ -2834,7 +2837,7 @@
             <p:cNvSpPr>
               <a:extLst>
                 <a:ext uri="smNativeData">
-                  <pr:smNativeData xmlns:pr="smNativeData" xmlns="" val="SMDATA_12_7hxgVxMAAAAlAAAAZAAAAA0AAAAAkAAAAEgAAACQAAAASAAAAAAAAAABAAAAAAAAAAEAAABQAAAAAAAAAAAA4D8AAAAAAADgPwAAAAAAAOA/AAAAAAAA4D8AAAAAAADgPwAAAAAAAOA/AAAAAAAA4D8AAAAAAADgPwAAAAAAAOA/AAAAAAAA4D8CAAAAjAAAAAEAAAAAAAAA/8AAAP///wgAAAAAAAAAAAAAAAAAAAAAAAAAAAAAAAAAAAAAeAAAAAEAAABAAAAAAAAAAAAAAABaAAAAAAAAAAAAAAAAAAAAAAAAAAAAAAAAAAAAAAAAAAAAAAAAAAAAAAAAAAAAAAAAAAAAAAAAAAAAAAAAAAAAAAAAAAAAAAAAAAAAFAAAADwAAAAAAAAAAAAAAAZJjAkUAAAAAQAAABQAAAAUAAAAFAAAAAEAAAAAAAAAZAAAAGQAAAAAAAAAZAAAAGQAAAAVAAAAYAAAAAAAAAAAAAAADwAAACADAAAAAAAAAAAAAAEAAACgMgAAVgcAAKr4//8BAAAAf39/AAEAAABkAAAAAAAAABQAAABAHwAAAAAAACYAAAAAAAAAwOD//wAAAAAmAAAAZAAAABYAAABMAAAAAAAAAAAAAAAEAAAAAAAAAAEAAACWlpYKAAAAACgAAAAoAAAAZAAAAGQAAAAAAAAAzMzMAAAAAABQAAAAUAAAAGQAAABkAAAAAAAAABcAAAAUAAAAAAAAAAAAAAD/fwAA/38AAAAAAAAJAAAABAAAAAAAAAAMAAAAEAAAAAAAAAAAAAAAAAAAAAAAAAAeAAAAaAAAAAAAAAAAAAAAAAAAAAAAAAAAAAAAECcAABAnAAAAAAAAAAAAAAAAAAAAAAAAAAAAAAAAAAAAAAAAAAAAABQAAAAAAAAAwMD/AAAAAABkAAAAMgAAAAAAAABkAAAAAAAAAH9/fwAKAAAAHwAAAFQAAAD/wAAA////AQAAAAAAAAAAAAAAAAAAAAAAAAAAAAAAAAAAAAAAAAAAAAAAAn9/fwDn5uYDzMzMAMDA/wB/f38AAAAAAAAAAAAAAAAAAAAAAAAAAAAhAAAAGAAAABQAAAAAAAAAhCEAAMsSAABBJgAAAAAAAA=="/>
+                  <pr:smNativeData xmlns="" xmlns:pr="smNativeData" val="SMDATA_12_7hxgVxMAAAAlAAAAZAAAAA0AAAAAkAAAAEgAAACQAAAASAAAAAAAAAABAAAAAAAAAAEAAABQAAAAAAAAAAAA4D8AAAAAAADgPwAAAAAAAOA/AAAAAAAA4D8AAAAAAADgPwAAAAAAAOA/AAAAAAAA4D8AAAAAAADgPwAAAAAAAOA/AAAAAAAA4D8CAAAAjAAAAAEAAAAAAAAA/8AAAP///wgAAAAAAAAAAAAAAAAAAAAAAAAAAAAAAAAAAAAAeAAAAAEAAABAAAAAAAAAAAAAAABaAAAAAAAAAAAAAAAAAAAAAAAAAAAAAAAAAAAAAAAAAAAAAAAAAAAAAAAAAAAAAAAAAAAAAAAAAAAAAAAAAAAAAAAAAAAAAAAAAAAAFAAAADwAAAAAAAAAAAAAAAZJjAkUAAAAAQAAABQAAAAUAAAAFAAAAAEAAAAAAAAAZAAAAGQAAAAAAAAAZAAAAGQAAAAVAAAAYAAAAAAAAAAAAAAADwAAACADAAAAAAAAAAAAAAEAAACgMgAAVgcAAKr4//8BAAAAf39/AAEAAABkAAAAAAAAABQAAABAHwAAAAAAACYAAAAAAAAAwOD//wAAAAAmAAAAZAAAABYAAABMAAAAAAAAAAAAAAAEAAAAAAAAAAEAAACWlpYKAAAAACgAAAAoAAAAZAAAAGQAAAAAAAAAzMzMAAAAAABQAAAAUAAAAGQAAABkAAAAAAAAABcAAAAUAAAAAAAAAAAAAAD/fwAA/38AAAAAAAAJAAAABAAAAAAAAAAMAAAAEAAAAAAAAAAAAAAAAAAAAAAAAAAeAAAAaAAAAAAAAAAAAAAAAAAAAAAAAAAAAAAAECcAABAnAAAAAAAAAAAAAAAAAAAAAAAAAAAAAAAAAAAAAAAAAAAAABQAAAAAAAAAwMD/AAAAAABkAAAAMgAAAAAAAABkAAAAAAAAAH9/fwAKAAAAHwAAAFQAAAD/wAAA////AQAAAAAAAAAAAAAAAAAAAAAAAAAAAAAAAAAAAAAAAAAAAAAAAn9/fwDn5uYDzMzMAMDA/wB/f38AAAAAAAAAAAAAAAAAAAAAAAAAAAAhAAAAGAAAABQAAAAAAAAAhCEAAMsSAABBJgAAAAAAAA=="/>
                 </a:ext>
               </a:extLst>
             </p:cNvSpPr>
@@ -2987,7 +2990,7 @@
             <a:spLocks noGrp="1" noChangeArrowheads="1"/>
             <a:extLst>
               <a:ext uri="smNativeData">
-                <pr:smNativeData xmlns:pr="smNativeData" xmlns="" val="SMDATA_12_7hxgVxMAAAAlAAAAZAAAAA0AAAAAkAAAAEgAAACQAAAASAAAAAAAAAACAAAAAAAAAAEAAABQAAAAAAAAAAAA4D8AAAAAAADgPwAAAAAAAOA/AAAAAAAA4D8AAAAAAADgPwAAAAAAAOA/AAAAAAAA4D8AAAAAAADgPwAAAAAAAOA/AAAAAAAA4D8CAAAAjAAAAAAAAAAAAAAA////DP///wgAAAAAAAAAAAAAAAAAAAAAAAAAAAAAAAAAAAAAZAAAAAEAAABAAAAAAAAAAAAAAAAAAAAAAAAAAAAAAAAAAAAAAAAAAAAAAAAAAAAAAAAAAAAAAAAAAAAAAAAAAAAAAAAAAAAAAAAAAAAAAAAAAAAAAAAAAAAAAAAAAAAAFAAAADwAAAAAAAAAAAAAAAZJjAkUAAAAAQAAABQAAAAUAAAAFAAAAAEAAAAAAAAAZAAAAGQAAAAAAAAAZAAAAGQAAAAVAAAAYAAAAAAAAAAAAAAADwAAACADAAAAAAAAAAAAAAEAAACgMgAAVgcAAKr4//8BAAAAf39/AAEAAABkAAAAAAAAABQAAABAHwAAAAAAACYAAAAAAAAAwOD//wAAAAAmAAAAZAAAABYAAABMAAAAAAAAAAAAAAAEAAAAAAAAAAEAAACWlpYKAAAAACgAAAAoAAAAZAAAAGQAAAAAAAAAzMzMAAAAAABQAAAAUAAAAGQAAABkAAAAAAAAABcAAAAUAAAAAAAAAAAAAAD/fwAA/38AAAAAAAAJAAAABAAAAAAAAAAMAAAAEAAAAAAAAAAAAAAAAAAAAAAAAAAeAAAAaAAAAAAAAAAAAAAAAAAAAAAAAAAAAAAAECcAABAnAAAAAAAAAAAAAAAAAAAAAAAAAAAAAAAAAAAAAAAAAAAAABQAAAAAAAAAwMD/AAAAAABkAAAAMgAAAAAAAABkAAAAAAAAAH9/fwAKAAAAHwAAAFQAAABbm9UF////AQAAAAAAAAAAAAAAAAAAAAAAAAAAAAAAAAAAAAAAAAAAAAAAAn9/fwDn5uYDzMzMAMDA/wB/f38AAAAAAAAAAAAAAAAAAAAAAAAAAAAhAAAAGAAAABQAAADLEgAAFQkAAItHAABTHgAAAAAAAA=="/>
+                <pr:smNativeData xmlns="" xmlns:pr="smNativeData" val="SMDATA_12_7hxgVxMAAAAlAAAAZAAAAA0AAAAAkAAAAEgAAACQAAAASAAAAAAAAAACAAAAAAAAAAEAAABQAAAAAAAAAAAA4D8AAAAAAADgPwAAAAAAAOA/AAAAAAAA4D8AAAAAAADgPwAAAAAAAOA/AAAAAAAA4D8AAAAAAADgPwAAAAAAAOA/AAAAAAAA4D8CAAAAjAAAAAAAAAAAAAAA////DP///wgAAAAAAAAAAAAAAAAAAAAAAAAAAAAAAAAAAAAAZAAAAAEAAABAAAAAAAAAAAAAAAAAAAAAAAAAAAAAAAAAAAAAAAAAAAAAAAAAAAAAAAAAAAAAAAAAAAAAAAAAAAAAAAAAAAAAAAAAAAAAAAAAAAAAAAAAAAAAAAAAAAAAFAAAADwAAAAAAAAAAAAAAAZJjAkUAAAAAQAAABQAAAAUAAAAFAAAAAEAAAAAAAAAZAAAAGQAAAAAAAAAZAAAAGQAAAAVAAAAYAAAAAAAAAAAAAAADwAAACADAAAAAAAAAAAAAAEAAACgMgAAVgcAAKr4//8BAAAAf39/AAEAAABkAAAAAAAAABQAAABAHwAAAAAAACYAAAAAAAAAwOD//wAAAAAmAAAAZAAAABYAAABMAAAAAAAAAAAAAAAEAAAAAAAAAAEAAACWlpYKAAAAACgAAAAoAAAAZAAAAGQAAAAAAAAAzMzMAAAAAABQAAAAUAAAAGQAAABkAAAAAAAAABcAAAAUAAAAAAAAAAAAAAD/fwAA/38AAAAAAAAJAAAABAAAAAAAAAAMAAAAEAAAAAAAAAAAAAAAAAAAAAAAAAAeAAAAaAAAAAAAAAAAAAAAAAAAAAAAAAAAAAAAECcAABAnAAAAAAAAAAAAAAAAAAAAAAAAAAAAAAAAAAAAAAAAAAAAABQAAAAAAAAAwMD/AAAAAABkAAAAMgAAAAAAAABkAAAAAAAAAH9/fwAKAAAAHwAAAFQAAABbm9UF////AQAAAAAAAAAAAAAAAAAAAAAAAAAAAAAAAAAAAAAAAAAAAAAAAn9/fwDn5uYDzMzMAMDA/wB/f38AAAAAAAAAAAAAAAAAAAAAAAAAAAAhAAAAGAAAABQAAADLEgAAFQkAAItHAABTHgAAAAAAAA=="/>
               </a:ext>
             </a:extLst>
           </p:cNvSpPr>
@@ -3050,7 +3053,7 @@
             <a:spLocks noGrp="1" noChangeArrowheads="1"/>
             <a:extLst>
               <a:ext uri="smNativeData">
-                <pr:smNativeData xmlns:pr="smNativeData" xmlns="" val="SMDATA_12_7hxgVxMAAAAlAAAAZAAAAA0AAAAAkAAAAEgAAACQAAAASAAAAAAAAAAAAAAAAAAAAAEAAABQAAAAAAAAAAAA4D8AAAAAAADgPwAAAAAAAOA/AAAAAAAA4D8AAAAAAADgPwAAAAAAAOA/AAAAAAAA4D8AAAAAAADgPwAAAAAAAOA/AAAAAAAA4D8CAAAAjAAAAAAAAAAAAAAA////DP///wgAAAAAAAAAAAAAAAAAAAAAAAAAAAAAAAAAAAAAZAAAAAEAAABAAAAAAAAAAAAAAAAAAAAAAAAAAAAAAAAAAAAAAAAAAAAAAAAAAAAAAAAAAAAAAAAAAAAAAAAAAAAAAAAAAAAAAAAAAAAAAAAAAAAAAAAAAAAAAAAAAAAAFAAAADwAAAAAAAAAAAAAAAZJjAkUAAAAAQAAABQAAAAUAAAAFAAAAAEAAAAAAAAAZAAAAGQAAAAAAAAAZAAAAGQAAAAVAAAAYAAAAAAAAAAAAAAADwAAACADAAAAAAAAAAAAAAEAAACgMgAAVgcAAKr4//8BAAAAf39/AAEAAABkAAAAAAAAABQAAABAHwAAAAAAACYAAAAAAAAAwOD//wAAAAAmAAAAZAAAABYAAABMAAAAAAAAAAAAAAAEAAAAAAAAAAEAAACWlpYKAAAAACgAAAAoAAAAZAAAAGQAAAAAAAAAzMzMAAAAAABQAAAAUAAAAGQAAABkAAAAAAAAABcAAAAUAAAAAAAAAAAAAAD/fwAA/38AAAAAAAAJAAAABAAAAAAAAAAMAAAAEAAAAAAAAAAAAAAAAAAAAAAAAAAeAAAAaAAAAAAAAAAAAAAAAAAAAAAAAAAAAAAAECcAABAnAAAAAAAAAAAAAAAAAAAAAAAAAAAAAAAAAAAAAAAAAAAAABQAAAAAAAAAwMD/AAAAAABkAAAAMgAAAAAAAABkAAAAAAAAAH9/fwAKAAAAHwAAAFQAAABbm9UF////AQAAAAAAAAAAAAAAAAAAAAAAAAAAAAAAAAAAAAAAAAAAAAAAAn9/fwDn5uYDzMzMAMDA/wB/f38AAAAAAAAAAAAAAAAAAAAAAAAAAAAhAAAAGAAAABQAAADAEgAAzyEAAABLAAAWJgAAEAAAAA=="/>
+                <pr:smNativeData xmlns="" xmlns:pr="smNativeData" val="SMDATA_12_7hxgVxMAAAAlAAAAZAAAAA0AAAAAkAAAAEgAAACQAAAASAAAAAAAAAAAAAAAAAAAAAEAAABQAAAAAAAAAAAA4D8AAAAAAADgPwAAAAAAAOA/AAAAAAAA4D8AAAAAAADgPwAAAAAAAOA/AAAAAAAA4D8AAAAAAADgPwAAAAAAAOA/AAAAAAAA4D8CAAAAjAAAAAAAAAAAAAAA////DP///wgAAAAAAAAAAAAAAAAAAAAAAAAAAAAAAAAAAAAAZAAAAAEAAABAAAAAAAAAAAAAAAAAAAAAAAAAAAAAAAAAAAAAAAAAAAAAAAAAAAAAAAAAAAAAAAAAAAAAAAAAAAAAAAAAAAAAAAAAAAAAAAAAAAAAAAAAAAAAAAAAAAAAFAAAADwAAAAAAAAAAAAAAAZJjAkUAAAAAQAAABQAAAAUAAAAFAAAAAEAAAAAAAAAZAAAAGQAAAAAAAAAZAAAAGQAAAAVAAAAYAAAAAAAAAAAAAAADwAAACADAAAAAAAAAAAAAAEAAACgMgAAVgcAAKr4//8BAAAAf39/AAEAAABkAAAAAAAAABQAAABAHwAAAAAAACYAAAAAAAAAwOD//wAAAAAmAAAAZAAAABYAAABMAAAAAAAAAAAAAAAEAAAAAAAAAAEAAACWlpYKAAAAACgAAAAoAAAAZAAAAGQAAAAAAAAAzMzMAAAAAABQAAAAUAAAAGQAAABkAAAAAAAAABcAAAAUAAAAAAAAAAAAAAD/fwAA/38AAAAAAAAJAAAABAAAAAAAAAAMAAAAEAAAAAAAAAAAAAAAAAAAAAAAAAAeAAAAaAAAAAAAAAAAAAAAAAAAAAAAAAAAAAAAECcAABAnAAAAAAAAAAAAAAAAAAAAAAAAAAAAAAAAAAAAAAAAAAAAABQAAAAAAAAAwMD/AAAAAABkAAAAMgAAAAAAAABkAAAAAAAAAH9/fwAKAAAAHwAAAFQAAABbm9UF////AQAAAAAAAAAAAAAAAAAAAAAAAAAAAAAAAAAAAAAAAAAAAAAAAn9/fwDn5uYDzMzMAMDA/wB/f38AAAAAAAAAAAAAAAAAAAAAAAAAAAAhAAAAGAAAABQAAADAEgAAzyEAAABLAAAWJgAAEAAAAA=="/>
               </a:ext>
             </a:extLst>
           </p:cNvSpPr>
@@ -12050,11 +12053,7 @@
             <a:pPr lvl="1"/>
             <a:r>
               <a:rPr lang="pt-BR" dirty="0" smtClean="0"/>
-              <a:t>Igualdade para variáveis de </a:t>
-            </a:r>
-            <a:r>
-              <a:rPr lang="pt-BR" dirty="0" smtClean="0"/>
-              <a:t>referência</a:t>
+              <a:t>Igualdade para variáveis de referência</a:t>
             </a:r>
           </a:p>
           <a:p>
@@ -12665,44 +12664,196 @@
       </p:sp>
       <p:sp>
         <p:nvSpPr>
-          <p:cNvPr id="4" name="Espaço Reservado para Rodapé 3"/>
-          <p:cNvSpPr>
-            <a:spLocks noGrp="1"/>
-          </p:cNvSpPr>
-          <p:nvPr>
-            <p:ph type="ftr" sz="quarter" idx="11"/>
-          </p:nvPr>
-        </p:nvSpPr>
-        <p:spPr/>
-        <p:txBody>
-          <a:bodyPr/>
-          <a:lstStyle/>
-          <a:p>
-            <a:r>
-              <a:rPr lang="pt-BR" dirty="0" smtClean="0"/>
+          <p:cNvPr id="5" name="Espaço Reservado para Rodapé 3"/>
+          <p:cNvSpPr txBox="1">
+            <a:spLocks noGrp="1"/>
+          </p:cNvSpPr>
+          <p:nvPr>
+            <p:ph type="ftr" sz="quarter" idx="4294967295"/>
+          </p:nvPr>
+        </p:nvSpPr>
+        <p:spPr>
+          <a:xfrm>
+            <a:off x="3028950" y="6356351"/>
+            <a:ext cx="3086100" cy="365125"/>
+          </a:xfrm>
+          <a:prstGeom prst="rect">
+            <a:avLst/>
+          </a:prstGeom>
+        </p:spPr>
+        <p:txBody>
+          <a:bodyPr/>
+          <a:lstStyle>
+            <a:defPPr>
+              <a:defRPr lang="pt-BR"/>
+            </a:defPPr>
+            <a:lvl1pPr marL="0" algn="l" defTabSz="914400" rtl="0" eaLnBrk="1" latinLnBrk="0" hangingPunct="1">
+              <a:defRPr sz="1800" kern="1200">
+                <a:solidFill>
+                  <a:schemeClr val="tx1"/>
+                </a:solidFill>
+                <a:latin typeface="+mn-lt"/>
+                <a:ea typeface="+mn-ea"/>
+                <a:cs typeface="+mn-cs"/>
+              </a:defRPr>
+            </a:lvl1pPr>
+            <a:lvl2pPr marL="457200" algn="l" defTabSz="914400" rtl="0" eaLnBrk="1" latinLnBrk="0" hangingPunct="1">
+              <a:defRPr sz="1800" kern="1200">
+                <a:solidFill>
+                  <a:schemeClr val="tx1"/>
+                </a:solidFill>
+                <a:latin typeface="+mn-lt"/>
+                <a:ea typeface="+mn-ea"/>
+                <a:cs typeface="+mn-cs"/>
+              </a:defRPr>
+            </a:lvl2pPr>
+            <a:lvl3pPr marL="914400" algn="l" defTabSz="914400" rtl="0" eaLnBrk="1" latinLnBrk="0" hangingPunct="1">
+              <a:defRPr sz="1800" kern="1200">
+                <a:solidFill>
+                  <a:schemeClr val="tx1"/>
+                </a:solidFill>
+                <a:latin typeface="+mn-lt"/>
+                <a:ea typeface="+mn-ea"/>
+                <a:cs typeface="+mn-cs"/>
+              </a:defRPr>
+            </a:lvl3pPr>
+            <a:lvl4pPr marL="1371600" algn="l" defTabSz="914400" rtl="0" eaLnBrk="1" latinLnBrk="0" hangingPunct="1">
+              <a:defRPr sz="1800" kern="1200">
+                <a:solidFill>
+                  <a:schemeClr val="tx1"/>
+                </a:solidFill>
+                <a:latin typeface="+mn-lt"/>
+                <a:ea typeface="+mn-ea"/>
+                <a:cs typeface="+mn-cs"/>
+              </a:defRPr>
+            </a:lvl4pPr>
+            <a:lvl5pPr marL="1828800" algn="l" defTabSz="914400" rtl="0" eaLnBrk="1" latinLnBrk="0" hangingPunct="1">
+              <a:defRPr sz="1800" kern="1200">
+                <a:solidFill>
+                  <a:schemeClr val="tx1"/>
+                </a:solidFill>
+                <a:latin typeface="+mn-lt"/>
+                <a:ea typeface="+mn-ea"/>
+                <a:cs typeface="+mn-cs"/>
+              </a:defRPr>
+            </a:lvl5pPr>
+            <a:lvl6pPr marL="2286000" algn="l" defTabSz="914400" rtl="0" eaLnBrk="1" latinLnBrk="0" hangingPunct="1">
+              <a:defRPr sz="1800" kern="1200">
+                <a:solidFill>
+                  <a:schemeClr val="tx1"/>
+                </a:solidFill>
+                <a:latin typeface="+mn-lt"/>
+                <a:ea typeface="+mn-ea"/>
+                <a:cs typeface="+mn-cs"/>
+              </a:defRPr>
+            </a:lvl6pPr>
+            <a:lvl7pPr marL="2743200" algn="l" defTabSz="914400" rtl="0" eaLnBrk="1" latinLnBrk="0" hangingPunct="1">
+              <a:defRPr sz="1800" kern="1200">
+                <a:solidFill>
+                  <a:schemeClr val="tx1"/>
+                </a:solidFill>
+                <a:latin typeface="+mn-lt"/>
+                <a:ea typeface="+mn-ea"/>
+                <a:cs typeface="+mn-cs"/>
+              </a:defRPr>
+            </a:lvl7pPr>
+            <a:lvl8pPr marL="3200400" algn="l" defTabSz="914400" rtl="0" eaLnBrk="1" latinLnBrk="0" hangingPunct="1">
+              <a:defRPr sz="1800" kern="1200">
+                <a:solidFill>
+                  <a:schemeClr val="tx1"/>
+                </a:solidFill>
+                <a:latin typeface="+mn-lt"/>
+                <a:ea typeface="+mn-ea"/>
+                <a:cs typeface="+mn-cs"/>
+              </a:defRPr>
+            </a:lvl8pPr>
+            <a:lvl9pPr marL="3657600" algn="l" defTabSz="914400" rtl="0" eaLnBrk="1" latinLnBrk="0" hangingPunct="1">
+              <a:defRPr sz="1800" kern="1200">
+                <a:solidFill>
+                  <a:schemeClr val="tx1"/>
+                </a:solidFill>
+                <a:latin typeface="+mn-lt"/>
+                <a:ea typeface="+mn-ea"/>
+                <a:cs typeface="+mn-cs"/>
+              </a:defRPr>
+            </a:lvl9pPr>
+          </a:lstStyle>
+          <a:p>
+            <a:pPr algn="ctr">
+              <a:defRPr sz="1200">
+                <a:solidFill>
+                  <a:srgbClr val="8C8C8C"/>
+                </a:solidFill>
+                <a:latin typeface="Tw Cen MT" charset="0"/>
+                <a:ea typeface="Calibri" charset="0"/>
+                <a:cs typeface="Calibri" charset="0"/>
+              </a:defRPr>
+            </a:pPr>
+            <a:r>
+              <a:rPr lang="pt-BR" dirty="0"/>
               <a:t>Trabalhando com </a:t>
             </a:r>
             <a:r>
-              <a:rPr lang="pt-BR" dirty="0" err="1" smtClean="0"/>
+              <a:rPr lang="pt-BR" dirty="0" err="1"/>
               <a:t>Strings</a:t>
             </a:r>
             <a:r>
-              <a:rPr lang="pt-BR" dirty="0" smtClean="0"/>
+              <a:rPr lang="pt-BR" dirty="0"/>
               <a:t>, </a:t>
             </a:r>
             <a:r>
-              <a:rPr lang="pt-BR" dirty="0" err="1" smtClean="0"/>
+              <a:rPr lang="pt-BR" dirty="0" err="1"/>
               <a:t>Arrays</a:t>
             </a:r>
             <a:r>
-              <a:rPr lang="pt-BR" dirty="0" smtClean="0"/>
+              <a:rPr lang="pt-BR" dirty="0"/>
               <a:t> e </a:t>
             </a:r>
             <a:r>
-              <a:rPr lang="pt-BR" dirty="0" err="1" smtClean="0"/>
+              <a:rPr lang="pt-BR" dirty="0" err="1"/>
               <a:t>ArrayLists</a:t>
             </a:r>
             <a:endParaRPr lang="pt-BR" dirty="0"/>
+          </a:p>
+          <a:p>
+            <a:pPr algn="ctr">
+              <a:defRPr sz="1200">
+                <a:solidFill>
+                  <a:srgbClr val="8C8C8C"/>
+                </a:solidFill>
+                <a:latin typeface="Tw Cen MT" charset="0"/>
+                <a:ea typeface="Calibri" charset="0"/>
+                <a:cs typeface="Calibri" charset="0"/>
+              </a:defRPr>
+            </a:pPr>
+            <a:endParaRPr lang="pt-BR" sz="1200" dirty="0" smtClean="0">
+              <a:solidFill>
+                <a:srgbClr val="8C8C8C"/>
+              </a:solidFill>
+              <a:latin typeface="Tw Cen MT" charset="0"/>
+              <a:ea typeface="Calibri" charset="0"/>
+              <a:cs typeface="Calibri" charset="0"/>
+            </a:endParaRPr>
+          </a:p>
+          <a:p>
+            <a:pPr algn="ctr">
+              <a:defRPr sz="1200">
+                <a:solidFill>
+                  <a:srgbClr val="8C8C8C"/>
+                </a:solidFill>
+                <a:latin typeface="Tw Cen MT" charset="0"/>
+                <a:ea typeface="Calibri" charset="0"/>
+                <a:cs typeface="Calibri" charset="0"/>
+              </a:defRPr>
+            </a:pPr>
+            <a:endParaRPr lang="pt-BR" sz="1200" dirty="0">
+              <a:solidFill>
+                <a:srgbClr val="8C8C8C"/>
+              </a:solidFill>
+              <a:latin typeface="Tw Cen MT" charset="0"/>
+              <a:ea typeface="Calibri" charset="0"/>
+              <a:cs typeface="Calibri" charset="0"/>
+            </a:endParaRPr>
           </a:p>
         </p:txBody>
       </p:sp>
@@ -12745,12 +12896,12 @@
       </p:grpSpPr>
       <p:sp>
         <p:nvSpPr>
-          <p:cNvPr id="2" name="Título 1"/>
-          <p:cNvSpPr>
-            <a:spLocks noGrp="1"/>
-          </p:cNvSpPr>
-          <p:nvPr>
-            <p:ph type="ctrTitle"/>
+          <p:cNvPr id="5" name="Título 4"/>
+          <p:cNvSpPr>
+            <a:spLocks noGrp="1"/>
+          </p:cNvSpPr>
+          <p:nvPr>
+            <p:ph type="title"/>
           </p:nvPr>
         </p:nvSpPr>
         <p:spPr/>
@@ -12759,12 +12910,150 @@
           <a:lstStyle/>
           <a:p>
             <a:r>
-              <a:rPr lang="pt-BR" dirty="0" smtClean="0"/>
+              <a:rPr lang="pt-BR" dirty="0"/>
               <a:t>Usando </a:t>
             </a:r>
             <a:r>
+              <a:rPr lang="pt-BR" dirty="0" err="1"/>
+              <a:t>Strings</a:t>
+            </a:r>
+            <a:r>
+              <a:rPr lang="pt-BR" dirty="0"/>
+              <a:t> e </a:t>
+            </a:r>
+            <a:r>
+              <a:rPr lang="pt-BR" dirty="0" err="1"/>
+              <a:t>StringBuilder</a:t>
+            </a:r>
+            <a:endParaRPr lang="pt-BR" dirty="0"/>
+          </a:p>
+        </p:txBody>
+      </p:sp>
+      <p:sp>
+        <p:nvSpPr>
+          <p:cNvPr id="6" name="Espaço Reservado para Conteúdo 5"/>
+          <p:cNvSpPr>
+            <a:spLocks noGrp="1"/>
+          </p:cNvSpPr>
+          <p:nvPr>
+            <p:ph idx="1"/>
+          </p:nvPr>
+        </p:nvSpPr>
+        <p:spPr/>
+        <p:txBody>
+          <a:bodyPr/>
+          <a:lstStyle/>
+          <a:p>
+            <a:r>
+              <a:rPr lang="pt-BR" dirty="0" smtClean="0"/>
+              <a:t>A classe </a:t>
+            </a:r>
+            <a:r>
               <a:rPr lang="pt-BR" dirty="0" err="1" smtClean="0"/>
-              <a:t>Arrays</a:t>
+              <a:t>String</a:t>
+            </a:r>
+            <a:endParaRPr lang="pt-BR" dirty="0" smtClean="0"/>
+          </a:p>
+          <a:p>
+            <a:pPr lvl="1"/>
+            <a:r>
+              <a:rPr lang="pt-BR" dirty="0" smtClean="0"/>
+              <a:t>Imutabilidade de </a:t>
+            </a:r>
+            <a:r>
+              <a:rPr lang="pt-BR" dirty="0" err="1" smtClean="0"/>
+              <a:t>Strings</a:t>
+            </a:r>
+            <a:endParaRPr lang="pt-BR" dirty="0" smtClean="0"/>
+          </a:p>
+          <a:p>
+            <a:r>
+              <a:rPr lang="pt-BR" dirty="0" smtClean="0"/>
+              <a:t>Fatos importantes sobre </a:t>
+            </a:r>
+            <a:r>
+              <a:rPr lang="pt-BR" dirty="0" err="1" smtClean="0"/>
+              <a:t>String</a:t>
+            </a:r>
+            <a:r>
+              <a:rPr lang="pt-BR" dirty="0" smtClean="0"/>
+              <a:t> e memória</a:t>
+            </a:r>
+          </a:p>
+          <a:p>
+            <a:pPr lvl="1"/>
+            <a:r>
+              <a:rPr lang="pt-BR" dirty="0" smtClean="0"/>
+              <a:t>Criando novas </a:t>
+            </a:r>
+            <a:r>
+              <a:rPr lang="pt-BR" dirty="0" err="1" smtClean="0"/>
+              <a:t>Strings</a:t>
+            </a:r>
+            <a:endParaRPr lang="pt-BR" dirty="0" smtClean="0"/>
+          </a:p>
+          <a:p>
+            <a:r>
+              <a:rPr lang="pt-BR" dirty="0" smtClean="0"/>
+              <a:t>Métodos importantes na classe </a:t>
+            </a:r>
+            <a:r>
+              <a:rPr lang="pt-BR" dirty="0" err="1" smtClean="0"/>
+              <a:t>String</a:t>
+            </a:r>
+            <a:endParaRPr lang="pt-BR" dirty="0" smtClean="0"/>
+          </a:p>
+          <a:p>
+            <a:r>
+              <a:rPr lang="pt-BR" dirty="0" smtClean="0"/>
+              <a:t>A classe </a:t>
+            </a:r>
+            <a:r>
+              <a:rPr lang="pt-BR" dirty="0" err="1" smtClean="0"/>
+              <a:t>StringBuilder</a:t>
+            </a:r>
+            <a:endParaRPr lang="pt-BR" dirty="0" smtClean="0"/>
+          </a:p>
+          <a:p>
+            <a:pPr lvl="1"/>
+            <a:r>
+              <a:rPr lang="pt-BR" dirty="0" smtClean="0"/>
+              <a:t>Preferência de </a:t>
+            </a:r>
+            <a:r>
+              <a:rPr lang="pt-BR" dirty="0" err="1" smtClean="0"/>
+              <a:t>StringBuilder</a:t>
+            </a:r>
+            <a:r>
+              <a:rPr lang="pt-BR" dirty="0" smtClean="0"/>
+              <a:t> sobre </a:t>
+            </a:r>
+            <a:r>
+              <a:rPr lang="pt-BR" dirty="0" err="1" smtClean="0"/>
+              <a:t>StringBuffer</a:t>
+            </a:r>
+            <a:endParaRPr lang="pt-BR" dirty="0" smtClean="0"/>
+          </a:p>
+          <a:p>
+            <a:pPr lvl="1"/>
+            <a:r>
+              <a:rPr lang="pt-BR" dirty="0" smtClean="0"/>
+              <a:t>Usando </a:t>
+            </a:r>
+            <a:r>
+              <a:rPr lang="pt-BR" dirty="0" err="1" smtClean="0"/>
+              <a:t>StringBuilder</a:t>
+            </a:r>
+            <a:endParaRPr lang="pt-BR" dirty="0" smtClean="0"/>
+          </a:p>
+          <a:p>
+            <a:r>
+              <a:rPr lang="pt-BR" dirty="0" smtClean="0"/>
+              <a:t>Métodos importantes na classe </a:t>
+            </a:r>
+            <a:r>
+              <a:rPr lang="pt-BR" dirty="0" err="1" smtClean="0"/>
+              <a:t>StringBuilder</a:t>
             </a:r>
             <a:endParaRPr lang="pt-BR" dirty="0"/>
           </a:p>
@@ -12772,58 +13061,131 @@
       </p:sp>
       <p:sp>
         <p:nvSpPr>
-          <p:cNvPr id="3" name="Subtítulo 2"/>
-          <p:cNvSpPr>
-            <a:spLocks noGrp="1"/>
-          </p:cNvSpPr>
-          <p:nvPr>
-            <p:ph type="subTitle" idx="1"/>
-          </p:nvPr>
-        </p:nvSpPr>
-        <p:spPr/>
-        <p:txBody>
-          <a:bodyPr/>
-          <a:lstStyle/>
-          <a:p>
-            <a:r>
-              <a:rPr lang="pt-BR" dirty="0" smtClean="0"/>
-              <a:t>OCA </a:t>
-            </a:r>
-            <a:r>
-              <a:rPr lang="pt-BR" dirty="0" err="1" smtClean="0"/>
-              <a:t>Objectives</a:t>
-            </a:r>
-            <a:r>
-              <a:rPr lang="pt-BR" dirty="0" smtClean="0"/>
-              <a:t> 4.1 </a:t>
-            </a:r>
-            <a:r>
-              <a:rPr lang="pt-BR" dirty="0" err="1" smtClean="0"/>
-              <a:t>and</a:t>
-            </a:r>
-            <a:r>
-              <a:rPr lang="pt-BR" dirty="0" smtClean="0"/>
-              <a:t> 4.2</a:t>
-            </a:r>
-            <a:endParaRPr lang="pt-BR" dirty="0"/>
-          </a:p>
-        </p:txBody>
-      </p:sp>
-      <p:sp>
-        <p:nvSpPr>
-          <p:cNvPr id="4" name="Espaço Reservado para Rodapé 3"/>
-          <p:cNvSpPr>
-            <a:spLocks noGrp="1"/>
-          </p:cNvSpPr>
-          <p:nvPr>
-            <p:ph type="ftr" sz="quarter" idx="11"/>
-          </p:nvPr>
-        </p:nvSpPr>
-        <p:spPr/>
-        <p:txBody>
-          <a:bodyPr/>
-          <a:lstStyle/>
-          <a:p>
+          <p:cNvPr id="8" name="Espaço Reservado para Rodapé 3"/>
+          <p:cNvSpPr txBox="1">
+            <a:spLocks noGrp="1"/>
+          </p:cNvSpPr>
+          <p:nvPr>
+            <p:ph type="ftr" sz="quarter" idx="4294967295"/>
+          </p:nvPr>
+        </p:nvSpPr>
+        <p:spPr>
+          <a:xfrm>
+            <a:off x="3028950" y="6356351"/>
+            <a:ext cx="3086100" cy="365125"/>
+          </a:xfrm>
+          <a:prstGeom prst="rect">
+            <a:avLst/>
+          </a:prstGeom>
+        </p:spPr>
+        <p:txBody>
+          <a:bodyPr/>
+          <a:lstStyle>
+            <a:defPPr>
+              <a:defRPr lang="pt-BR"/>
+            </a:defPPr>
+            <a:lvl1pPr marL="0" algn="l" defTabSz="914400" rtl="0" eaLnBrk="1" latinLnBrk="0" hangingPunct="1">
+              <a:defRPr sz="1800" kern="1200">
+                <a:solidFill>
+                  <a:schemeClr val="tx1"/>
+                </a:solidFill>
+                <a:latin typeface="+mn-lt"/>
+                <a:ea typeface="+mn-ea"/>
+                <a:cs typeface="+mn-cs"/>
+              </a:defRPr>
+            </a:lvl1pPr>
+            <a:lvl2pPr marL="457200" algn="l" defTabSz="914400" rtl="0" eaLnBrk="1" latinLnBrk="0" hangingPunct="1">
+              <a:defRPr sz="1800" kern="1200">
+                <a:solidFill>
+                  <a:schemeClr val="tx1"/>
+                </a:solidFill>
+                <a:latin typeface="+mn-lt"/>
+                <a:ea typeface="+mn-ea"/>
+                <a:cs typeface="+mn-cs"/>
+              </a:defRPr>
+            </a:lvl2pPr>
+            <a:lvl3pPr marL="914400" algn="l" defTabSz="914400" rtl="0" eaLnBrk="1" latinLnBrk="0" hangingPunct="1">
+              <a:defRPr sz="1800" kern="1200">
+                <a:solidFill>
+                  <a:schemeClr val="tx1"/>
+                </a:solidFill>
+                <a:latin typeface="+mn-lt"/>
+                <a:ea typeface="+mn-ea"/>
+                <a:cs typeface="+mn-cs"/>
+              </a:defRPr>
+            </a:lvl3pPr>
+            <a:lvl4pPr marL="1371600" algn="l" defTabSz="914400" rtl="0" eaLnBrk="1" latinLnBrk="0" hangingPunct="1">
+              <a:defRPr sz="1800" kern="1200">
+                <a:solidFill>
+                  <a:schemeClr val="tx1"/>
+                </a:solidFill>
+                <a:latin typeface="+mn-lt"/>
+                <a:ea typeface="+mn-ea"/>
+                <a:cs typeface="+mn-cs"/>
+              </a:defRPr>
+            </a:lvl4pPr>
+            <a:lvl5pPr marL="1828800" algn="l" defTabSz="914400" rtl="0" eaLnBrk="1" latinLnBrk="0" hangingPunct="1">
+              <a:defRPr sz="1800" kern="1200">
+                <a:solidFill>
+                  <a:schemeClr val="tx1"/>
+                </a:solidFill>
+                <a:latin typeface="+mn-lt"/>
+                <a:ea typeface="+mn-ea"/>
+                <a:cs typeface="+mn-cs"/>
+              </a:defRPr>
+            </a:lvl5pPr>
+            <a:lvl6pPr marL="2286000" algn="l" defTabSz="914400" rtl="0" eaLnBrk="1" latinLnBrk="0" hangingPunct="1">
+              <a:defRPr sz="1800" kern="1200">
+                <a:solidFill>
+                  <a:schemeClr val="tx1"/>
+                </a:solidFill>
+                <a:latin typeface="+mn-lt"/>
+                <a:ea typeface="+mn-ea"/>
+                <a:cs typeface="+mn-cs"/>
+              </a:defRPr>
+            </a:lvl6pPr>
+            <a:lvl7pPr marL="2743200" algn="l" defTabSz="914400" rtl="0" eaLnBrk="1" latinLnBrk="0" hangingPunct="1">
+              <a:defRPr sz="1800" kern="1200">
+                <a:solidFill>
+                  <a:schemeClr val="tx1"/>
+                </a:solidFill>
+                <a:latin typeface="+mn-lt"/>
+                <a:ea typeface="+mn-ea"/>
+                <a:cs typeface="+mn-cs"/>
+              </a:defRPr>
+            </a:lvl7pPr>
+            <a:lvl8pPr marL="3200400" algn="l" defTabSz="914400" rtl="0" eaLnBrk="1" latinLnBrk="0" hangingPunct="1">
+              <a:defRPr sz="1800" kern="1200">
+                <a:solidFill>
+                  <a:schemeClr val="tx1"/>
+                </a:solidFill>
+                <a:latin typeface="+mn-lt"/>
+                <a:ea typeface="+mn-ea"/>
+                <a:cs typeface="+mn-cs"/>
+              </a:defRPr>
+            </a:lvl8pPr>
+            <a:lvl9pPr marL="3657600" algn="l" defTabSz="914400" rtl="0" eaLnBrk="1" latinLnBrk="0" hangingPunct="1">
+              <a:defRPr sz="1800" kern="1200">
+                <a:solidFill>
+                  <a:schemeClr val="tx1"/>
+                </a:solidFill>
+                <a:latin typeface="+mn-lt"/>
+                <a:ea typeface="+mn-ea"/>
+                <a:cs typeface="+mn-cs"/>
+              </a:defRPr>
+            </a:lvl9pPr>
+          </a:lstStyle>
+          <a:p>
+            <a:pPr algn="ctr">
+              <a:defRPr sz="1200">
+                <a:solidFill>
+                  <a:srgbClr val="8C8C8C"/>
+                </a:solidFill>
+                <a:latin typeface="Tw Cen MT" charset="0"/>
+                <a:ea typeface="Calibri" charset="0"/>
+                <a:cs typeface="Calibri" charset="0"/>
+              </a:defRPr>
+            </a:pPr>
             <a:r>
               <a:rPr lang="pt-BR" dirty="0"/>
               <a:t>Trabalhando com </a:t>
@@ -12851,27 +13213,57 @@
             <a:endParaRPr lang="pt-BR" dirty="0"/>
           </a:p>
           <a:p>
-            <a:endParaRPr lang="pt-BR" dirty="0"/>
+            <a:pPr algn="ctr">
+              <a:defRPr sz="1200">
+                <a:solidFill>
+                  <a:srgbClr val="8C8C8C"/>
+                </a:solidFill>
+                <a:latin typeface="Tw Cen MT" charset="0"/>
+                <a:ea typeface="Calibri" charset="0"/>
+                <a:cs typeface="Calibri" charset="0"/>
+              </a:defRPr>
+            </a:pPr>
+            <a:endParaRPr lang="pt-BR" sz="1200" dirty="0" smtClean="0">
+              <a:solidFill>
+                <a:srgbClr val="8C8C8C"/>
+              </a:solidFill>
+              <a:latin typeface="Tw Cen MT" charset="0"/>
+              <a:ea typeface="Calibri" charset="0"/>
+              <a:cs typeface="Calibri" charset="0"/>
+            </a:endParaRPr>
+          </a:p>
+          <a:p>
+            <a:pPr algn="ctr">
+              <a:defRPr sz="1200">
+                <a:solidFill>
+                  <a:srgbClr val="8C8C8C"/>
+                </a:solidFill>
+                <a:latin typeface="Tw Cen MT" charset="0"/>
+                <a:ea typeface="Calibri" charset="0"/>
+                <a:cs typeface="Calibri" charset="0"/>
+              </a:defRPr>
+            </a:pPr>
+            <a:endParaRPr lang="pt-BR" sz="1200" dirty="0">
+              <a:solidFill>
+                <a:srgbClr val="8C8C8C"/>
+              </a:solidFill>
+              <a:latin typeface="Tw Cen MT" charset="0"/>
+              <a:ea typeface="Calibri" charset="0"/>
+              <a:cs typeface="Calibri" charset="0"/>
+            </a:endParaRPr>
           </a:p>
         </p:txBody>
       </p:sp>
     </p:spTree>
     <p:extLst>
       <p:ext uri="{BB962C8B-B14F-4D97-AF65-F5344CB8AC3E}">
-        <p14:creationId xmlns:p14="http://schemas.microsoft.com/office/powerpoint/2010/main" val="1389997935"/>
+        <p14:creationId xmlns:p14="http://schemas.microsoft.com/office/powerpoint/2010/main" val="1541038056"/>
       </p:ext>
     </p:extLst>
   </p:cSld>
   <p:clrMapOvr>
     <a:masterClrMapping/>
   </p:clrMapOvr>
-  <p:timing>
-    <p:tnLst>
-      <p:par>
-        <p:cTn id="1" dur="indefinite" restart="never" nodeType="tmRoot"/>
-      </p:par>
-    </p:tnLst>
-  </p:timing>
 </p:sld>
 </file>
 
@@ -12913,7 +13305,7 @@
             </a:r>
             <a:r>
               <a:rPr lang="pt-BR" dirty="0" err="1" smtClean="0"/>
-              <a:t>ArrayList</a:t>
+              <a:t>Arrays</a:t>
             </a:r>
             <a:endParaRPr lang="pt-BR" dirty="0"/>
           </a:p>
@@ -12940,11 +13332,19 @@
             </a:r>
             <a:r>
               <a:rPr lang="pt-BR" dirty="0" err="1" smtClean="0"/>
-              <a:t>Objective</a:t>
-            </a:r>
-            <a:r>
-              <a:rPr lang="pt-BR" dirty="0" smtClean="0"/>
-              <a:t> 4.3</a:t>
+              <a:t>Objectives</a:t>
+            </a:r>
+            <a:r>
+              <a:rPr lang="pt-BR" dirty="0" smtClean="0"/>
+              <a:t> 4.1 </a:t>
+            </a:r>
+            <a:r>
+              <a:rPr lang="pt-BR" dirty="0" err="1" smtClean="0"/>
+              <a:t>and</a:t>
+            </a:r>
+            <a:r>
+              <a:rPr lang="pt-BR" dirty="0" smtClean="0"/>
+              <a:t> 4.2</a:t>
             </a:r>
             <a:endParaRPr lang="pt-BR" dirty="0"/>
           </a:p>
@@ -12952,19 +13352,131 @@
       </p:sp>
       <p:sp>
         <p:nvSpPr>
-          <p:cNvPr id="4" name="Espaço Reservado para Rodapé 3"/>
-          <p:cNvSpPr>
-            <a:spLocks noGrp="1"/>
-          </p:cNvSpPr>
-          <p:nvPr>
-            <p:ph type="ftr" sz="quarter" idx="11"/>
-          </p:nvPr>
-        </p:nvSpPr>
-        <p:spPr/>
-        <p:txBody>
-          <a:bodyPr/>
-          <a:lstStyle/>
-          <a:p>
+          <p:cNvPr id="5" name="Espaço Reservado para Rodapé 3"/>
+          <p:cNvSpPr txBox="1">
+            <a:spLocks noGrp="1"/>
+          </p:cNvSpPr>
+          <p:nvPr>
+            <p:ph type="ftr" sz="quarter" idx="4294967295"/>
+          </p:nvPr>
+        </p:nvSpPr>
+        <p:spPr>
+          <a:xfrm>
+            <a:off x="3028950" y="6356351"/>
+            <a:ext cx="3086100" cy="365125"/>
+          </a:xfrm>
+          <a:prstGeom prst="rect">
+            <a:avLst/>
+          </a:prstGeom>
+        </p:spPr>
+        <p:txBody>
+          <a:bodyPr/>
+          <a:lstStyle>
+            <a:defPPr>
+              <a:defRPr lang="pt-BR"/>
+            </a:defPPr>
+            <a:lvl1pPr marL="0" algn="l" defTabSz="914400" rtl="0" eaLnBrk="1" latinLnBrk="0" hangingPunct="1">
+              <a:defRPr sz="1800" kern="1200">
+                <a:solidFill>
+                  <a:schemeClr val="tx1"/>
+                </a:solidFill>
+                <a:latin typeface="+mn-lt"/>
+                <a:ea typeface="+mn-ea"/>
+                <a:cs typeface="+mn-cs"/>
+              </a:defRPr>
+            </a:lvl1pPr>
+            <a:lvl2pPr marL="457200" algn="l" defTabSz="914400" rtl="0" eaLnBrk="1" latinLnBrk="0" hangingPunct="1">
+              <a:defRPr sz="1800" kern="1200">
+                <a:solidFill>
+                  <a:schemeClr val="tx1"/>
+                </a:solidFill>
+                <a:latin typeface="+mn-lt"/>
+                <a:ea typeface="+mn-ea"/>
+                <a:cs typeface="+mn-cs"/>
+              </a:defRPr>
+            </a:lvl2pPr>
+            <a:lvl3pPr marL="914400" algn="l" defTabSz="914400" rtl="0" eaLnBrk="1" latinLnBrk="0" hangingPunct="1">
+              <a:defRPr sz="1800" kern="1200">
+                <a:solidFill>
+                  <a:schemeClr val="tx1"/>
+                </a:solidFill>
+                <a:latin typeface="+mn-lt"/>
+                <a:ea typeface="+mn-ea"/>
+                <a:cs typeface="+mn-cs"/>
+              </a:defRPr>
+            </a:lvl3pPr>
+            <a:lvl4pPr marL="1371600" algn="l" defTabSz="914400" rtl="0" eaLnBrk="1" latinLnBrk="0" hangingPunct="1">
+              <a:defRPr sz="1800" kern="1200">
+                <a:solidFill>
+                  <a:schemeClr val="tx1"/>
+                </a:solidFill>
+                <a:latin typeface="+mn-lt"/>
+                <a:ea typeface="+mn-ea"/>
+                <a:cs typeface="+mn-cs"/>
+              </a:defRPr>
+            </a:lvl4pPr>
+            <a:lvl5pPr marL="1828800" algn="l" defTabSz="914400" rtl="0" eaLnBrk="1" latinLnBrk="0" hangingPunct="1">
+              <a:defRPr sz="1800" kern="1200">
+                <a:solidFill>
+                  <a:schemeClr val="tx1"/>
+                </a:solidFill>
+                <a:latin typeface="+mn-lt"/>
+                <a:ea typeface="+mn-ea"/>
+                <a:cs typeface="+mn-cs"/>
+              </a:defRPr>
+            </a:lvl5pPr>
+            <a:lvl6pPr marL="2286000" algn="l" defTabSz="914400" rtl="0" eaLnBrk="1" latinLnBrk="0" hangingPunct="1">
+              <a:defRPr sz="1800" kern="1200">
+                <a:solidFill>
+                  <a:schemeClr val="tx1"/>
+                </a:solidFill>
+                <a:latin typeface="+mn-lt"/>
+                <a:ea typeface="+mn-ea"/>
+                <a:cs typeface="+mn-cs"/>
+              </a:defRPr>
+            </a:lvl6pPr>
+            <a:lvl7pPr marL="2743200" algn="l" defTabSz="914400" rtl="0" eaLnBrk="1" latinLnBrk="0" hangingPunct="1">
+              <a:defRPr sz="1800" kern="1200">
+                <a:solidFill>
+                  <a:schemeClr val="tx1"/>
+                </a:solidFill>
+                <a:latin typeface="+mn-lt"/>
+                <a:ea typeface="+mn-ea"/>
+                <a:cs typeface="+mn-cs"/>
+              </a:defRPr>
+            </a:lvl7pPr>
+            <a:lvl8pPr marL="3200400" algn="l" defTabSz="914400" rtl="0" eaLnBrk="1" latinLnBrk="0" hangingPunct="1">
+              <a:defRPr sz="1800" kern="1200">
+                <a:solidFill>
+                  <a:schemeClr val="tx1"/>
+                </a:solidFill>
+                <a:latin typeface="+mn-lt"/>
+                <a:ea typeface="+mn-ea"/>
+                <a:cs typeface="+mn-cs"/>
+              </a:defRPr>
+            </a:lvl8pPr>
+            <a:lvl9pPr marL="3657600" algn="l" defTabSz="914400" rtl="0" eaLnBrk="1" latinLnBrk="0" hangingPunct="1">
+              <a:defRPr sz="1800" kern="1200">
+                <a:solidFill>
+                  <a:schemeClr val="tx1"/>
+                </a:solidFill>
+                <a:latin typeface="+mn-lt"/>
+                <a:ea typeface="+mn-ea"/>
+                <a:cs typeface="+mn-cs"/>
+              </a:defRPr>
+            </a:lvl9pPr>
+          </a:lstStyle>
+          <a:p>
+            <a:pPr algn="ctr">
+              <a:defRPr sz="1200">
+                <a:solidFill>
+                  <a:srgbClr val="8C8C8C"/>
+                </a:solidFill>
+                <a:latin typeface="Tw Cen MT" charset="0"/>
+                <a:ea typeface="Calibri" charset="0"/>
+                <a:cs typeface="Calibri" charset="0"/>
+              </a:defRPr>
+            </a:pPr>
             <a:r>
               <a:rPr lang="pt-BR" dirty="0"/>
               <a:t>Trabalhando com </a:t>
@@ -12992,14 +13504,51 @@
             <a:endParaRPr lang="pt-BR" dirty="0"/>
           </a:p>
           <a:p>
-            <a:endParaRPr lang="pt-BR" dirty="0"/>
+            <a:pPr algn="ctr">
+              <a:defRPr sz="1200">
+                <a:solidFill>
+                  <a:srgbClr val="8C8C8C"/>
+                </a:solidFill>
+                <a:latin typeface="Tw Cen MT" charset="0"/>
+                <a:ea typeface="Calibri" charset="0"/>
+                <a:cs typeface="Calibri" charset="0"/>
+              </a:defRPr>
+            </a:pPr>
+            <a:endParaRPr lang="pt-BR" sz="1200" dirty="0" smtClean="0">
+              <a:solidFill>
+                <a:srgbClr val="8C8C8C"/>
+              </a:solidFill>
+              <a:latin typeface="Tw Cen MT" charset="0"/>
+              <a:ea typeface="Calibri" charset="0"/>
+              <a:cs typeface="Calibri" charset="0"/>
+            </a:endParaRPr>
+          </a:p>
+          <a:p>
+            <a:pPr algn="ctr">
+              <a:defRPr sz="1200">
+                <a:solidFill>
+                  <a:srgbClr val="8C8C8C"/>
+                </a:solidFill>
+                <a:latin typeface="Tw Cen MT" charset="0"/>
+                <a:ea typeface="Calibri" charset="0"/>
+                <a:cs typeface="Calibri" charset="0"/>
+              </a:defRPr>
+            </a:pPr>
+            <a:endParaRPr lang="pt-BR" sz="1200" dirty="0">
+              <a:solidFill>
+                <a:srgbClr val="8C8C8C"/>
+              </a:solidFill>
+              <a:latin typeface="Tw Cen MT" charset="0"/>
+              <a:ea typeface="Calibri" charset="0"/>
+              <a:cs typeface="Calibri" charset="0"/>
+            </a:endParaRPr>
           </a:p>
         </p:txBody>
       </p:sp>
     </p:spTree>
     <p:extLst>
       <p:ext uri="{BB962C8B-B14F-4D97-AF65-F5344CB8AC3E}">
-        <p14:creationId xmlns:p14="http://schemas.microsoft.com/office/powerpoint/2010/main" val="2158061903"/>
+        <p14:creationId xmlns:p14="http://schemas.microsoft.com/office/powerpoint/2010/main" val="1389997935"/>
       </p:ext>
     </p:extLst>
   </p:cSld>
@@ -13035,12 +13584,12 @@
       </p:grpSpPr>
       <p:sp>
         <p:nvSpPr>
-          <p:cNvPr id="2" name="Título 1"/>
-          <p:cNvSpPr>
-            <a:spLocks noGrp="1"/>
-          </p:cNvSpPr>
-          <p:nvPr>
-            <p:ph type="ctrTitle"/>
+          <p:cNvPr id="5" name="Título 4"/>
+          <p:cNvSpPr>
+            <a:spLocks noGrp="1"/>
+          </p:cNvSpPr>
+          <p:nvPr>
+            <p:ph type="title"/>
           </p:nvPr>
         </p:nvSpPr>
         <p:spPr/>
@@ -13049,16 +13598,12 @@
           <a:lstStyle/>
           <a:p>
             <a:r>
-              <a:rPr lang="pt-BR" dirty="0" smtClean="0"/>
+              <a:rPr lang="pt-BR" dirty="0"/>
               <a:t>Usando </a:t>
             </a:r>
             <a:r>
-              <a:rPr lang="pt-BR" dirty="0" err="1" smtClean="0"/>
-              <a:t>if</a:t>
-            </a:r>
-            <a:r>
-              <a:rPr lang="pt-BR" dirty="0" smtClean="0"/>
-              <a:t> e switch</a:t>
+              <a:rPr lang="pt-BR" dirty="0" err="1"/>
+              <a:t>Arrays</a:t>
             </a:r>
             <a:endParaRPr lang="pt-BR" dirty="0"/>
           </a:p>
@@ -13066,75 +13611,429 @@
       </p:sp>
       <p:sp>
         <p:nvSpPr>
-          <p:cNvPr id="3" name="Subtítulo 2"/>
-          <p:cNvSpPr>
-            <a:spLocks noGrp="1"/>
-          </p:cNvSpPr>
-          <p:nvPr>
-            <p:ph type="subTitle" idx="1"/>
-          </p:nvPr>
-        </p:nvSpPr>
-        <p:spPr/>
-        <p:txBody>
-          <a:bodyPr/>
-          <a:lstStyle/>
-          <a:p>
-            <a:r>
-              <a:rPr lang="pt-BR" dirty="0" smtClean="0"/>
-              <a:t>OCA </a:t>
-            </a:r>
-            <a:r>
-              <a:rPr lang="pt-BR" dirty="0" err="1" smtClean="0"/>
-              <a:t>Objectives</a:t>
-            </a:r>
-            <a:r>
-              <a:rPr lang="pt-BR" dirty="0" smtClean="0"/>
-              <a:t> 3.4, 3.5 e 1.1 upgrade</a:t>
+          <p:cNvPr id="6" name="Espaço Reservado para Conteúdo 5"/>
+          <p:cNvSpPr>
+            <a:spLocks noGrp="1"/>
+          </p:cNvSpPr>
+          <p:nvPr>
+            <p:ph idx="1"/>
+          </p:nvPr>
+        </p:nvSpPr>
+        <p:spPr>
+          <a:xfrm>
+            <a:off x="628650" y="1484784"/>
+            <a:ext cx="7886700" cy="4680520"/>
+          </a:xfrm>
+        </p:spPr>
+        <p:txBody>
+          <a:bodyPr/>
+          <a:lstStyle/>
+          <a:p>
+            <a:r>
+              <a:rPr lang="pt-BR" sz="2000" dirty="0" smtClean="0"/>
+              <a:t>Conceito</a:t>
+            </a:r>
+          </a:p>
+          <a:p>
+            <a:r>
+              <a:rPr lang="pt-BR" sz="2000" dirty="0" smtClean="0"/>
+              <a:t>Declarando um </a:t>
+            </a:r>
+            <a:r>
+              <a:rPr lang="pt-BR" sz="2000" dirty="0" err="1" smtClean="0"/>
+              <a:t>Array</a:t>
+            </a:r>
+            <a:endParaRPr lang="pt-BR" sz="2000" dirty="0" smtClean="0"/>
+          </a:p>
+          <a:p>
+            <a:r>
+              <a:rPr lang="pt-BR" sz="2000" dirty="0" smtClean="0"/>
+              <a:t>Construindo um </a:t>
+            </a:r>
+            <a:r>
+              <a:rPr lang="pt-BR" sz="2000" dirty="0" err="1" smtClean="0"/>
+              <a:t>Array</a:t>
+            </a:r>
+            <a:endParaRPr lang="pt-BR" sz="2000" dirty="0" smtClean="0"/>
+          </a:p>
+          <a:p>
+            <a:pPr lvl="1"/>
+            <a:r>
+              <a:rPr lang="pt-BR" sz="1800" dirty="0" err="1" smtClean="0"/>
+              <a:t>Contruindo</a:t>
+            </a:r>
+            <a:r>
+              <a:rPr lang="pt-BR" sz="1800" dirty="0" smtClean="0"/>
+              <a:t> um </a:t>
+            </a:r>
+            <a:r>
+              <a:rPr lang="pt-BR" sz="1800" dirty="0" err="1" smtClean="0"/>
+              <a:t>Array</a:t>
+            </a:r>
+            <a:r>
+              <a:rPr lang="pt-BR" sz="1800" dirty="0" smtClean="0"/>
+              <a:t> unidimensional</a:t>
+            </a:r>
+          </a:p>
+          <a:p>
+            <a:pPr lvl="1"/>
+            <a:r>
+              <a:rPr lang="pt-BR" sz="1800" dirty="0" smtClean="0"/>
+              <a:t>Construindo um </a:t>
+            </a:r>
+            <a:r>
+              <a:rPr lang="pt-BR" sz="1800" dirty="0" err="1" smtClean="0"/>
+              <a:t>Array</a:t>
+            </a:r>
+            <a:r>
+              <a:rPr lang="pt-BR" sz="1800" dirty="0" smtClean="0"/>
+              <a:t> multidimensional</a:t>
+            </a:r>
+          </a:p>
+          <a:p>
+            <a:r>
+              <a:rPr lang="pt-BR" sz="2000" dirty="0" smtClean="0"/>
+              <a:t>Inicializando um </a:t>
+            </a:r>
+            <a:r>
+              <a:rPr lang="pt-BR" sz="2000" dirty="0" err="1" smtClean="0"/>
+              <a:t>Array</a:t>
+            </a:r>
+            <a:endParaRPr lang="pt-BR" sz="2000" dirty="0" smtClean="0"/>
+          </a:p>
+          <a:p>
+            <a:pPr lvl="1"/>
+            <a:r>
+              <a:rPr lang="pt-BR" sz="1800" dirty="0" smtClean="0"/>
+              <a:t>Inicializando elementos em um loop</a:t>
+            </a:r>
+          </a:p>
+          <a:p>
+            <a:pPr lvl="1"/>
+            <a:r>
+              <a:rPr lang="pt-BR" sz="1800" dirty="0" smtClean="0"/>
+              <a:t>Declarando, construindo e inicializando em uma linha</a:t>
+            </a:r>
+          </a:p>
+          <a:p>
+            <a:pPr lvl="1"/>
+            <a:r>
+              <a:rPr lang="pt-BR" sz="1800" dirty="0" smtClean="0"/>
+              <a:t>Construindo e inicializando um </a:t>
+            </a:r>
+            <a:r>
+              <a:rPr lang="pt-BR" sz="1800" dirty="0" err="1" smtClean="0"/>
+              <a:t>Array</a:t>
+            </a:r>
+            <a:r>
+              <a:rPr lang="pt-BR" sz="1800" dirty="0" smtClean="0"/>
+              <a:t> </a:t>
+            </a:r>
+            <a:r>
+              <a:rPr lang="pt-BR" sz="1800" dirty="0" err="1" smtClean="0"/>
+              <a:t>Anonimo</a:t>
+            </a:r>
+            <a:endParaRPr lang="pt-BR" sz="1800" dirty="0" smtClean="0"/>
+          </a:p>
+          <a:p>
+            <a:pPr lvl="1"/>
+            <a:r>
+              <a:rPr lang="pt-BR" sz="1800" dirty="0" smtClean="0"/>
+              <a:t>Atribuições de elementos de </a:t>
+            </a:r>
+            <a:r>
+              <a:rPr lang="pt-BR" sz="1800" dirty="0" err="1" smtClean="0"/>
+              <a:t>Array</a:t>
+            </a:r>
+            <a:r>
+              <a:rPr lang="pt-BR" sz="1800" dirty="0" smtClean="0"/>
+              <a:t> válidos</a:t>
+            </a:r>
+          </a:p>
+          <a:p>
+            <a:pPr lvl="1"/>
+            <a:r>
+              <a:rPr lang="pt-BR" sz="1800" dirty="0" err="1" smtClean="0"/>
+              <a:t>Array</a:t>
+            </a:r>
+            <a:r>
+              <a:rPr lang="pt-BR" sz="1800" dirty="0" smtClean="0"/>
+              <a:t> de primitivos</a:t>
+            </a:r>
+          </a:p>
+          <a:p>
+            <a:pPr lvl="1"/>
+            <a:r>
+              <a:rPr lang="pt-BR" sz="1800" dirty="0" err="1" smtClean="0"/>
+              <a:t>Array</a:t>
+            </a:r>
+            <a:r>
+              <a:rPr lang="pt-BR" sz="1800" dirty="0" smtClean="0"/>
+              <a:t> de referência de Objeto</a:t>
+            </a:r>
+          </a:p>
+          <a:p>
+            <a:pPr lvl="1"/>
+            <a:r>
+              <a:rPr lang="pt-BR" sz="1800" dirty="0" smtClean="0"/>
+              <a:t>Atribuições de </a:t>
+            </a:r>
+            <a:r>
+              <a:rPr lang="pt-BR" sz="1800" dirty="0" err="1" smtClean="0"/>
+              <a:t>Array</a:t>
+            </a:r>
+            <a:r>
+              <a:rPr lang="pt-BR" sz="1800" dirty="0" smtClean="0"/>
+              <a:t> para referência, em </a:t>
+            </a:r>
+            <a:r>
+              <a:rPr lang="pt-BR" sz="1800" dirty="0" err="1" smtClean="0"/>
+              <a:t>Array</a:t>
+            </a:r>
+            <a:r>
+              <a:rPr lang="pt-BR" sz="1800" dirty="0" smtClean="0"/>
+              <a:t> unidimensional</a:t>
+            </a:r>
+          </a:p>
+          <a:p>
+            <a:pPr lvl="1"/>
+            <a:r>
+              <a:rPr lang="pt-BR" sz="1800" dirty="0"/>
+              <a:t>Atribuições de </a:t>
+            </a:r>
+            <a:r>
+              <a:rPr lang="pt-BR" sz="1800" dirty="0" err="1"/>
+              <a:t>Array</a:t>
+            </a:r>
+            <a:r>
+              <a:rPr lang="pt-BR" sz="1800" dirty="0"/>
+              <a:t> para referência, em </a:t>
+            </a:r>
+            <a:r>
+              <a:rPr lang="pt-BR" sz="1800" dirty="0" err="1"/>
+              <a:t>Array</a:t>
+            </a:r>
+            <a:r>
+              <a:rPr lang="pt-BR" sz="1800" dirty="0"/>
+              <a:t> </a:t>
+            </a:r>
+            <a:r>
+              <a:rPr lang="pt-BR" sz="1800" dirty="0" smtClean="0"/>
+              <a:t>multidimensional</a:t>
+            </a:r>
+            <a:endParaRPr lang="pt-BR" sz="1800" dirty="0"/>
+          </a:p>
+          <a:p>
+            <a:pPr lvl="1"/>
+            <a:endParaRPr lang="pt-BR" sz="1800" dirty="0"/>
+          </a:p>
+        </p:txBody>
+      </p:sp>
+      <p:sp>
+        <p:nvSpPr>
+          <p:cNvPr id="7" name="Espaço Reservado para Rodapé 3"/>
+          <p:cNvSpPr txBox="1">
+            <a:spLocks noGrp="1"/>
+          </p:cNvSpPr>
+          <p:nvPr>
+            <p:ph type="ftr" sz="quarter" idx="4294967295"/>
+          </p:nvPr>
+        </p:nvSpPr>
+        <p:spPr>
+          <a:xfrm>
+            <a:off x="3028950" y="6356351"/>
+            <a:ext cx="3086100" cy="365125"/>
+          </a:xfrm>
+          <a:prstGeom prst="rect">
+            <a:avLst/>
+          </a:prstGeom>
+        </p:spPr>
+        <p:txBody>
+          <a:bodyPr/>
+          <a:lstStyle>
+            <a:defPPr>
+              <a:defRPr lang="pt-BR"/>
+            </a:defPPr>
+            <a:lvl1pPr marL="0" algn="l" defTabSz="914400" rtl="0" eaLnBrk="1" latinLnBrk="0" hangingPunct="1">
+              <a:defRPr sz="1800" kern="1200">
+                <a:solidFill>
+                  <a:schemeClr val="tx1"/>
+                </a:solidFill>
+                <a:latin typeface="+mn-lt"/>
+                <a:ea typeface="+mn-ea"/>
+                <a:cs typeface="+mn-cs"/>
+              </a:defRPr>
+            </a:lvl1pPr>
+            <a:lvl2pPr marL="457200" algn="l" defTabSz="914400" rtl="0" eaLnBrk="1" latinLnBrk="0" hangingPunct="1">
+              <a:defRPr sz="1800" kern="1200">
+                <a:solidFill>
+                  <a:schemeClr val="tx1"/>
+                </a:solidFill>
+                <a:latin typeface="+mn-lt"/>
+                <a:ea typeface="+mn-ea"/>
+                <a:cs typeface="+mn-cs"/>
+              </a:defRPr>
+            </a:lvl2pPr>
+            <a:lvl3pPr marL="914400" algn="l" defTabSz="914400" rtl="0" eaLnBrk="1" latinLnBrk="0" hangingPunct="1">
+              <a:defRPr sz="1800" kern="1200">
+                <a:solidFill>
+                  <a:schemeClr val="tx1"/>
+                </a:solidFill>
+                <a:latin typeface="+mn-lt"/>
+                <a:ea typeface="+mn-ea"/>
+                <a:cs typeface="+mn-cs"/>
+              </a:defRPr>
+            </a:lvl3pPr>
+            <a:lvl4pPr marL="1371600" algn="l" defTabSz="914400" rtl="0" eaLnBrk="1" latinLnBrk="0" hangingPunct="1">
+              <a:defRPr sz="1800" kern="1200">
+                <a:solidFill>
+                  <a:schemeClr val="tx1"/>
+                </a:solidFill>
+                <a:latin typeface="+mn-lt"/>
+                <a:ea typeface="+mn-ea"/>
+                <a:cs typeface="+mn-cs"/>
+              </a:defRPr>
+            </a:lvl4pPr>
+            <a:lvl5pPr marL="1828800" algn="l" defTabSz="914400" rtl="0" eaLnBrk="1" latinLnBrk="0" hangingPunct="1">
+              <a:defRPr sz="1800" kern="1200">
+                <a:solidFill>
+                  <a:schemeClr val="tx1"/>
+                </a:solidFill>
+                <a:latin typeface="+mn-lt"/>
+                <a:ea typeface="+mn-ea"/>
+                <a:cs typeface="+mn-cs"/>
+              </a:defRPr>
+            </a:lvl5pPr>
+            <a:lvl6pPr marL="2286000" algn="l" defTabSz="914400" rtl="0" eaLnBrk="1" latinLnBrk="0" hangingPunct="1">
+              <a:defRPr sz="1800" kern="1200">
+                <a:solidFill>
+                  <a:schemeClr val="tx1"/>
+                </a:solidFill>
+                <a:latin typeface="+mn-lt"/>
+                <a:ea typeface="+mn-ea"/>
+                <a:cs typeface="+mn-cs"/>
+              </a:defRPr>
+            </a:lvl6pPr>
+            <a:lvl7pPr marL="2743200" algn="l" defTabSz="914400" rtl="0" eaLnBrk="1" latinLnBrk="0" hangingPunct="1">
+              <a:defRPr sz="1800" kern="1200">
+                <a:solidFill>
+                  <a:schemeClr val="tx1"/>
+                </a:solidFill>
+                <a:latin typeface="+mn-lt"/>
+                <a:ea typeface="+mn-ea"/>
+                <a:cs typeface="+mn-cs"/>
+              </a:defRPr>
+            </a:lvl7pPr>
+            <a:lvl8pPr marL="3200400" algn="l" defTabSz="914400" rtl="0" eaLnBrk="1" latinLnBrk="0" hangingPunct="1">
+              <a:defRPr sz="1800" kern="1200">
+                <a:solidFill>
+                  <a:schemeClr val="tx1"/>
+                </a:solidFill>
+                <a:latin typeface="+mn-lt"/>
+                <a:ea typeface="+mn-ea"/>
+                <a:cs typeface="+mn-cs"/>
+              </a:defRPr>
+            </a:lvl8pPr>
+            <a:lvl9pPr marL="3657600" algn="l" defTabSz="914400" rtl="0" eaLnBrk="1" latinLnBrk="0" hangingPunct="1">
+              <a:defRPr sz="1800" kern="1200">
+                <a:solidFill>
+                  <a:schemeClr val="tx1"/>
+                </a:solidFill>
+                <a:latin typeface="+mn-lt"/>
+                <a:ea typeface="+mn-ea"/>
+                <a:cs typeface="+mn-cs"/>
+              </a:defRPr>
+            </a:lvl9pPr>
+          </a:lstStyle>
+          <a:p>
+            <a:pPr algn="ctr">
+              <a:defRPr sz="1200">
+                <a:solidFill>
+                  <a:srgbClr val="8C8C8C"/>
+                </a:solidFill>
+                <a:latin typeface="Tw Cen MT" charset="0"/>
+                <a:ea typeface="Calibri" charset="0"/>
+                <a:cs typeface="Calibri" charset="0"/>
+              </a:defRPr>
+            </a:pPr>
+            <a:r>
+              <a:rPr lang="pt-BR" dirty="0"/>
+              <a:t>Trabalhando com </a:t>
+            </a:r>
+            <a:r>
+              <a:rPr lang="pt-BR" dirty="0" err="1"/>
+              <a:t>Strings</a:t>
+            </a:r>
+            <a:r>
+              <a:rPr lang="pt-BR" dirty="0"/>
+              <a:t>, </a:t>
+            </a:r>
+            <a:r>
+              <a:rPr lang="pt-BR" dirty="0" err="1"/>
+              <a:t>Arrays</a:t>
+            </a:r>
+            <a:r>
+              <a:rPr lang="pt-BR" dirty="0"/>
+              <a:t> e </a:t>
+            </a:r>
+            <a:r>
+              <a:rPr lang="pt-BR" dirty="0" err="1"/>
+              <a:t>ArrayLists</a:t>
             </a:r>
             <a:endParaRPr lang="pt-BR" dirty="0"/>
           </a:p>
-        </p:txBody>
-      </p:sp>
-      <p:sp>
-        <p:nvSpPr>
-          <p:cNvPr id="4" name="Espaço Reservado para Rodapé 3"/>
-          <p:cNvSpPr>
-            <a:spLocks noGrp="1"/>
-          </p:cNvSpPr>
-          <p:nvPr>
-            <p:ph type="ftr" sz="quarter" idx="11"/>
-          </p:nvPr>
-        </p:nvSpPr>
-        <p:spPr/>
-        <p:txBody>
-          <a:bodyPr/>
-          <a:lstStyle/>
-          <a:p>
-            <a:r>
-              <a:rPr lang="pt-BR" dirty="0" smtClean="0"/>
-              <a:t>Controle de Fluxo e Exceções</a:t>
-            </a:r>
-            <a:endParaRPr lang="pt-BR" dirty="0"/>
+          <a:p>
+            <a:pPr algn="ctr">
+              <a:defRPr sz="1200">
+                <a:solidFill>
+                  <a:srgbClr val="8C8C8C"/>
+                </a:solidFill>
+                <a:latin typeface="Tw Cen MT" charset="0"/>
+                <a:ea typeface="Calibri" charset="0"/>
+                <a:cs typeface="Calibri" charset="0"/>
+              </a:defRPr>
+            </a:pPr>
+            <a:endParaRPr lang="pt-BR" sz="1200" dirty="0" smtClean="0">
+              <a:solidFill>
+                <a:srgbClr val="8C8C8C"/>
+              </a:solidFill>
+              <a:latin typeface="Tw Cen MT" charset="0"/>
+              <a:ea typeface="Calibri" charset="0"/>
+              <a:cs typeface="Calibri" charset="0"/>
+            </a:endParaRPr>
+          </a:p>
+          <a:p>
+            <a:pPr algn="ctr">
+              <a:defRPr sz="1200">
+                <a:solidFill>
+                  <a:srgbClr val="8C8C8C"/>
+                </a:solidFill>
+                <a:latin typeface="Tw Cen MT" charset="0"/>
+                <a:ea typeface="Calibri" charset="0"/>
+                <a:cs typeface="Calibri" charset="0"/>
+              </a:defRPr>
+            </a:pPr>
+            <a:endParaRPr lang="pt-BR" sz="1200" dirty="0">
+              <a:solidFill>
+                <a:srgbClr val="8C8C8C"/>
+              </a:solidFill>
+              <a:latin typeface="Tw Cen MT" charset="0"/>
+              <a:ea typeface="Calibri" charset="0"/>
+              <a:cs typeface="Calibri" charset="0"/>
+            </a:endParaRPr>
           </a:p>
         </p:txBody>
       </p:sp>
     </p:spTree>
     <p:extLst>
       <p:ext uri="{BB962C8B-B14F-4D97-AF65-F5344CB8AC3E}">
-        <p14:creationId xmlns:p14="http://schemas.microsoft.com/office/powerpoint/2010/main" val="532384450"/>
+        <p14:creationId xmlns:p14="http://schemas.microsoft.com/office/powerpoint/2010/main" val="222251435"/>
       </p:ext>
     </p:extLst>
   </p:cSld>
   <p:clrMapOvr>
     <a:masterClrMapping/>
   </p:clrMapOvr>
-  <p:timing>
-    <p:tnLst>
-      <p:par>
-        <p:cTn id="1" dur="indefinite" restart="never" nodeType="tmRoot"/>
-      </p:par>
-    </p:tnLst>
-  </p:timing>
 </p:sld>
 </file>
 
@@ -13172,7 +14071,11 @@
           <a:p>
             <a:r>
               <a:rPr lang="pt-BR" dirty="0" smtClean="0"/>
-              <a:t>Criando Loops</a:t>
+              <a:t>Usando </a:t>
+            </a:r>
+            <a:r>
+              <a:rPr lang="pt-BR" dirty="0" err="1" smtClean="0"/>
+              <a:t>ArrayList</a:t>
             </a:r>
             <a:endParaRPr lang="pt-BR" dirty="0"/>
           </a:p>
@@ -13199,19 +14102,11 @@
             </a:r>
             <a:r>
               <a:rPr lang="pt-BR" dirty="0" err="1" smtClean="0"/>
-              <a:t>Objectives</a:t>
-            </a:r>
-            <a:r>
-              <a:rPr lang="pt-BR" dirty="0" smtClean="0"/>
-              <a:t> 5.1, 5.2, 5.3, 5.4 </a:t>
-            </a:r>
-            <a:r>
-              <a:rPr lang="pt-BR" dirty="0" err="1" smtClean="0"/>
-              <a:t>and</a:t>
-            </a:r>
-            <a:r>
-              <a:rPr lang="pt-BR" dirty="0" smtClean="0"/>
-              <a:t> 5.5</a:t>
+              <a:t>Objective</a:t>
+            </a:r>
+            <a:r>
+              <a:rPr lang="pt-BR" dirty="0" smtClean="0"/>
+              <a:t> 4.3</a:t>
             </a:r>
             <a:endParaRPr lang="pt-BR" dirty="0"/>
           </a:p>
@@ -13219,33 +14114,203 @@
       </p:sp>
       <p:sp>
         <p:nvSpPr>
-          <p:cNvPr id="4" name="Espaço Reservado para Rodapé 3"/>
-          <p:cNvSpPr>
-            <a:spLocks noGrp="1"/>
-          </p:cNvSpPr>
-          <p:nvPr>
-            <p:ph type="ftr" sz="quarter" idx="11"/>
-          </p:nvPr>
-        </p:nvSpPr>
-        <p:spPr/>
-        <p:txBody>
-          <a:bodyPr/>
-          <a:lstStyle/>
-          <a:p>
+          <p:cNvPr id="5" name="Espaço Reservado para Rodapé 3"/>
+          <p:cNvSpPr txBox="1">
+            <a:spLocks noGrp="1"/>
+          </p:cNvSpPr>
+          <p:nvPr>
+            <p:ph type="ftr" sz="quarter" idx="4294967295"/>
+          </p:nvPr>
+        </p:nvSpPr>
+        <p:spPr>
+          <a:xfrm>
+            <a:off x="3028950" y="6356351"/>
+            <a:ext cx="3086100" cy="365125"/>
+          </a:xfrm>
+          <a:prstGeom prst="rect">
+            <a:avLst/>
+          </a:prstGeom>
+        </p:spPr>
+        <p:txBody>
+          <a:bodyPr/>
+          <a:lstStyle>
+            <a:defPPr>
+              <a:defRPr lang="pt-BR"/>
+            </a:defPPr>
+            <a:lvl1pPr marL="0" algn="l" defTabSz="914400" rtl="0" eaLnBrk="1" latinLnBrk="0" hangingPunct="1">
+              <a:defRPr sz="1800" kern="1200">
+                <a:solidFill>
+                  <a:schemeClr val="tx1"/>
+                </a:solidFill>
+                <a:latin typeface="+mn-lt"/>
+                <a:ea typeface="+mn-ea"/>
+                <a:cs typeface="+mn-cs"/>
+              </a:defRPr>
+            </a:lvl1pPr>
+            <a:lvl2pPr marL="457200" algn="l" defTabSz="914400" rtl="0" eaLnBrk="1" latinLnBrk="0" hangingPunct="1">
+              <a:defRPr sz="1800" kern="1200">
+                <a:solidFill>
+                  <a:schemeClr val="tx1"/>
+                </a:solidFill>
+                <a:latin typeface="+mn-lt"/>
+                <a:ea typeface="+mn-ea"/>
+                <a:cs typeface="+mn-cs"/>
+              </a:defRPr>
+            </a:lvl2pPr>
+            <a:lvl3pPr marL="914400" algn="l" defTabSz="914400" rtl="0" eaLnBrk="1" latinLnBrk="0" hangingPunct="1">
+              <a:defRPr sz="1800" kern="1200">
+                <a:solidFill>
+                  <a:schemeClr val="tx1"/>
+                </a:solidFill>
+                <a:latin typeface="+mn-lt"/>
+                <a:ea typeface="+mn-ea"/>
+                <a:cs typeface="+mn-cs"/>
+              </a:defRPr>
+            </a:lvl3pPr>
+            <a:lvl4pPr marL="1371600" algn="l" defTabSz="914400" rtl="0" eaLnBrk="1" latinLnBrk="0" hangingPunct="1">
+              <a:defRPr sz="1800" kern="1200">
+                <a:solidFill>
+                  <a:schemeClr val="tx1"/>
+                </a:solidFill>
+                <a:latin typeface="+mn-lt"/>
+                <a:ea typeface="+mn-ea"/>
+                <a:cs typeface="+mn-cs"/>
+              </a:defRPr>
+            </a:lvl4pPr>
+            <a:lvl5pPr marL="1828800" algn="l" defTabSz="914400" rtl="0" eaLnBrk="1" latinLnBrk="0" hangingPunct="1">
+              <a:defRPr sz="1800" kern="1200">
+                <a:solidFill>
+                  <a:schemeClr val="tx1"/>
+                </a:solidFill>
+                <a:latin typeface="+mn-lt"/>
+                <a:ea typeface="+mn-ea"/>
+                <a:cs typeface="+mn-cs"/>
+              </a:defRPr>
+            </a:lvl5pPr>
+            <a:lvl6pPr marL="2286000" algn="l" defTabSz="914400" rtl="0" eaLnBrk="1" latinLnBrk="0" hangingPunct="1">
+              <a:defRPr sz="1800" kern="1200">
+                <a:solidFill>
+                  <a:schemeClr val="tx1"/>
+                </a:solidFill>
+                <a:latin typeface="+mn-lt"/>
+                <a:ea typeface="+mn-ea"/>
+                <a:cs typeface="+mn-cs"/>
+              </a:defRPr>
+            </a:lvl6pPr>
+            <a:lvl7pPr marL="2743200" algn="l" defTabSz="914400" rtl="0" eaLnBrk="1" latinLnBrk="0" hangingPunct="1">
+              <a:defRPr sz="1800" kern="1200">
+                <a:solidFill>
+                  <a:schemeClr val="tx1"/>
+                </a:solidFill>
+                <a:latin typeface="+mn-lt"/>
+                <a:ea typeface="+mn-ea"/>
+                <a:cs typeface="+mn-cs"/>
+              </a:defRPr>
+            </a:lvl7pPr>
+            <a:lvl8pPr marL="3200400" algn="l" defTabSz="914400" rtl="0" eaLnBrk="1" latinLnBrk="0" hangingPunct="1">
+              <a:defRPr sz="1800" kern="1200">
+                <a:solidFill>
+                  <a:schemeClr val="tx1"/>
+                </a:solidFill>
+                <a:latin typeface="+mn-lt"/>
+                <a:ea typeface="+mn-ea"/>
+                <a:cs typeface="+mn-cs"/>
+              </a:defRPr>
+            </a:lvl8pPr>
+            <a:lvl9pPr marL="3657600" algn="l" defTabSz="914400" rtl="0" eaLnBrk="1" latinLnBrk="0" hangingPunct="1">
+              <a:defRPr sz="1800" kern="1200">
+                <a:solidFill>
+                  <a:schemeClr val="tx1"/>
+                </a:solidFill>
+                <a:latin typeface="+mn-lt"/>
+                <a:ea typeface="+mn-ea"/>
+                <a:cs typeface="+mn-cs"/>
+              </a:defRPr>
+            </a:lvl9pPr>
+          </a:lstStyle>
+          <a:p>
+            <a:pPr algn="ctr">
+              <a:defRPr sz="1200">
+                <a:solidFill>
+                  <a:srgbClr val="8C8C8C"/>
+                </a:solidFill>
+                <a:latin typeface="Tw Cen MT" charset="0"/>
+                <a:ea typeface="Calibri" charset="0"/>
+                <a:cs typeface="Calibri" charset="0"/>
+              </a:defRPr>
+            </a:pPr>
             <a:r>
               <a:rPr lang="pt-BR" dirty="0"/>
-              <a:t>Controle de Fluxo e Exceções</a:t>
-            </a:r>
-          </a:p>
-          <a:p>
+              <a:t>Trabalhando com </a:t>
+            </a:r>
+            <a:r>
+              <a:rPr lang="pt-BR" dirty="0" err="1"/>
+              <a:t>Strings</a:t>
+            </a:r>
+            <a:r>
+              <a:rPr lang="pt-BR" dirty="0"/>
+              <a:t>, </a:t>
+            </a:r>
+            <a:r>
+              <a:rPr lang="pt-BR" dirty="0" err="1"/>
+              <a:t>Arrays</a:t>
+            </a:r>
+            <a:r>
+              <a:rPr lang="pt-BR" dirty="0"/>
+              <a:t> e </a:t>
+            </a:r>
+            <a:r>
+              <a:rPr lang="pt-BR" dirty="0" err="1"/>
+              <a:t>ArrayLists</a:t>
+            </a:r>
             <a:endParaRPr lang="pt-BR" dirty="0"/>
+          </a:p>
+          <a:p>
+            <a:pPr algn="ctr">
+              <a:defRPr sz="1200">
+                <a:solidFill>
+                  <a:srgbClr val="8C8C8C"/>
+                </a:solidFill>
+                <a:latin typeface="Tw Cen MT" charset="0"/>
+                <a:ea typeface="Calibri" charset="0"/>
+                <a:cs typeface="Calibri" charset="0"/>
+              </a:defRPr>
+            </a:pPr>
+            <a:endParaRPr lang="pt-BR" sz="1200" dirty="0" smtClean="0">
+              <a:solidFill>
+                <a:srgbClr val="8C8C8C"/>
+              </a:solidFill>
+              <a:latin typeface="Tw Cen MT" charset="0"/>
+              <a:ea typeface="Calibri" charset="0"/>
+              <a:cs typeface="Calibri" charset="0"/>
+            </a:endParaRPr>
+          </a:p>
+          <a:p>
+            <a:pPr algn="ctr">
+              <a:defRPr sz="1200">
+                <a:solidFill>
+                  <a:srgbClr val="8C8C8C"/>
+                </a:solidFill>
+                <a:latin typeface="Tw Cen MT" charset="0"/>
+                <a:ea typeface="Calibri" charset="0"/>
+                <a:cs typeface="Calibri" charset="0"/>
+              </a:defRPr>
+            </a:pPr>
+            <a:endParaRPr lang="pt-BR" sz="1200" dirty="0">
+              <a:solidFill>
+                <a:srgbClr val="8C8C8C"/>
+              </a:solidFill>
+              <a:latin typeface="Tw Cen MT" charset="0"/>
+              <a:ea typeface="Calibri" charset="0"/>
+              <a:cs typeface="Calibri" charset="0"/>
+            </a:endParaRPr>
           </a:p>
         </p:txBody>
       </p:sp>
     </p:spTree>
     <p:extLst>
       <p:ext uri="{BB962C8B-B14F-4D97-AF65-F5344CB8AC3E}">
-        <p14:creationId xmlns:p14="http://schemas.microsoft.com/office/powerpoint/2010/main" val="2470865896"/>
+        <p14:creationId xmlns:p14="http://schemas.microsoft.com/office/powerpoint/2010/main" val="2158061903"/>
       </p:ext>
     </p:extLst>
   </p:cSld>
@@ -13281,12 +14346,12 @@
       </p:grpSpPr>
       <p:sp>
         <p:nvSpPr>
-          <p:cNvPr id="2" name="Título 1"/>
-          <p:cNvSpPr>
-            <a:spLocks noGrp="1"/>
-          </p:cNvSpPr>
-          <p:nvPr>
-            <p:ph type="ctrTitle"/>
+          <p:cNvPr id="5" name="Título 4"/>
+          <p:cNvSpPr>
+            <a:spLocks noGrp="1"/>
+          </p:cNvSpPr>
+          <p:nvPr>
+            <p:ph type="title"/>
           </p:nvPr>
         </p:nvSpPr>
         <p:spPr/>
@@ -13295,8 +14360,12 @@
           <a:lstStyle/>
           <a:p>
             <a:r>
-              <a:rPr lang="pt-BR" dirty="0" smtClean="0"/>
-              <a:t>Manipulando Exceções</a:t>
+              <a:rPr lang="pt-BR" dirty="0"/>
+              <a:t>Usando </a:t>
+            </a:r>
+            <a:r>
+              <a:rPr lang="pt-BR" dirty="0" err="1"/>
+              <a:t>ArrayList</a:t>
             </a:r>
             <a:endParaRPr lang="pt-BR" dirty="0"/>
           </a:p>
@@ -13304,12 +14373,12 @@
       </p:sp>
       <p:sp>
         <p:nvSpPr>
-          <p:cNvPr id="3" name="Subtítulo 2"/>
-          <p:cNvSpPr>
-            <a:spLocks noGrp="1"/>
-          </p:cNvSpPr>
-          <p:nvPr>
-            <p:ph type="subTitle" idx="1"/>
+          <p:cNvPr id="6" name="Espaço Reservado para Conteúdo 5"/>
+          <p:cNvSpPr>
+            <a:spLocks noGrp="1"/>
+          </p:cNvSpPr>
+          <p:nvPr>
+            <p:ph idx="1"/>
           </p:nvPr>
         </p:nvSpPr>
         <p:spPr/>
@@ -13319,23 +14388,43 @@
           <a:p>
             <a:r>
               <a:rPr lang="pt-BR" dirty="0" smtClean="0"/>
-              <a:t>OCA </a:t>
+              <a:t>Quando usar </a:t>
             </a:r>
             <a:r>
               <a:rPr lang="pt-BR" dirty="0" err="1" smtClean="0"/>
-              <a:t>Objectives</a:t>
-            </a:r>
-            <a:r>
-              <a:rPr lang="pt-BR" dirty="0" smtClean="0"/>
-              <a:t> 8.1, 8.2, 8.3 </a:t>
-            </a:r>
+              <a:t>ArrayLists</a:t>
+            </a:r>
+            <a:endParaRPr lang="pt-BR" dirty="0" smtClean="0"/>
+          </a:p>
+          <a:p>
+            <a:pPr lvl="1"/>
             <a:r>
               <a:rPr lang="pt-BR" dirty="0" err="1" smtClean="0"/>
-              <a:t>and</a:t>
-            </a:r>
-            <a:r>
-              <a:rPr lang="pt-BR" dirty="0" smtClean="0"/>
-              <a:t> 8.4</a:t>
+              <a:t>ArraysLists</a:t>
+            </a:r>
+            <a:r>
+              <a:rPr lang="pt-BR" dirty="0" smtClean="0"/>
+              <a:t> e duplicatas</a:t>
+            </a:r>
+          </a:p>
+          <a:p>
+            <a:r>
+              <a:rPr lang="pt-BR" dirty="0" smtClean="0"/>
+              <a:t>Métodos importantes de </a:t>
+            </a:r>
+            <a:r>
+              <a:rPr lang="pt-BR" dirty="0" err="1" smtClean="0"/>
+              <a:t>ArrayList</a:t>
+            </a:r>
+            <a:r>
+              <a:rPr lang="pt-BR" dirty="0" smtClean="0"/>
+              <a:t> </a:t>
+            </a:r>
+          </a:p>
+          <a:p>
+            <a:r>
+              <a:rPr lang="pt-BR" dirty="0" smtClean="0"/>
+              <a:t>Encapsulamento para variáveis de referência</a:t>
             </a:r>
             <a:endParaRPr lang="pt-BR" dirty="0"/>
           </a:p>
@@ -13343,46 +14432,209 @@
       </p:sp>
       <p:sp>
         <p:nvSpPr>
-          <p:cNvPr id="4" name="Espaço Reservado para Rodapé 3"/>
-          <p:cNvSpPr>
-            <a:spLocks noGrp="1"/>
-          </p:cNvSpPr>
-          <p:nvPr>
-            <p:ph type="ftr" sz="quarter" idx="11"/>
-          </p:nvPr>
-        </p:nvSpPr>
-        <p:spPr/>
-        <p:txBody>
-          <a:bodyPr/>
-          <a:lstStyle/>
-          <a:p>
+          <p:cNvPr id="7" name="Espaço Reservado para Rodapé 3"/>
+          <p:cNvSpPr txBox="1">
+            <a:spLocks noGrp="1"/>
+          </p:cNvSpPr>
+          <p:nvPr>
+            <p:ph type="ftr" sz="quarter" idx="4294967295"/>
+          </p:nvPr>
+        </p:nvSpPr>
+        <p:spPr>
+          <a:xfrm>
+            <a:off x="3028950" y="6356351"/>
+            <a:ext cx="3086100" cy="365125"/>
+          </a:xfrm>
+          <a:prstGeom prst="rect">
+            <a:avLst/>
+          </a:prstGeom>
+        </p:spPr>
+        <p:txBody>
+          <a:bodyPr/>
+          <a:lstStyle>
+            <a:defPPr>
+              <a:defRPr lang="pt-BR"/>
+            </a:defPPr>
+            <a:lvl1pPr marL="0" algn="l" defTabSz="914400" rtl="0" eaLnBrk="1" latinLnBrk="0" hangingPunct="1">
+              <a:defRPr sz="1800" kern="1200">
+                <a:solidFill>
+                  <a:schemeClr val="tx1"/>
+                </a:solidFill>
+                <a:latin typeface="+mn-lt"/>
+                <a:ea typeface="+mn-ea"/>
+                <a:cs typeface="+mn-cs"/>
+              </a:defRPr>
+            </a:lvl1pPr>
+            <a:lvl2pPr marL="457200" algn="l" defTabSz="914400" rtl="0" eaLnBrk="1" latinLnBrk="0" hangingPunct="1">
+              <a:defRPr sz="1800" kern="1200">
+                <a:solidFill>
+                  <a:schemeClr val="tx1"/>
+                </a:solidFill>
+                <a:latin typeface="+mn-lt"/>
+                <a:ea typeface="+mn-ea"/>
+                <a:cs typeface="+mn-cs"/>
+              </a:defRPr>
+            </a:lvl2pPr>
+            <a:lvl3pPr marL="914400" algn="l" defTabSz="914400" rtl="0" eaLnBrk="1" latinLnBrk="0" hangingPunct="1">
+              <a:defRPr sz="1800" kern="1200">
+                <a:solidFill>
+                  <a:schemeClr val="tx1"/>
+                </a:solidFill>
+                <a:latin typeface="+mn-lt"/>
+                <a:ea typeface="+mn-ea"/>
+                <a:cs typeface="+mn-cs"/>
+              </a:defRPr>
+            </a:lvl3pPr>
+            <a:lvl4pPr marL="1371600" algn="l" defTabSz="914400" rtl="0" eaLnBrk="1" latinLnBrk="0" hangingPunct="1">
+              <a:defRPr sz="1800" kern="1200">
+                <a:solidFill>
+                  <a:schemeClr val="tx1"/>
+                </a:solidFill>
+                <a:latin typeface="+mn-lt"/>
+                <a:ea typeface="+mn-ea"/>
+                <a:cs typeface="+mn-cs"/>
+              </a:defRPr>
+            </a:lvl4pPr>
+            <a:lvl5pPr marL="1828800" algn="l" defTabSz="914400" rtl="0" eaLnBrk="1" latinLnBrk="0" hangingPunct="1">
+              <a:defRPr sz="1800" kern="1200">
+                <a:solidFill>
+                  <a:schemeClr val="tx1"/>
+                </a:solidFill>
+                <a:latin typeface="+mn-lt"/>
+                <a:ea typeface="+mn-ea"/>
+                <a:cs typeface="+mn-cs"/>
+              </a:defRPr>
+            </a:lvl5pPr>
+            <a:lvl6pPr marL="2286000" algn="l" defTabSz="914400" rtl="0" eaLnBrk="1" latinLnBrk="0" hangingPunct="1">
+              <a:defRPr sz="1800" kern="1200">
+                <a:solidFill>
+                  <a:schemeClr val="tx1"/>
+                </a:solidFill>
+                <a:latin typeface="+mn-lt"/>
+                <a:ea typeface="+mn-ea"/>
+                <a:cs typeface="+mn-cs"/>
+              </a:defRPr>
+            </a:lvl6pPr>
+            <a:lvl7pPr marL="2743200" algn="l" defTabSz="914400" rtl="0" eaLnBrk="1" latinLnBrk="0" hangingPunct="1">
+              <a:defRPr sz="1800" kern="1200">
+                <a:solidFill>
+                  <a:schemeClr val="tx1"/>
+                </a:solidFill>
+                <a:latin typeface="+mn-lt"/>
+                <a:ea typeface="+mn-ea"/>
+                <a:cs typeface="+mn-cs"/>
+              </a:defRPr>
+            </a:lvl7pPr>
+            <a:lvl8pPr marL="3200400" algn="l" defTabSz="914400" rtl="0" eaLnBrk="1" latinLnBrk="0" hangingPunct="1">
+              <a:defRPr sz="1800" kern="1200">
+                <a:solidFill>
+                  <a:schemeClr val="tx1"/>
+                </a:solidFill>
+                <a:latin typeface="+mn-lt"/>
+                <a:ea typeface="+mn-ea"/>
+                <a:cs typeface="+mn-cs"/>
+              </a:defRPr>
+            </a:lvl8pPr>
+            <a:lvl9pPr marL="3657600" algn="l" defTabSz="914400" rtl="0" eaLnBrk="1" latinLnBrk="0" hangingPunct="1">
+              <a:defRPr sz="1800" kern="1200">
+                <a:solidFill>
+                  <a:schemeClr val="tx1"/>
+                </a:solidFill>
+                <a:latin typeface="+mn-lt"/>
+                <a:ea typeface="+mn-ea"/>
+                <a:cs typeface="+mn-cs"/>
+              </a:defRPr>
+            </a:lvl9pPr>
+          </a:lstStyle>
+          <a:p>
+            <a:pPr algn="ctr">
+              <a:defRPr sz="1200">
+                <a:solidFill>
+                  <a:srgbClr val="8C8C8C"/>
+                </a:solidFill>
+                <a:latin typeface="Tw Cen MT" charset="0"/>
+                <a:ea typeface="Calibri" charset="0"/>
+                <a:cs typeface="Calibri" charset="0"/>
+              </a:defRPr>
+            </a:pPr>
             <a:r>
               <a:rPr lang="pt-BR" dirty="0"/>
-              <a:t>Controle de Fluxo e Exceções</a:t>
-            </a:r>
-          </a:p>
-          <a:p>
+              <a:t>Trabalhando com </a:t>
+            </a:r>
+            <a:r>
+              <a:rPr lang="pt-BR" dirty="0" err="1"/>
+              <a:t>Strings</a:t>
+            </a:r>
+            <a:r>
+              <a:rPr lang="pt-BR" dirty="0"/>
+              <a:t>, </a:t>
+            </a:r>
+            <a:r>
+              <a:rPr lang="pt-BR" dirty="0" err="1"/>
+              <a:t>Arrays</a:t>
+            </a:r>
+            <a:r>
+              <a:rPr lang="pt-BR" dirty="0"/>
+              <a:t> e </a:t>
+            </a:r>
+            <a:r>
+              <a:rPr lang="pt-BR" dirty="0" err="1"/>
+              <a:t>ArrayLists</a:t>
+            </a:r>
             <a:endParaRPr lang="pt-BR" dirty="0"/>
+          </a:p>
+          <a:p>
+            <a:pPr algn="ctr">
+              <a:defRPr sz="1200">
+                <a:solidFill>
+                  <a:srgbClr val="8C8C8C"/>
+                </a:solidFill>
+                <a:latin typeface="Tw Cen MT" charset="0"/>
+                <a:ea typeface="Calibri" charset="0"/>
+                <a:cs typeface="Calibri" charset="0"/>
+              </a:defRPr>
+            </a:pPr>
+            <a:endParaRPr lang="pt-BR" sz="1200" dirty="0" smtClean="0">
+              <a:solidFill>
+                <a:srgbClr val="8C8C8C"/>
+              </a:solidFill>
+              <a:latin typeface="Tw Cen MT" charset="0"/>
+              <a:ea typeface="Calibri" charset="0"/>
+              <a:cs typeface="Calibri" charset="0"/>
+            </a:endParaRPr>
+          </a:p>
+          <a:p>
+            <a:pPr algn="ctr">
+              <a:defRPr sz="1200">
+                <a:solidFill>
+                  <a:srgbClr val="8C8C8C"/>
+                </a:solidFill>
+                <a:latin typeface="Tw Cen MT" charset="0"/>
+                <a:ea typeface="Calibri" charset="0"/>
+                <a:cs typeface="Calibri" charset="0"/>
+              </a:defRPr>
+            </a:pPr>
+            <a:endParaRPr lang="pt-BR" sz="1200" dirty="0">
+              <a:solidFill>
+                <a:srgbClr val="8C8C8C"/>
+              </a:solidFill>
+              <a:latin typeface="Tw Cen MT" charset="0"/>
+              <a:ea typeface="Calibri" charset="0"/>
+              <a:cs typeface="Calibri" charset="0"/>
+            </a:endParaRPr>
           </a:p>
         </p:txBody>
       </p:sp>
     </p:spTree>
     <p:extLst>
       <p:ext uri="{BB962C8B-B14F-4D97-AF65-F5344CB8AC3E}">
-        <p14:creationId xmlns:p14="http://schemas.microsoft.com/office/powerpoint/2010/main" val="3021261354"/>
+        <p14:creationId xmlns:p14="http://schemas.microsoft.com/office/powerpoint/2010/main" val="3738884704"/>
       </p:ext>
     </p:extLst>
   </p:cSld>
   <p:clrMapOvr>
     <a:masterClrMapping/>
   </p:clrMapOvr>
-  <p:timing>
-    <p:tnLst>
-      <p:par>
-        <p:cTn id="1" dur="indefinite" restart="never" nodeType="tmRoot"/>
-      </p:par>
-    </p:tnLst>
-  </p:timing>
 </p:sld>
 </file>
 
@@ -13537,6 +14789,376 @@
 </file>
 
 <file path=ppt/slides/slide60.xml><?xml version="1.0" encoding="utf-8"?>
+<p:sld xmlns:a="http://schemas.openxmlformats.org/drawingml/2006/main" xmlns:r="http://schemas.openxmlformats.org/officeDocument/2006/relationships" xmlns:p="http://schemas.openxmlformats.org/presentationml/2006/main">
+  <p:cSld>
+    <p:spTree>
+      <p:nvGrpSpPr>
+        <p:cNvPr id="1" name=""/>
+        <p:cNvGrpSpPr/>
+        <p:nvPr/>
+      </p:nvGrpSpPr>
+      <p:grpSpPr>
+        <a:xfrm>
+          <a:off x="0" y="0"/>
+          <a:ext cx="0" cy="0"/>
+          <a:chOff x="0" y="0"/>
+          <a:chExt cx="0" cy="0"/>
+        </a:xfrm>
+      </p:grpSpPr>
+      <p:sp>
+        <p:nvSpPr>
+          <p:cNvPr id="2" name="Título 1"/>
+          <p:cNvSpPr>
+            <a:spLocks noGrp="1"/>
+          </p:cNvSpPr>
+          <p:nvPr>
+            <p:ph type="ctrTitle"/>
+          </p:nvPr>
+        </p:nvSpPr>
+        <p:spPr/>
+        <p:txBody>
+          <a:bodyPr/>
+          <a:lstStyle/>
+          <a:p>
+            <a:r>
+              <a:rPr lang="pt-BR" dirty="0" smtClean="0"/>
+              <a:t>Usando </a:t>
+            </a:r>
+            <a:r>
+              <a:rPr lang="pt-BR" dirty="0" err="1" smtClean="0"/>
+              <a:t>if</a:t>
+            </a:r>
+            <a:r>
+              <a:rPr lang="pt-BR" dirty="0" smtClean="0"/>
+              <a:t> e switch</a:t>
+            </a:r>
+            <a:endParaRPr lang="pt-BR" dirty="0"/>
+          </a:p>
+        </p:txBody>
+      </p:sp>
+      <p:sp>
+        <p:nvSpPr>
+          <p:cNvPr id="3" name="Subtítulo 2"/>
+          <p:cNvSpPr>
+            <a:spLocks noGrp="1"/>
+          </p:cNvSpPr>
+          <p:nvPr>
+            <p:ph type="subTitle" idx="1"/>
+          </p:nvPr>
+        </p:nvSpPr>
+        <p:spPr/>
+        <p:txBody>
+          <a:bodyPr/>
+          <a:lstStyle/>
+          <a:p>
+            <a:r>
+              <a:rPr lang="pt-BR" dirty="0" smtClean="0"/>
+              <a:t>OCA </a:t>
+            </a:r>
+            <a:r>
+              <a:rPr lang="pt-BR" dirty="0" err="1" smtClean="0"/>
+              <a:t>Objectives</a:t>
+            </a:r>
+            <a:r>
+              <a:rPr lang="pt-BR" dirty="0" smtClean="0"/>
+              <a:t> 3.4, 3.5 e 1.1 upgrade</a:t>
+            </a:r>
+            <a:endParaRPr lang="pt-BR" dirty="0"/>
+          </a:p>
+        </p:txBody>
+      </p:sp>
+      <p:sp>
+        <p:nvSpPr>
+          <p:cNvPr id="4" name="Espaço Reservado para Rodapé 3"/>
+          <p:cNvSpPr>
+            <a:spLocks noGrp="1"/>
+          </p:cNvSpPr>
+          <p:nvPr>
+            <p:ph type="ftr" sz="quarter" idx="11"/>
+          </p:nvPr>
+        </p:nvSpPr>
+        <p:spPr/>
+        <p:txBody>
+          <a:bodyPr/>
+          <a:lstStyle/>
+          <a:p>
+            <a:r>
+              <a:rPr lang="pt-BR" dirty="0" smtClean="0"/>
+              <a:t>Controle de Fluxo e Exceções</a:t>
+            </a:r>
+            <a:endParaRPr lang="pt-BR" dirty="0"/>
+          </a:p>
+        </p:txBody>
+      </p:sp>
+    </p:spTree>
+    <p:extLst>
+      <p:ext uri="{BB962C8B-B14F-4D97-AF65-F5344CB8AC3E}">
+        <p14:creationId xmlns:p14="http://schemas.microsoft.com/office/powerpoint/2010/main" val="532384450"/>
+      </p:ext>
+    </p:extLst>
+  </p:cSld>
+  <p:clrMapOvr>
+    <a:masterClrMapping/>
+  </p:clrMapOvr>
+  <p:timing>
+    <p:tnLst>
+      <p:par>
+        <p:cTn id="1" dur="indefinite" restart="never" nodeType="tmRoot"/>
+      </p:par>
+    </p:tnLst>
+  </p:timing>
+</p:sld>
+</file>
+
+<file path=ppt/slides/slide61.xml><?xml version="1.0" encoding="utf-8"?>
+<p:sld xmlns:a="http://schemas.openxmlformats.org/drawingml/2006/main" xmlns:r="http://schemas.openxmlformats.org/officeDocument/2006/relationships" xmlns:p="http://schemas.openxmlformats.org/presentationml/2006/main">
+  <p:cSld>
+    <p:spTree>
+      <p:nvGrpSpPr>
+        <p:cNvPr id="1" name=""/>
+        <p:cNvGrpSpPr/>
+        <p:nvPr/>
+      </p:nvGrpSpPr>
+      <p:grpSpPr>
+        <a:xfrm>
+          <a:off x="0" y="0"/>
+          <a:ext cx="0" cy="0"/>
+          <a:chOff x="0" y="0"/>
+          <a:chExt cx="0" cy="0"/>
+        </a:xfrm>
+      </p:grpSpPr>
+      <p:sp>
+        <p:nvSpPr>
+          <p:cNvPr id="2" name="Título 1"/>
+          <p:cNvSpPr>
+            <a:spLocks noGrp="1"/>
+          </p:cNvSpPr>
+          <p:nvPr>
+            <p:ph type="ctrTitle"/>
+          </p:nvPr>
+        </p:nvSpPr>
+        <p:spPr/>
+        <p:txBody>
+          <a:bodyPr/>
+          <a:lstStyle/>
+          <a:p>
+            <a:r>
+              <a:rPr lang="pt-BR" dirty="0" smtClean="0"/>
+              <a:t>Criando Loops</a:t>
+            </a:r>
+            <a:endParaRPr lang="pt-BR" dirty="0"/>
+          </a:p>
+        </p:txBody>
+      </p:sp>
+      <p:sp>
+        <p:nvSpPr>
+          <p:cNvPr id="3" name="Subtítulo 2"/>
+          <p:cNvSpPr>
+            <a:spLocks noGrp="1"/>
+          </p:cNvSpPr>
+          <p:nvPr>
+            <p:ph type="subTitle" idx="1"/>
+          </p:nvPr>
+        </p:nvSpPr>
+        <p:spPr/>
+        <p:txBody>
+          <a:bodyPr/>
+          <a:lstStyle/>
+          <a:p>
+            <a:r>
+              <a:rPr lang="pt-BR" dirty="0" smtClean="0"/>
+              <a:t>OCA </a:t>
+            </a:r>
+            <a:r>
+              <a:rPr lang="pt-BR" dirty="0" err="1" smtClean="0"/>
+              <a:t>Objectives</a:t>
+            </a:r>
+            <a:r>
+              <a:rPr lang="pt-BR" dirty="0" smtClean="0"/>
+              <a:t> 5.1, 5.2, 5.3, 5.4 </a:t>
+            </a:r>
+            <a:r>
+              <a:rPr lang="pt-BR" dirty="0" err="1" smtClean="0"/>
+              <a:t>and</a:t>
+            </a:r>
+            <a:r>
+              <a:rPr lang="pt-BR" dirty="0" smtClean="0"/>
+              <a:t> 5.5</a:t>
+            </a:r>
+            <a:endParaRPr lang="pt-BR" dirty="0"/>
+          </a:p>
+        </p:txBody>
+      </p:sp>
+      <p:sp>
+        <p:nvSpPr>
+          <p:cNvPr id="4" name="Espaço Reservado para Rodapé 3"/>
+          <p:cNvSpPr>
+            <a:spLocks noGrp="1"/>
+          </p:cNvSpPr>
+          <p:nvPr>
+            <p:ph type="ftr" sz="quarter" idx="11"/>
+          </p:nvPr>
+        </p:nvSpPr>
+        <p:spPr/>
+        <p:txBody>
+          <a:bodyPr/>
+          <a:lstStyle/>
+          <a:p>
+            <a:r>
+              <a:rPr lang="pt-BR" dirty="0"/>
+              <a:t>Controle de Fluxo e Exceções</a:t>
+            </a:r>
+          </a:p>
+          <a:p>
+            <a:endParaRPr lang="pt-BR" dirty="0"/>
+          </a:p>
+        </p:txBody>
+      </p:sp>
+    </p:spTree>
+    <p:extLst>
+      <p:ext uri="{BB962C8B-B14F-4D97-AF65-F5344CB8AC3E}">
+        <p14:creationId xmlns:p14="http://schemas.microsoft.com/office/powerpoint/2010/main" val="2470865896"/>
+      </p:ext>
+    </p:extLst>
+  </p:cSld>
+  <p:clrMapOvr>
+    <a:masterClrMapping/>
+  </p:clrMapOvr>
+  <p:timing>
+    <p:tnLst>
+      <p:par>
+        <p:cTn id="1" dur="indefinite" restart="never" nodeType="tmRoot"/>
+      </p:par>
+    </p:tnLst>
+  </p:timing>
+</p:sld>
+</file>
+
+<file path=ppt/slides/slide62.xml><?xml version="1.0" encoding="utf-8"?>
+<p:sld xmlns:a="http://schemas.openxmlformats.org/drawingml/2006/main" xmlns:r="http://schemas.openxmlformats.org/officeDocument/2006/relationships" xmlns:p="http://schemas.openxmlformats.org/presentationml/2006/main">
+  <p:cSld>
+    <p:spTree>
+      <p:nvGrpSpPr>
+        <p:cNvPr id="1" name=""/>
+        <p:cNvGrpSpPr/>
+        <p:nvPr/>
+      </p:nvGrpSpPr>
+      <p:grpSpPr>
+        <a:xfrm>
+          <a:off x="0" y="0"/>
+          <a:ext cx="0" cy="0"/>
+          <a:chOff x="0" y="0"/>
+          <a:chExt cx="0" cy="0"/>
+        </a:xfrm>
+      </p:grpSpPr>
+      <p:sp>
+        <p:nvSpPr>
+          <p:cNvPr id="2" name="Título 1"/>
+          <p:cNvSpPr>
+            <a:spLocks noGrp="1"/>
+          </p:cNvSpPr>
+          <p:nvPr>
+            <p:ph type="ctrTitle"/>
+          </p:nvPr>
+        </p:nvSpPr>
+        <p:spPr/>
+        <p:txBody>
+          <a:bodyPr/>
+          <a:lstStyle/>
+          <a:p>
+            <a:r>
+              <a:rPr lang="pt-BR" dirty="0" smtClean="0"/>
+              <a:t>Manipulando Exceções</a:t>
+            </a:r>
+            <a:endParaRPr lang="pt-BR" dirty="0"/>
+          </a:p>
+        </p:txBody>
+      </p:sp>
+      <p:sp>
+        <p:nvSpPr>
+          <p:cNvPr id="3" name="Subtítulo 2"/>
+          <p:cNvSpPr>
+            <a:spLocks noGrp="1"/>
+          </p:cNvSpPr>
+          <p:nvPr>
+            <p:ph type="subTitle" idx="1"/>
+          </p:nvPr>
+        </p:nvSpPr>
+        <p:spPr/>
+        <p:txBody>
+          <a:bodyPr/>
+          <a:lstStyle/>
+          <a:p>
+            <a:r>
+              <a:rPr lang="pt-BR" dirty="0" smtClean="0"/>
+              <a:t>OCA </a:t>
+            </a:r>
+            <a:r>
+              <a:rPr lang="pt-BR" dirty="0" err="1" smtClean="0"/>
+              <a:t>Objectives</a:t>
+            </a:r>
+            <a:r>
+              <a:rPr lang="pt-BR" dirty="0" smtClean="0"/>
+              <a:t> 8.1, 8.2, 8.3 </a:t>
+            </a:r>
+            <a:r>
+              <a:rPr lang="pt-BR" dirty="0" err="1" smtClean="0"/>
+              <a:t>and</a:t>
+            </a:r>
+            <a:r>
+              <a:rPr lang="pt-BR" dirty="0" smtClean="0"/>
+              <a:t> 8.4</a:t>
+            </a:r>
+            <a:endParaRPr lang="pt-BR" dirty="0"/>
+          </a:p>
+        </p:txBody>
+      </p:sp>
+      <p:sp>
+        <p:nvSpPr>
+          <p:cNvPr id="4" name="Espaço Reservado para Rodapé 3"/>
+          <p:cNvSpPr>
+            <a:spLocks noGrp="1"/>
+          </p:cNvSpPr>
+          <p:nvPr>
+            <p:ph type="ftr" sz="quarter" idx="11"/>
+          </p:nvPr>
+        </p:nvSpPr>
+        <p:spPr/>
+        <p:txBody>
+          <a:bodyPr/>
+          <a:lstStyle/>
+          <a:p>
+            <a:r>
+              <a:rPr lang="pt-BR" dirty="0"/>
+              <a:t>Controle de Fluxo e Exceções</a:t>
+            </a:r>
+          </a:p>
+          <a:p>
+            <a:endParaRPr lang="pt-BR" dirty="0"/>
+          </a:p>
+        </p:txBody>
+      </p:sp>
+    </p:spTree>
+    <p:extLst>
+      <p:ext uri="{BB962C8B-B14F-4D97-AF65-F5344CB8AC3E}">
+        <p14:creationId xmlns:p14="http://schemas.microsoft.com/office/powerpoint/2010/main" val="3021261354"/>
+      </p:ext>
+    </p:extLst>
+  </p:cSld>
+  <p:clrMapOvr>
+    <a:masterClrMapping/>
+  </p:clrMapOvr>
+  <p:timing>
+    <p:tnLst>
+      <p:par>
+        <p:cTn id="1" dur="indefinite" restart="never" nodeType="tmRoot"/>
+      </p:par>
+    </p:tnLst>
+  </p:timing>
+</p:sld>
+</file>
+
+<file path=ppt/slides/slide63.xml><?xml version="1.0" encoding="utf-8"?>
 <p:sld xmlns:a="http://schemas.openxmlformats.org/drawingml/2006/main" xmlns:r="http://schemas.openxmlformats.org/officeDocument/2006/relationships" xmlns:p="http://schemas.openxmlformats.org/presentationml/2006/main">
   <p:cSld>
     <p:spTree>

</xml_diff>